<commit_message>
Abhinav/Naz: Updating the presentation.
</commit_message>
<xml_diff>
--- a/Day1/day_1.pptx
+++ b/Day1/day_1.pptx
@@ -21,80 +21,81 @@
     <p:sldId id="266" r:id="rId18"/>
     <p:sldId id="267" r:id="rId19"/>
     <p:sldId id="268" r:id="rId20"/>
+    <p:sldId id="269" r:id="rId21"/>
   </p:sldIdLst>
   <p:sldSz cx="9144000" cy="6858000"/>
   <p:notesSz cx="6858000" cy="9144000"/>
   <p:defaultTextStyle>
     <a:lvl1pPr>
       <a:defRPr>
-        <a:latin typeface="Calisto MT"/>
-        <a:ea typeface="Calisto MT"/>
-        <a:cs typeface="Calisto MT"/>
-        <a:sym typeface="Calisto MT"/>
+        <a:latin typeface="Avenir Book"/>
+        <a:ea typeface="Avenir Book"/>
+        <a:cs typeface="Avenir Book"/>
+        <a:sym typeface="Avenir Book"/>
       </a:defRPr>
     </a:lvl1pPr>
-    <a:lvl2pPr indent="457200">
+    <a:lvl2pPr>
       <a:defRPr>
-        <a:latin typeface="Calisto MT"/>
-        <a:ea typeface="Calisto MT"/>
-        <a:cs typeface="Calisto MT"/>
-        <a:sym typeface="Calisto MT"/>
+        <a:latin typeface="Avenir Book"/>
+        <a:ea typeface="Avenir Book"/>
+        <a:cs typeface="Avenir Book"/>
+        <a:sym typeface="Avenir Book"/>
       </a:defRPr>
     </a:lvl2pPr>
-    <a:lvl3pPr indent="914400">
+    <a:lvl3pPr>
       <a:defRPr>
-        <a:latin typeface="Calisto MT"/>
-        <a:ea typeface="Calisto MT"/>
-        <a:cs typeface="Calisto MT"/>
-        <a:sym typeface="Calisto MT"/>
+        <a:latin typeface="Avenir Book"/>
+        <a:ea typeface="Avenir Book"/>
+        <a:cs typeface="Avenir Book"/>
+        <a:sym typeface="Avenir Book"/>
       </a:defRPr>
     </a:lvl3pPr>
-    <a:lvl4pPr indent="1371600">
+    <a:lvl4pPr>
       <a:defRPr>
-        <a:latin typeface="Calisto MT"/>
-        <a:ea typeface="Calisto MT"/>
-        <a:cs typeface="Calisto MT"/>
-        <a:sym typeface="Calisto MT"/>
+        <a:latin typeface="Avenir Book"/>
+        <a:ea typeface="Avenir Book"/>
+        <a:cs typeface="Avenir Book"/>
+        <a:sym typeface="Avenir Book"/>
       </a:defRPr>
     </a:lvl4pPr>
-    <a:lvl5pPr indent="1828800">
+    <a:lvl5pPr>
       <a:defRPr>
-        <a:latin typeface="Calisto MT"/>
-        <a:ea typeface="Calisto MT"/>
-        <a:cs typeface="Calisto MT"/>
-        <a:sym typeface="Calisto MT"/>
+        <a:latin typeface="Avenir Book"/>
+        <a:ea typeface="Avenir Book"/>
+        <a:cs typeface="Avenir Book"/>
+        <a:sym typeface="Avenir Book"/>
       </a:defRPr>
     </a:lvl5pPr>
-    <a:lvl6pPr indent="2286000">
+    <a:lvl6pPr>
       <a:defRPr>
-        <a:latin typeface="Calisto MT"/>
-        <a:ea typeface="Calisto MT"/>
-        <a:cs typeface="Calisto MT"/>
-        <a:sym typeface="Calisto MT"/>
+        <a:latin typeface="Avenir Book"/>
+        <a:ea typeface="Avenir Book"/>
+        <a:cs typeface="Avenir Book"/>
+        <a:sym typeface="Avenir Book"/>
       </a:defRPr>
     </a:lvl6pPr>
-    <a:lvl7pPr indent="2743200">
+    <a:lvl7pPr>
       <a:defRPr>
-        <a:latin typeface="Calisto MT"/>
-        <a:ea typeface="Calisto MT"/>
-        <a:cs typeface="Calisto MT"/>
-        <a:sym typeface="Calisto MT"/>
+        <a:latin typeface="Avenir Book"/>
+        <a:ea typeface="Avenir Book"/>
+        <a:cs typeface="Avenir Book"/>
+        <a:sym typeface="Avenir Book"/>
       </a:defRPr>
     </a:lvl7pPr>
-    <a:lvl8pPr indent="3200400">
+    <a:lvl8pPr>
       <a:defRPr>
-        <a:latin typeface="Calisto MT"/>
-        <a:ea typeface="Calisto MT"/>
-        <a:cs typeface="Calisto MT"/>
-        <a:sym typeface="Calisto MT"/>
+        <a:latin typeface="Avenir Book"/>
+        <a:ea typeface="Avenir Book"/>
+        <a:cs typeface="Avenir Book"/>
+        <a:sym typeface="Avenir Book"/>
       </a:defRPr>
     </a:lvl8pPr>
-    <a:lvl9pPr indent="3657600">
+    <a:lvl9pPr>
       <a:defRPr>
-        <a:latin typeface="Calisto MT"/>
-        <a:ea typeface="Calisto MT"/>
-        <a:cs typeface="Calisto MT"/>
-        <a:sym typeface="Calisto MT"/>
+        <a:latin typeface="Avenir Book"/>
+        <a:ea typeface="Avenir Book"/>
+        <a:cs typeface="Avenir Book"/>
+        <a:sym typeface="Avenir Book"/>
       </a:defRPr>
     </a:lvl9pPr>
   </p:defaultTextStyle>
@@ -178,101 +179,101 @@
   <p:notesStyle>
     <a:lvl1pPr defTabSz="457200">
       <a:lnSpc>
-        <a:spcPct val="125000"/>
+        <a:spcPct val="117999"/>
       </a:lnSpc>
-      <a:defRPr sz="2400">
-        <a:latin typeface="+mn-lt"/>
-        <a:ea typeface="+mn-ea"/>
-        <a:cs typeface="+mn-cs"/>
-        <a:sym typeface="Avenir Roman"/>
+      <a:defRPr sz="2200">
+        <a:latin typeface="+mj-lt"/>
+        <a:ea typeface="+mj-ea"/>
+        <a:cs typeface="+mj-cs"/>
+        <a:sym typeface="Helvetica Neue"/>
       </a:defRPr>
     </a:lvl1pPr>
     <a:lvl2pPr indent="228600" defTabSz="457200">
       <a:lnSpc>
-        <a:spcPct val="125000"/>
+        <a:spcPct val="117999"/>
       </a:lnSpc>
-      <a:defRPr sz="2400">
-        <a:latin typeface="+mn-lt"/>
-        <a:ea typeface="+mn-ea"/>
-        <a:cs typeface="+mn-cs"/>
-        <a:sym typeface="Avenir Roman"/>
+      <a:defRPr sz="2200">
+        <a:latin typeface="+mj-lt"/>
+        <a:ea typeface="+mj-ea"/>
+        <a:cs typeface="+mj-cs"/>
+        <a:sym typeface="Helvetica Neue"/>
       </a:defRPr>
     </a:lvl2pPr>
     <a:lvl3pPr indent="457200" defTabSz="457200">
       <a:lnSpc>
-        <a:spcPct val="125000"/>
+        <a:spcPct val="117999"/>
       </a:lnSpc>
-      <a:defRPr sz="2400">
-        <a:latin typeface="+mn-lt"/>
-        <a:ea typeface="+mn-ea"/>
-        <a:cs typeface="+mn-cs"/>
-        <a:sym typeface="Avenir Roman"/>
+      <a:defRPr sz="2200">
+        <a:latin typeface="+mj-lt"/>
+        <a:ea typeface="+mj-ea"/>
+        <a:cs typeface="+mj-cs"/>
+        <a:sym typeface="Helvetica Neue"/>
       </a:defRPr>
     </a:lvl3pPr>
     <a:lvl4pPr indent="685800" defTabSz="457200">
       <a:lnSpc>
-        <a:spcPct val="125000"/>
+        <a:spcPct val="117999"/>
       </a:lnSpc>
-      <a:defRPr sz="2400">
-        <a:latin typeface="+mn-lt"/>
-        <a:ea typeface="+mn-ea"/>
-        <a:cs typeface="+mn-cs"/>
-        <a:sym typeface="Avenir Roman"/>
+      <a:defRPr sz="2200">
+        <a:latin typeface="+mj-lt"/>
+        <a:ea typeface="+mj-ea"/>
+        <a:cs typeface="+mj-cs"/>
+        <a:sym typeface="Helvetica Neue"/>
       </a:defRPr>
     </a:lvl4pPr>
     <a:lvl5pPr indent="914400" defTabSz="457200">
       <a:lnSpc>
-        <a:spcPct val="125000"/>
+        <a:spcPct val="117999"/>
       </a:lnSpc>
-      <a:defRPr sz="2400">
-        <a:latin typeface="+mn-lt"/>
-        <a:ea typeface="+mn-ea"/>
-        <a:cs typeface="+mn-cs"/>
-        <a:sym typeface="Avenir Roman"/>
+      <a:defRPr sz="2200">
+        <a:latin typeface="+mj-lt"/>
+        <a:ea typeface="+mj-ea"/>
+        <a:cs typeface="+mj-cs"/>
+        <a:sym typeface="Helvetica Neue"/>
       </a:defRPr>
     </a:lvl5pPr>
     <a:lvl6pPr indent="1143000" defTabSz="457200">
       <a:lnSpc>
-        <a:spcPct val="125000"/>
+        <a:spcPct val="117999"/>
       </a:lnSpc>
-      <a:defRPr sz="2400">
-        <a:latin typeface="+mn-lt"/>
-        <a:ea typeface="+mn-ea"/>
-        <a:cs typeface="+mn-cs"/>
-        <a:sym typeface="Avenir Roman"/>
+      <a:defRPr sz="2200">
+        <a:latin typeface="+mj-lt"/>
+        <a:ea typeface="+mj-ea"/>
+        <a:cs typeface="+mj-cs"/>
+        <a:sym typeface="Helvetica Neue"/>
       </a:defRPr>
     </a:lvl6pPr>
     <a:lvl7pPr indent="1371600" defTabSz="457200">
       <a:lnSpc>
-        <a:spcPct val="125000"/>
+        <a:spcPct val="117999"/>
       </a:lnSpc>
-      <a:defRPr sz="2400">
-        <a:latin typeface="+mn-lt"/>
-        <a:ea typeface="+mn-ea"/>
-        <a:cs typeface="+mn-cs"/>
-        <a:sym typeface="Avenir Roman"/>
+      <a:defRPr sz="2200">
+        <a:latin typeface="+mj-lt"/>
+        <a:ea typeface="+mj-ea"/>
+        <a:cs typeface="+mj-cs"/>
+        <a:sym typeface="Helvetica Neue"/>
       </a:defRPr>
     </a:lvl7pPr>
     <a:lvl8pPr indent="1600200" defTabSz="457200">
       <a:lnSpc>
-        <a:spcPct val="125000"/>
+        <a:spcPct val="117999"/>
       </a:lnSpc>
-      <a:defRPr sz="2400">
-        <a:latin typeface="+mn-lt"/>
-        <a:ea typeface="+mn-ea"/>
-        <a:cs typeface="+mn-cs"/>
-        <a:sym typeface="Avenir Roman"/>
+      <a:defRPr sz="2200">
+        <a:latin typeface="+mj-lt"/>
+        <a:ea typeface="+mj-ea"/>
+        <a:cs typeface="+mj-cs"/>
+        <a:sym typeface="Helvetica Neue"/>
       </a:defRPr>
     </a:lvl8pPr>
     <a:lvl9pPr indent="1828800" defTabSz="457200">
       <a:lnSpc>
-        <a:spcPct val="125000"/>
+        <a:spcPct val="117999"/>
       </a:lnSpc>
-      <a:defRPr sz="2400">
-        <a:latin typeface="+mn-lt"/>
-        <a:ea typeface="+mn-ea"/>
-        <a:cs typeface="+mn-cs"/>
-        <a:sym typeface="Avenir Roman"/>
+      <a:defRPr sz="2200">
+        <a:latin typeface="+mj-lt"/>
+        <a:ea typeface="+mj-ea"/>
+        <a:cs typeface="+mj-cs"/>
+        <a:sym typeface="Helvetica Neue"/>
       </a:defRPr>
     </a:lvl9pPr>
   </p:notesStyle>
@@ -335,49 +336,329 @@
           <a:lstStyle/>
           <a:p>
             <a:pPr lvl="0">
-              <a:defRPr sz="1800"/>
-            </a:pPr>
-            <a:r>
-              <a:rPr sz="1400"/>
-              <a:t>setContentView(R.layout.main)</a:t>
-            </a:r>
-            <a:endParaRPr sz="1400"/>
+              <a:lnSpc>
+                <a:spcPct val="125000"/>
+              </a:lnSpc>
+              <a:defRPr sz="1800"/>
+            </a:pPr>
+            <a:r>
+              <a:rPr sz="1500">
+                <a:latin typeface="Avenir Book"/>
+                <a:ea typeface="Avenir Book"/>
+                <a:cs typeface="Avenir Book"/>
+                <a:sym typeface="Avenir Book"/>
+              </a:rPr>
+              <a:t>Android Studio projects contain a top-level build file and a build file for each module. The build files are called build.gradle, and they are plain text files that use Groovy syntax to configure the build with the elements provided by the Android plugin for Gradle. In most cases, you only need to edit the build files at the module level.</a:t>
+            </a:r>
+            <a:endParaRPr sz="1500">
+              <a:latin typeface="Avenir Book"/>
+              <a:ea typeface="Avenir Book"/>
+              <a:cs typeface="Avenir Book"/>
+              <a:sym typeface="Avenir Book"/>
+            </a:endParaRPr>
           </a:p>
           <a:p>
             <a:pPr lvl="0">
-              <a:defRPr sz="1800"/>
-            </a:pPr>
-            <a:r>
-              <a:rPr sz="1400"/>
-              <a:t>is pointing out that there is static class by the name of "layout" and there is a constant in there called "main" (an integer) pointing to a "View" defined by an xml file. This statement would expect the following file to be there</a:t>
-            </a:r>
-            <a:endParaRPr sz="1400"/>
+              <a:lnSpc>
+                <a:spcPct val="125000"/>
+              </a:lnSpc>
+              <a:defRPr sz="1800"/>
+            </a:pPr>
+            <a:r>
+              <a:rPr sz="1500">
+                <a:latin typeface="Avenir Book"/>
+                <a:ea typeface="Avenir Book"/>
+                <a:cs typeface="Avenir Book"/>
+                <a:sym typeface="Avenir Book"/>
+              </a:rPr>
+              <a:t>apply plugin: 'com.android.application' applies the Android plugin for Gradle to this build. </a:t>
+            </a:r>
+            <a:endParaRPr sz="1500">
+              <a:latin typeface="Avenir Book"/>
+              <a:ea typeface="Avenir Book"/>
+              <a:cs typeface="Avenir Book"/>
+              <a:sym typeface="Avenir Book"/>
+            </a:endParaRPr>
           </a:p>
           <a:p>
             <a:pPr lvl="0">
-              <a:defRPr sz="1800"/>
-            </a:pPr>
-            <a:r>
-              <a:rPr sz="1400"/>
-              <a:t>"/res/layout/main.xml”</a:t>
-            </a:r>
-            <a:endParaRPr sz="1400"/>
+              <a:lnSpc>
+                <a:spcPct val="125000"/>
+              </a:lnSpc>
+              <a:defRPr sz="1800"/>
+            </a:pPr>
+            <a:endParaRPr sz="1500">
+              <a:latin typeface="Avenir Book"/>
+              <a:ea typeface="Avenir Book"/>
+              <a:cs typeface="Avenir Book"/>
+              <a:sym typeface="Avenir Book"/>
+            </a:endParaRPr>
           </a:p>
           <a:p>
             <a:pPr lvl="0">
-              <a:defRPr sz="1800"/>
-            </a:pPr>
-            <a:endParaRPr sz="1400"/>
+              <a:lnSpc>
+                <a:spcPct val="125000"/>
+              </a:lnSpc>
+              <a:defRPr sz="1800"/>
+            </a:pPr>
+            <a:r>
+              <a:rPr sz="1500">
+                <a:latin typeface="Avenir Book"/>
+                <a:ea typeface="Avenir Book"/>
+                <a:cs typeface="Avenir Book"/>
+                <a:sym typeface="Avenir Book"/>
+              </a:rPr>
+              <a:t>android {...} configures all the Android-specific build options:</a:t>
+            </a:r>
+            <a:endParaRPr sz="1500">
+              <a:latin typeface="Avenir Book"/>
+              <a:ea typeface="Avenir Book"/>
+              <a:cs typeface="Avenir Book"/>
+              <a:sym typeface="Avenir Book"/>
+            </a:endParaRPr>
           </a:p>
           <a:p>
             <a:pPr lvl="0">
-              <a:defRPr sz="1800"/>
-            </a:pPr>
-            <a:r>
-              <a:rPr sz="1400"/>
-              <a:t>The constant R.id.text1 corresponds to the id defined for the TextView. and it has to be unique in the view hierarchy for the layout.</a:t>
-            </a:r>
-            <a:endParaRPr sz="1400"/>
+              <a:lnSpc>
+                <a:spcPct val="125000"/>
+              </a:lnSpc>
+              <a:defRPr sz="1800"/>
+            </a:pPr>
+            <a:endParaRPr sz="1500">
+              <a:latin typeface="Avenir Book"/>
+              <a:ea typeface="Avenir Book"/>
+              <a:cs typeface="Avenir Book"/>
+              <a:sym typeface="Avenir Book"/>
+            </a:endParaRPr>
+          </a:p>
+          <a:p>
+            <a:pPr lvl="0">
+              <a:lnSpc>
+                <a:spcPct val="125000"/>
+              </a:lnSpc>
+              <a:defRPr sz="1800"/>
+            </a:pPr>
+            <a:r>
+              <a:rPr sz="1500">
+                <a:latin typeface="Avenir Book"/>
+                <a:ea typeface="Avenir Book"/>
+                <a:cs typeface="Avenir Book"/>
+                <a:sym typeface="Avenir Book"/>
+              </a:rPr>
+              <a:t>The compileSdkVersion property specifies the compilation target.</a:t>
+            </a:r>
+            <a:endParaRPr sz="1500">
+              <a:latin typeface="Avenir Book"/>
+              <a:ea typeface="Avenir Book"/>
+              <a:cs typeface="Avenir Book"/>
+              <a:sym typeface="Avenir Book"/>
+            </a:endParaRPr>
+          </a:p>
+          <a:p>
+            <a:pPr lvl="0">
+              <a:lnSpc>
+                <a:spcPct val="125000"/>
+              </a:lnSpc>
+              <a:defRPr sz="1800"/>
+            </a:pPr>
+            <a:r>
+              <a:rPr sz="1500">
+                <a:latin typeface="Avenir Book"/>
+                <a:ea typeface="Avenir Book"/>
+                <a:cs typeface="Avenir Book"/>
+                <a:sym typeface="Avenir Book"/>
+              </a:rPr>
+              <a:t>The buildToolsVersion property specifies what version of the build tools to use. To install several versions of the build tools, use the SDK Manager.</a:t>
+            </a:r>
+            <a:endParaRPr sz="1500">
+              <a:latin typeface="Avenir Book"/>
+              <a:ea typeface="Avenir Book"/>
+              <a:cs typeface="Avenir Book"/>
+              <a:sym typeface="Avenir Book"/>
+            </a:endParaRPr>
+          </a:p>
+          <a:p>
+            <a:pPr lvl="0">
+              <a:lnSpc>
+                <a:spcPct val="125000"/>
+              </a:lnSpc>
+              <a:defRPr sz="1800"/>
+            </a:pPr>
+            <a:r>
+              <a:rPr sz="1500">
+                <a:latin typeface="Avenir Book"/>
+                <a:ea typeface="Avenir Book"/>
+                <a:cs typeface="Avenir Book"/>
+                <a:sym typeface="Avenir Book"/>
+              </a:rPr>
+              <a:t>Note: Always use a build tools version whose major revision number is higher or equal to that of your compilation target and target SDK.</a:t>
+            </a:r>
+            <a:endParaRPr sz="1500">
+              <a:latin typeface="Avenir Book"/>
+              <a:ea typeface="Avenir Book"/>
+              <a:cs typeface="Avenir Book"/>
+              <a:sym typeface="Avenir Book"/>
+            </a:endParaRPr>
+          </a:p>
+          <a:p>
+            <a:pPr lvl="0">
+              <a:lnSpc>
+                <a:spcPct val="125000"/>
+              </a:lnSpc>
+              <a:defRPr sz="1800"/>
+            </a:pPr>
+            <a:r>
+              <a:rPr sz="1500">
+                <a:latin typeface="Avenir Book"/>
+                <a:ea typeface="Avenir Book"/>
+                <a:cs typeface="Avenir Book"/>
+                <a:sym typeface="Avenir Book"/>
+              </a:rPr>
+              <a:t>The defaultConfig element configures core settings and entries in the manifest file (AndroidManifest.xml) dynamically from the build system. The values in defaultConfig override those in the manifest file.</a:t>
+            </a:r>
+            <a:endParaRPr sz="1500">
+              <a:latin typeface="Avenir Book"/>
+              <a:ea typeface="Avenir Book"/>
+              <a:cs typeface="Avenir Book"/>
+              <a:sym typeface="Avenir Book"/>
+            </a:endParaRPr>
+          </a:p>
+          <a:p>
+            <a:pPr lvl="0">
+              <a:lnSpc>
+                <a:spcPct val="125000"/>
+              </a:lnSpc>
+              <a:defRPr sz="1800"/>
+            </a:pPr>
+            <a:endParaRPr sz="1500">
+              <a:latin typeface="Avenir Book"/>
+              <a:ea typeface="Avenir Book"/>
+              <a:cs typeface="Avenir Book"/>
+              <a:sym typeface="Avenir Book"/>
+            </a:endParaRPr>
+          </a:p>
+          <a:p>
+            <a:pPr lvl="0">
+              <a:lnSpc>
+                <a:spcPct val="125000"/>
+              </a:lnSpc>
+              <a:defRPr sz="1800"/>
+            </a:pPr>
+            <a:r>
+              <a:rPr sz="1500">
+                <a:latin typeface="Avenir Book"/>
+                <a:ea typeface="Avenir Book"/>
+                <a:cs typeface="Avenir Book"/>
+                <a:sym typeface="Avenir Book"/>
+              </a:rPr>
+              <a:t>The buildTypes element controls how to build and package your app. By default, the build system defines two build types: debug and release. The debug build type includes debugging symbols and is signed with the debug key. The release build type is not signed by default.</a:t>
+            </a:r>
+            <a:endParaRPr sz="1500">
+              <a:latin typeface="Avenir Book"/>
+              <a:ea typeface="Avenir Book"/>
+              <a:cs typeface="Avenir Book"/>
+              <a:sym typeface="Avenir Book"/>
+            </a:endParaRPr>
+          </a:p>
+          <a:p>
+            <a:pPr lvl="0">
+              <a:lnSpc>
+                <a:spcPct val="125000"/>
+              </a:lnSpc>
+              <a:defRPr sz="1800"/>
+            </a:pPr>
+            <a:r>
+              <a:rPr sz="1500">
+                <a:latin typeface="Avenir Book"/>
+                <a:ea typeface="Avenir Book"/>
+                <a:cs typeface="Avenir Book"/>
+                <a:sym typeface="Avenir Book"/>
+              </a:rPr>
+              <a:t>The dependencies element is outside and after the android element. This element declares the dependencies for this module. </a:t>
+            </a:r>
+            <a:endParaRPr sz="1500">
+              <a:latin typeface="Avenir Book"/>
+              <a:ea typeface="Avenir Book"/>
+              <a:cs typeface="Avenir Book"/>
+              <a:sym typeface="Avenir Book"/>
+            </a:endParaRPr>
+          </a:p>
+          <a:p>
+            <a:pPr lvl="0">
+              <a:lnSpc>
+                <a:spcPct val="125000"/>
+              </a:lnSpc>
+              <a:defRPr sz="1800"/>
+            </a:pPr>
+            <a:endParaRPr sz="1500">
+              <a:latin typeface="Avenir Book"/>
+              <a:ea typeface="Avenir Book"/>
+              <a:cs typeface="Avenir Book"/>
+              <a:sym typeface="Avenir Book"/>
+            </a:endParaRPr>
+          </a:p>
+          <a:p>
+            <a:pPr lvl="0">
+              <a:lnSpc>
+                <a:spcPct val="125000"/>
+              </a:lnSpc>
+              <a:defRPr sz="1800"/>
+            </a:pPr>
+            <a:r>
+              <a:rPr sz="1500">
+                <a:latin typeface="Avenir Book"/>
+                <a:ea typeface="Avenir Book"/>
+                <a:cs typeface="Avenir Book"/>
+                <a:sym typeface="Avenir Book"/>
+              </a:rPr>
+              <a:t>The content of settings.gradle is very simple:</a:t>
+            </a:r>
+            <a:endParaRPr sz="1500">
+              <a:latin typeface="Avenir Book"/>
+              <a:ea typeface="Avenir Book"/>
+              <a:cs typeface="Avenir Book"/>
+              <a:sym typeface="Avenir Book"/>
+            </a:endParaRPr>
+          </a:p>
+          <a:p>
+            <a:pPr lvl="0">
+              <a:lnSpc>
+                <a:spcPct val="125000"/>
+              </a:lnSpc>
+              <a:defRPr sz="1800"/>
+            </a:pPr>
+            <a:r>
+              <a:rPr sz="1500">
+                <a:latin typeface="Avenir Book"/>
+                <a:ea typeface="Avenir Book"/>
+                <a:cs typeface="Avenir Book"/>
+                <a:sym typeface="Avenir Book"/>
+              </a:rPr>
+              <a:t>include ':app', ':libraries:lib1', ':libraries:lib2'</a:t>
+            </a:r>
+            <a:endParaRPr sz="1500">
+              <a:latin typeface="Avenir Book"/>
+              <a:ea typeface="Avenir Book"/>
+              <a:cs typeface="Avenir Book"/>
+              <a:sym typeface="Avenir Book"/>
+            </a:endParaRPr>
+          </a:p>
+          <a:p>
+            <a:pPr lvl="0">
+              <a:lnSpc>
+                <a:spcPct val="125000"/>
+              </a:lnSpc>
+              <a:defRPr sz="1800"/>
+            </a:pPr>
+            <a:r>
+              <a:rPr sz="1500">
+                <a:latin typeface="Avenir Book"/>
+                <a:ea typeface="Avenir Book"/>
+                <a:cs typeface="Avenir Book"/>
+                <a:sym typeface="Avenir Book"/>
+              </a:rPr>
+              <a:t>This defines which folder is actually a Gradle project.</a:t>
+            </a:r>
           </a:p>
         </p:txBody>
       </p:sp>
@@ -408,7 +689,7 @@
       </p:grpSpPr>
       <p:sp>
         <p:nvSpPr>
-          <p:cNvPr id="128" name="Shape 128"/>
+          <p:cNvPr id="125" name="Shape 125"/>
           <p:cNvSpPr/>
           <p:nvPr>
             <p:ph type="sldImg"/>
@@ -429,7 +710,7 @@
       </p:sp>
       <p:sp>
         <p:nvSpPr>
-          <p:cNvPr id="129" name="Shape 129"/>
+          <p:cNvPr id="126" name="Shape 126"/>
           <p:cNvSpPr/>
           <p:nvPr>
             <p:ph type="body" sz="quarter" idx="1"/>
@@ -445,23 +726,103 @@
           <a:lstStyle/>
           <a:p>
             <a:pPr lvl="0">
-              <a:defRPr sz="1800"/>
-            </a:pPr>
-            <a:r>
-              <a:rPr sz="1500"/>
-              <a:t>It is basically a data structure holding an description of an action to be performed.</a:t>
-            </a:r>
-            <a:endParaRPr sz="1500"/>
+              <a:lnSpc>
+                <a:spcPct val="125000"/>
+              </a:lnSpc>
+              <a:defRPr sz="1800"/>
+            </a:pPr>
+            <a:r>
+              <a:rPr sz="1400">
+                <a:latin typeface="Avenir Book"/>
+                <a:ea typeface="Avenir Book"/>
+                <a:cs typeface="Avenir Book"/>
+                <a:sym typeface="Avenir Book"/>
+              </a:rPr>
+              <a:t>setContentView(R.layout.main)</a:t>
+            </a:r>
+            <a:endParaRPr sz="1400">
+              <a:latin typeface="Avenir Book"/>
+              <a:ea typeface="Avenir Book"/>
+              <a:cs typeface="Avenir Book"/>
+              <a:sym typeface="Avenir Book"/>
+            </a:endParaRPr>
           </a:p>
           <a:p>
             <a:pPr lvl="0">
-              <a:defRPr sz="1800"/>
-            </a:pPr>
-            <a:r>
-              <a:rPr sz="1500"/>
-              <a:t>An Intent is a messaging object you can use to request an action from another app component. </a:t>
-            </a:r>
-            <a:endParaRPr sz="1500"/>
+              <a:lnSpc>
+                <a:spcPct val="125000"/>
+              </a:lnSpc>
+              <a:defRPr sz="1800"/>
+            </a:pPr>
+            <a:r>
+              <a:rPr sz="1400">
+                <a:latin typeface="Avenir Book"/>
+                <a:ea typeface="Avenir Book"/>
+                <a:cs typeface="Avenir Book"/>
+                <a:sym typeface="Avenir Book"/>
+              </a:rPr>
+              <a:t>is pointing out that there is static class by the name of "layout" and there is a constant in there called "main" (an integer) pointing to a "View" defined by an xml file. This statement would expect the following file to be there</a:t>
+            </a:r>
+            <a:endParaRPr sz="1400">
+              <a:latin typeface="Avenir Book"/>
+              <a:ea typeface="Avenir Book"/>
+              <a:cs typeface="Avenir Book"/>
+              <a:sym typeface="Avenir Book"/>
+            </a:endParaRPr>
+          </a:p>
+          <a:p>
+            <a:pPr lvl="0">
+              <a:lnSpc>
+                <a:spcPct val="125000"/>
+              </a:lnSpc>
+              <a:defRPr sz="1800"/>
+            </a:pPr>
+            <a:r>
+              <a:rPr sz="1400">
+                <a:latin typeface="Avenir Book"/>
+                <a:ea typeface="Avenir Book"/>
+                <a:cs typeface="Avenir Book"/>
+                <a:sym typeface="Avenir Book"/>
+              </a:rPr>
+              <a:t>"/res/layout/main.xml”</a:t>
+            </a:r>
+            <a:endParaRPr sz="1400">
+              <a:latin typeface="Avenir Book"/>
+              <a:ea typeface="Avenir Book"/>
+              <a:cs typeface="Avenir Book"/>
+              <a:sym typeface="Avenir Book"/>
+            </a:endParaRPr>
+          </a:p>
+          <a:p>
+            <a:pPr lvl="0">
+              <a:lnSpc>
+                <a:spcPct val="125000"/>
+              </a:lnSpc>
+              <a:defRPr sz="1800"/>
+            </a:pPr>
+            <a:endParaRPr sz="1400">
+              <a:latin typeface="Avenir Book"/>
+              <a:ea typeface="Avenir Book"/>
+              <a:cs typeface="Avenir Book"/>
+              <a:sym typeface="Avenir Book"/>
+            </a:endParaRPr>
+          </a:p>
+          <a:p>
+            <a:pPr lvl="0">
+              <a:lnSpc>
+                <a:spcPct val="125000"/>
+              </a:lnSpc>
+              <a:defRPr sz="1800"/>
+            </a:pPr>
+            <a:r>
+              <a:rPr sz="1400">
+                <a:latin typeface="Avenir Book"/>
+                <a:ea typeface="Avenir Book"/>
+                <a:cs typeface="Avenir Book"/>
+                <a:sym typeface="Avenir Book"/>
+              </a:rPr>
+              <a:t>The constant R.id.text1 corresponds to the id defined for the TextView. and it has to be unique in the view hierarchy for the layout.</a:t>
+            </a:r>
           </a:p>
         </p:txBody>
       </p:sp>
@@ -529,23 +890,43 @@
           <a:lstStyle/>
           <a:p>
             <a:pPr lvl="0">
-              <a:defRPr sz="1800"/>
-            </a:pPr>
-            <a:r>
-              <a:rPr sz="2400"/>
-              <a:t>To start an activity:</a:t>
-            </a:r>
-            <a:endParaRPr sz="2400"/>
+              <a:lnSpc>
+                <a:spcPct val="125000"/>
+              </a:lnSpc>
+              <a:defRPr sz="1800"/>
+            </a:pPr>
+            <a:r>
+              <a:rPr sz="1500">
+                <a:latin typeface="Avenir Book"/>
+                <a:ea typeface="Avenir Book"/>
+                <a:cs typeface="Avenir Book"/>
+                <a:sym typeface="Avenir Book"/>
+              </a:rPr>
+              <a:t>It is basically a data structure holding an description of an action to be performed.</a:t>
+            </a:r>
+            <a:endParaRPr sz="1500">
+              <a:latin typeface="Avenir Book"/>
+              <a:ea typeface="Avenir Book"/>
+              <a:cs typeface="Avenir Book"/>
+              <a:sym typeface="Avenir Book"/>
+            </a:endParaRPr>
           </a:p>
           <a:p>
             <a:pPr lvl="0">
-              <a:defRPr sz="1800"/>
-            </a:pPr>
-            <a:r>
-              <a:rPr sz="2400"/>
-              <a:t>You can start a new instance of an Activity by passing an Intent tostartActivity(). The Intent describes the activity to start and carries any necessary data.</a:t>
-            </a:r>
-            <a:endParaRPr sz="2400"/>
+              <a:lnSpc>
+                <a:spcPct val="125000"/>
+              </a:lnSpc>
+              <a:defRPr sz="1800"/>
+            </a:pPr>
+            <a:r>
+              <a:rPr sz="1500">
+                <a:latin typeface="Avenir Book"/>
+                <a:ea typeface="Avenir Book"/>
+                <a:cs typeface="Avenir Book"/>
+                <a:sym typeface="Avenir Book"/>
+              </a:rPr>
+              <a:t>An Intent is a messaging object you can use to request an action from another app component. </a:t>
+            </a:r>
           </a:p>
         </p:txBody>
       </p:sp>
@@ -576,7 +957,7 @@
       </p:grpSpPr>
       <p:sp>
         <p:nvSpPr>
-          <p:cNvPr id="144" name="Shape 144"/>
+          <p:cNvPr id="138" name="Shape 138"/>
           <p:cNvSpPr/>
           <p:nvPr>
             <p:ph type="sldImg"/>
@@ -597,7 +978,7 @@
       </p:sp>
       <p:sp>
         <p:nvSpPr>
-          <p:cNvPr id="145" name="Shape 145"/>
+          <p:cNvPr id="139" name="Shape 139"/>
           <p:cNvSpPr/>
           <p:nvPr>
             <p:ph type="body" sz="quarter" idx="1"/>
@@ -613,144 +994,431 @@
           <a:lstStyle/>
           <a:p>
             <a:pPr lvl="0">
-              <a:defRPr sz="1800"/>
-            </a:pPr>
-            <a:r>
-              <a:rPr sz="1500"/>
+              <a:lnSpc>
+                <a:spcPct val="125000"/>
+              </a:lnSpc>
+              <a:defRPr sz="1800"/>
+            </a:pPr>
+            <a:r>
+              <a:rPr sz="2400">
+                <a:latin typeface="Avenir Book"/>
+                <a:ea typeface="Avenir Book"/>
+                <a:cs typeface="Avenir Book"/>
+                <a:sym typeface="Avenir Book"/>
+              </a:rPr>
+              <a:t>To start an activity:</a:t>
+            </a:r>
+            <a:endParaRPr sz="2400">
+              <a:latin typeface="Avenir Book"/>
+              <a:ea typeface="Avenir Book"/>
+              <a:cs typeface="Avenir Book"/>
+              <a:sym typeface="Avenir Book"/>
+            </a:endParaRPr>
+          </a:p>
+          <a:p>
+            <a:pPr lvl="0">
+              <a:lnSpc>
+                <a:spcPct val="125000"/>
+              </a:lnSpc>
+              <a:defRPr sz="1800"/>
+            </a:pPr>
+            <a:r>
+              <a:rPr sz="2400">
+                <a:latin typeface="Avenir Book"/>
+                <a:ea typeface="Avenir Book"/>
+                <a:cs typeface="Avenir Book"/>
+                <a:sym typeface="Avenir Book"/>
+              </a:rPr>
+              <a:t>You can start a new instance of an Activity by passing an Intent tostartActivity(). The Intent describes the activity to start and carries any necessary data.</a:t>
+            </a:r>
+          </a:p>
+        </p:txBody>
+      </p:sp>
+    </p:spTree>
+  </p:cSld>
+  <p:clrMapOvr>
+    <a:masterClrMapping/>
+  </p:clrMapOvr>
+</p:notes>
+</file>
+
+<file path=ppt/notesSlides/notesSlide5.xml><?xml version="1.0" encoding="utf-8"?>
+<p:notes xmlns:a="http://schemas.openxmlformats.org/drawingml/2006/main" xmlns:r="http://schemas.openxmlformats.org/officeDocument/2006/relationships" xmlns:p="http://schemas.openxmlformats.org/presentationml/2006/main" showMasterSp="1" showMasterPhAnim="1">
+  <p:cSld>
+    <p:spTree>
+      <p:nvGrpSpPr>
+        <p:cNvPr id="1" name=""/>
+        <p:cNvGrpSpPr/>
+        <p:nvPr/>
+      </p:nvGrpSpPr>
+      <p:grpSpPr>
+        <a:xfrm>
+          <a:off x="0" y="0"/>
+          <a:ext cx="0" cy="0"/>
+          <a:chOff x="0" y="0"/>
+          <a:chExt cx="0" cy="0"/>
+        </a:xfrm>
+      </p:grpSpPr>
+      <p:sp>
+        <p:nvSpPr>
+          <p:cNvPr id="149" name="Shape 149"/>
+          <p:cNvSpPr/>
+          <p:nvPr>
+            <p:ph type="sldImg"/>
+          </p:nvPr>
+        </p:nvSpPr>
+        <p:spPr>
+          <a:prstGeom prst="rect">
+            <a:avLst/>
+          </a:prstGeom>
+        </p:spPr>
+        <p:txBody>
+          <a:bodyPr/>
+          <a:lstStyle/>
+          <a:p>
+            <a:pPr lvl="0"/>
+          </a:p>
+        </p:txBody>
+      </p:sp>
+      <p:sp>
+        <p:nvSpPr>
+          <p:cNvPr id="150" name="Shape 150"/>
+          <p:cNvSpPr/>
+          <p:nvPr>
+            <p:ph type="body" sz="quarter" idx="1"/>
+          </p:nvPr>
+        </p:nvSpPr>
+        <p:spPr>
+          <a:prstGeom prst="rect">
+            <a:avLst/>
+          </a:prstGeom>
+        </p:spPr>
+        <p:txBody>
+          <a:bodyPr/>
+          <a:lstStyle/>
+          <a:p>
+            <a:pPr lvl="0">
+              <a:lnSpc>
+                <a:spcPct val="125000"/>
+              </a:lnSpc>
+              <a:defRPr sz="1800"/>
+            </a:pPr>
+            <a:r>
+              <a:rPr sz="1500">
+                <a:latin typeface="Avenir Book"/>
+                <a:ea typeface="Avenir Book"/>
+                <a:cs typeface="Avenir Book"/>
+                <a:sym typeface="Avenir Book"/>
+              </a:rPr>
               <a:t>Android Studio projects contain a top-level build file and a build file for each module. The build files are called build.gradle, and they are plain text files that use Groovy syntax to configure the build with the elements provided by the Android plugin for Gradle. In most cases, you only need to edit the build files at the module level.</a:t>
             </a:r>
-            <a:endParaRPr sz="1500"/>
+            <a:endParaRPr sz="1500">
+              <a:latin typeface="Avenir Book"/>
+              <a:ea typeface="Avenir Book"/>
+              <a:cs typeface="Avenir Book"/>
+              <a:sym typeface="Avenir Book"/>
+            </a:endParaRPr>
           </a:p>
           <a:p>
             <a:pPr lvl="0">
-              <a:defRPr sz="1800"/>
-            </a:pPr>
-            <a:r>
-              <a:rPr sz="1500"/>
+              <a:lnSpc>
+                <a:spcPct val="125000"/>
+              </a:lnSpc>
+              <a:defRPr sz="1800"/>
+            </a:pPr>
+            <a:r>
+              <a:rPr sz="1500">
+                <a:latin typeface="Avenir Book"/>
+                <a:ea typeface="Avenir Book"/>
+                <a:cs typeface="Avenir Book"/>
+                <a:sym typeface="Avenir Book"/>
+              </a:rPr>
               <a:t>apply plugin: 'com.android.application' applies the Android plugin for Gradle to this build. </a:t>
             </a:r>
-            <a:endParaRPr sz="1500"/>
+            <a:endParaRPr sz="1500">
+              <a:latin typeface="Avenir Book"/>
+              <a:ea typeface="Avenir Book"/>
+              <a:cs typeface="Avenir Book"/>
+              <a:sym typeface="Avenir Book"/>
+            </a:endParaRPr>
           </a:p>
           <a:p>
             <a:pPr lvl="0">
-              <a:defRPr sz="1800"/>
-            </a:pPr>
-            <a:endParaRPr sz="1500"/>
+              <a:lnSpc>
+                <a:spcPct val="125000"/>
+              </a:lnSpc>
+              <a:defRPr sz="1800"/>
+            </a:pPr>
+            <a:endParaRPr sz="1500">
+              <a:latin typeface="Avenir Book"/>
+              <a:ea typeface="Avenir Book"/>
+              <a:cs typeface="Avenir Book"/>
+              <a:sym typeface="Avenir Book"/>
+            </a:endParaRPr>
           </a:p>
           <a:p>
             <a:pPr lvl="0">
-              <a:defRPr sz="1800"/>
-            </a:pPr>
-            <a:r>
-              <a:rPr sz="1500"/>
+              <a:lnSpc>
+                <a:spcPct val="125000"/>
+              </a:lnSpc>
+              <a:defRPr sz="1800"/>
+            </a:pPr>
+            <a:r>
+              <a:rPr sz="1500">
+                <a:latin typeface="Avenir Book"/>
+                <a:ea typeface="Avenir Book"/>
+                <a:cs typeface="Avenir Book"/>
+                <a:sym typeface="Avenir Book"/>
+              </a:rPr>
               <a:t>android {...} configures all the Android-specific build options:</a:t>
             </a:r>
-            <a:endParaRPr sz="1500"/>
+            <a:endParaRPr sz="1500">
+              <a:latin typeface="Avenir Book"/>
+              <a:ea typeface="Avenir Book"/>
+              <a:cs typeface="Avenir Book"/>
+              <a:sym typeface="Avenir Book"/>
+            </a:endParaRPr>
           </a:p>
           <a:p>
             <a:pPr lvl="0">
-              <a:defRPr sz="1800"/>
-            </a:pPr>
-            <a:endParaRPr sz="1500"/>
+              <a:lnSpc>
+                <a:spcPct val="125000"/>
+              </a:lnSpc>
+              <a:defRPr sz="1800"/>
+            </a:pPr>
+            <a:endParaRPr sz="1500">
+              <a:latin typeface="Avenir Book"/>
+              <a:ea typeface="Avenir Book"/>
+              <a:cs typeface="Avenir Book"/>
+              <a:sym typeface="Avenir Book"/>
+            </a:endParaRPr>
           </a:p>
           <a:p>
             <a:pPr lvl="0">
-              <a:defRPr sz="1800"/>
-            </a:pPr>
-            <a:r>
-              <a:rPr sz="1500"/>
+              <a:lnSpc>
+                <a:spcPct val="125000"/>
+              </a:lnSpc>
+              <a:defRPr sz="1800"/>
+            </a:pPr>
+            <a:r>
+              <a:rPr sz="1500">
+                <a:latin typeface="Avenir Book"/>
+                <a:ea typeface="Avenir Book"/>
+                <a:cs typeface="Avenir Book"/>
+                <a:sym typeface="Avenir Book"/>
+              </a:rPr>
               <a:t>The compileSdkVersion property specifies the compilation target.</a:t>
             </a:r>
-            <a:endParaRPr sz="1500"/>
+            <a:endParaRPr sz="1500">
+              <a:latin typeface="Avenir Book"/>
+              <a:ea typeface="Avenir Book"/>
+              <a:cs typeface="Avenir Book"/>
+              <a:sym typeface="Avenir Book"/>
+            </a:endParaRPr>
           </a:p>
           <a:p>
             <a:pPr lvl="0">
-              <a:defRPr sz="1800"/>
-            </a:pPr>
-            <a:r>
-              <a:rPr sz="1500"/>
+              <a:lnSpc>
+                <a:spcPct val="125000"/>
+              </a:lnSpc>
+              <a:defRPr sz="1800"/>
+            </a:pPr>
+            <a:r>
+              <a:rPr sz="1500">
+                <a:latin typeface="Avenir Book"/>
+                <a:ea typeface="Avenir Book"/>
+                <a:cs typeface="Avenir Book"/>
+                <a:sym typeface="Avenir Book"/>
+              </a:rPr>
               <a:t>The buildToolsVersion property specifies what version of the build tools to use. To install several versions of the build tools, use the SDK Manager.</a:t>
             </a:r>
-            <a:endParaRPr sz="1500"/>
+            <a:endParaRPr sz="1500">
+              <a:latin typeface="Avenir Book"/>
+              <a:ea typeface="Avenir Book"/>
+              <a:cs typeface="Avenir Book"/>
+              <a:sym typeface="Avenir Book"/>
+            </a:endParaRPr>
           </a:p>
           <a:p>
             <a:pPr lvl="0">
-              <a:defRPr sz="1800"/>
-            </a:pPr>
-            <a:r>
-              <a:rPr sz="1500"/>
+              <a:lnSpc>
+                <a:spcPct val="125000"/>
+              </a:lnSpc>
+              <a:defRPr sz="1800"/>
+            </a:pPr>
+            <a:r>
+              <a:rPr sz="1500">
+                <a:latin typeface="Avenir Book"/>
+                <a:ea typeface="Avenir Book"/>
+                <a:cs typeface="Avenir Book"/>
+                <a:sym typeface="Avenir Book"/>
+              </a:rPr>
               <a:t>Note: Always use a build tools version whose major revision number is higher or equal to that of your compilation target and target SDK.</a:t>
             </a:r>
-            <a:endParaRPr sz="1500"/>
+            <a:endParaRPr sz="1500">
+              <a:latin typeface="Avenir Book"/>
+              <a:ea typeface="Avenir Book"/>
+              <a:cs typeface="Avenir Book"/>
+              <a:sym typeface="Avenir Book"/>
+            </a:endParaRPr>
           </a:p>
           <a:p>
             <a:pPr lvl="0">
-              <a:defRPr sz="1800"/>
-            </a:pPr>
-            <a:r>
-              <a:rPr sz="1500"/>
+              <a:lnSpc>
+                <a:spcPct val="125000"/>
+              </a:lnSpc>
+              <a:defRPr sz="1800"/>
+            </a:pPr>
+            <a:r>
+              <a:rPr sz="1500">
+                <a:latin typeface="Avenir Book"/>
+                <a:ea typeface="Avenir Book"/>
+                <a:cs typeface="Avenir Book"/>
+                <a:sym typeface="Avenir Book"/>
+              </a:rPr>
               <a:t>The defaultConfig element configures core settings and entries in the manifest file (AndroidManifest.xml) dynamically from the build system. The values in defaultConfig override those in the manifest file.</a:t>
             </a:r>
-            <a:endParaRPr sz="1500"/>
+            <a:endParaRPr sz="1500">
+              <a:latin typeface="Avenir Book"/>
+              <a:ea typeface="Avenir Book"/>
+              <a:cs typeface="Avenir Book"/>
+              <a:sym typeface="Avenir Book"/>
+            </a:endParaRPr>
           </a:p>
           <a:p>
             <a:pPr lvl="0">
-              <a:defRPr sz="1800"/>
-            </a:pPr>
-            <a:endParaRPr sz="1500"/>
+              <a:lnSpc>
+                <a:spcPct val="125000"/>
+              </a:lnSpc>
+              <a:defRPr sz="1800"/>
+            </a:pPr>
+            <a:endParaRPr sz="1500">
+              <a:latin typeface="Avenir Book"/>
+              <a:ea typeface="Avenir Book"/>
+              <a:cs typeface="Avenir Book"/>
+              <a:sym typeface="Avenir Book"/>
+            </a:endParaRPr>
           </a:p>
           <a:p>
             <a:pPr lvl="0">
-              <a:defRPr sz="1800"/>
-            </a:pPr>
-            <a:r>
-              <a:rPr sz="1500"/>
+              <a:lnSpc>
+                <a:spcPct val="125000"/>
+              </a:lnSpc>
+              <a:defRPr sz="1800"/>
+            </a:pPr>
+            <a:r>
+              <a:rPr sz="1500">
+                <a:latin typeface="Avenir Book"/>
+                <a:ea typeface="Avenir Book"/>
+                <a:cs typeface="Avenir Book"/>
+                <a:sym typeface="Avenir Book"/>
+              </a:rPr>
               <a:t>The buildTypes element controls how to build and package your app. By default, the build system defines two build types: debug and release. The debug build type includes debugging symbols and is signed with the debug key. The release build type is not signed by default.</a:t>
             </a:r>
-            <a:endParaRPr sz="1500"/>
+            <a:endParaRPr sz="1500">
+              <a:latin typeface="Avenir Book"/>
+              <a:ea typeface="Avenir Book"/>
+              <a:cs typeface="Avenir Book"/>
+              <a:sym typeface="Avenir Book"/>
+            </a:endParaRPr>
           </a:p>
           <a:p>
             <a:pPr lvl="0">
-              <a:defRPr sz="1800"/>
-            </a:pPr>
-            <a:r>
-              <a:rPr sz="1500"/>
+              <a:lnSpc>
+                <a:spcPct val="125000"/>
+              </a:lnSpc>
+              <a:defRPr sz="1800"/>
+            </a:pPr>
+            <a:r>
+              <a:rPr sz="1500">
+                <a:latin typeface="Avenir Book"/>
+                <a:ea typeface="Avenir Book"/>
+                <a:cs typeface="Avenir Book"/>
+                <a:sym typeface="Avenir Book"/>
+              </a:rPr>
               <a:t>The dependencies element is outside and after the android element. This element declares the dependencies for this module. </a:t>
             </a:r>
-            <a:endParaRPr sz="1500"/>
+            <a:endParaRPr sz="1500">
+              <a:latin typeface="Avenir Book"/>
+              <a:ea typeface="Avenir Book"/>
+              <a:cs typeface="Avenir Book"/>
+              <a:sym typeface="Avenir Book"/>
+            </a:endParaRPr>
           </a:p>
           <a:p>
             <a:pPr lvl="0">
-              <a:defRPr sz="1800"/>
-            </a:pPr>
-            <a:endParaRPr sz="1500"/>
+              <a:lnSpc>
+                <a:spcPct val="125000"/>
+              </a:lnSpc>
+              <a:defRPr sz="1800"/>
+            </a:pPr>
+            <a:endParaRPr sz="1500">
+              <a:latin typeface="Avenir Book"/>
+              <a:ea typeface="Avenir Book"/>
+              <a:cs typeface="Avenir Book"/>
+              <a:sym typeface="Avenir Book"/>
+            </a:endParaRPr>
           </a:p>
           <a:p>
             <a:pPr lvl="0">
-              <a:defRPr sz="1800"/>
-            </a:pPr>
-            <a:r>
-              <a:rPr sz="1500"/>
+              <a:lnSpc>
+                <a:spcPct val="125000"/>
+              </a:lnSpc>
+              <a:defRPr sz="1800"/>
+            </a:pPr>
+            <a:r>
+              <a:rPr sz="1500">
+                <a:latin typeface="Avenir Book"/>
+                <a:ea typeface="Avenir Book"/>
+                <a:cs typeface="Avenir Book"/>
+                <a:sym typeface="Avenir Book"/>
+              </a:rPr>
               <a:t>The content of settings.gradle is very simple:</a:t>
             </a:r>
-            <a:endParaRPr sz="1500"/>
+            <a:endParaRPr sz="1500">
+              <a:latin typeface="Avenir Book"/>
+              <a:ea typeface="Avenir Book"/>
+              <a:cs typeface="Avenir Book"/>
+              <a:sym typeface="Avenir Book"/>
+            </a:endParaRPr>
           </a:p>
           <a:p>
             <a:pPr lvl="0">
-              <a:defRPr sz="1800"/>
-            </a:pPr>
-            <a:r>
-              <a:rPr sz="1500"/>
+              <a:lnSpc>
+                <a:spcPct val="125000"/>
+              </a:lnSpc>
+              <a:defRPr sz="1800"/>
+            </a:pPr>
+            <a:r>
+              <a:rPr sz="1500">
+                <a:latin typeface="Avenir Book"/>
+                <a:ea typeface="Avenir Book"/>
+                <a:cs typeface="Avenir Book"/>
+                <a:sym typeface="Avenir Book"/>
+              </a:rPr>
               <a:t>include ':app', ':libraries:lib1', ':libraries:lib2'</a:t>
             </a:r>
-            <a:endParaRPr sz="1500"/>
+            <a:endParaRPr sz="1500">
+              <a:latin typeface="Avenir Book"/>
+              <a:ea typeface="Avenir Book"/>
+              <a:cs typeface="Avenir Book"/>
+              <a:sym typeface="Avenir Book"/>
+            </a:endParaRPr>
           </a:p>
           <a:p>
             <a:pPr lvl="0">
-              <a:defRPr sz="1800"/>
-            </a:pPr>
-            <a:r>
-              <a:rPr sz="1500"/>
+              <a:lnSpc>
+                <a:spcPct val="125000"/>
+              </a:lnSpc>
+              <a:defRPr sz="1800"/>
+            </a:pPr>
+            <a:r>
+              <a:rPr sz="1500">
+                <a:latin typeface="Avenir Book"/>
+                <a:ea typeface="Avenir Book"/>
+                <a:cs typeface="Avenir Book"/>
+                <a:sym typeface="Avenir Book"/>
+              </a:rPr>
               <a:t>This defines which folder is actually a Gradle project.</a:t>
             </a:r>
           </a:p>
@@ -783,7 +1451,7 @@
       </p:grpSpPr>
       <p:pic>
         <p:nvPicPr>
-          <p:cNvPr id="8" name="image4.png" descr="TitlePageOverlay.png"/>
+          <p:cNvPr id="8" name="image3.png" descr="TitlePageOverlay.png"/>
           <p:cNvPicPr/>
           <p:nvPr/>
         </p:nvPicPr>
@@ -819,7 +1487,7 @@
         <p:spPr>
           <a:xfrm>
             <a:off x="571500" y="0"/>
-            <a:ext cx="8001000" cy="4101167"/>
+            <a:ext cx="8001000" cy="4101168"/>
           </a:xfrm>
           <a:prstGeom prst="rect">
             <a:avLst/>
@@ -871,7 +1539,7 @@
               <a:buFontTx/>
               <a:buNone/>
             </a:lvl1pPr>
-            <a:lvl2pPr marL="0" indent="457200" algn="ctr">
+            <a:lvl2pPr marL="0" indent="0" algn="ctr">
               <a:spcBef>
                 <a:spcPts val="0"/>
               </a:spcBef>
@@ -879,7 +1547,7 @@
               <a:buFontTx/>
               <a:buNone/>
             </a:lvl2pPr>
-            <a:lvl3pPr marL="0" indent="914400" algn="ctr">
+            <a:lvl3pPr marL="0" indent="0" algn="ctr">
               <a:spcBef>
                 <a:spcPts val="0"/>
               </a:spcBef>
@@ -887,7 +1555,7 @@
               <a:buFontTx/>
               <a:buNone/>
             </a:lvl3pPr>
-            <a:lvl4pPr marL="0" indent="1371600" algn="ctr">
+            <a:lvl4pPr marL="0" indent="0" algn="ctr">
               <a:spcBef>
                 <a:spcPts val="0"/>
               </a:spcBef>
@@ -895,7 +1563,7 @@
               <a:buFontTx/>
               <a:buNone/>
             </a:lvl4pPr>
-            <a:lvl5pPr marL="0" indent="1828800" algn="ctr">
+            <a:lvl5pPr marL="0" indent="0" algn="ctr">
               <a:spcBef>
                 <a:spcPts val="0"/>
               </a:spcBef>
@@ -979,7 +1647,7 @@
       </p:sp>
       <p:pic>
         <p:nvPicPr>
-          <p:cNvPr id="12" name="image5.png" descr="standardRule.png"/>
+          <p:cNvPr id="12" name="image2.png" descr="standardRule.png"/>
           <p:cNvPicPr/>
           <p:nvPr/>
         </p:nvPicPr>
@@ -1039,7 +1707,7 @@
       </p:grpSpPr>
       <p:pic>
         <p:nvPicPr>
-          <p:cNvPr id="54" name="image3.png" descr="TextPageOverlay.png"/>
+          <p:cNvPr id="54" name="image1.png" descr="TextPageOverlay.png"/>
           <p:cNvPicPr/>
           <p:nvPr/>
         </p:nvPicPr>
@@ -1075,7 +1743,7 @@
         <p:spPr>
           <a:xfrm>
             <a:off x="594359" y="0"/>
-            <a:ext cx="3749042" cy="2144537"/>
+            <a:ext cx="3749043" cy="2144537"/>
           </a:xfrm>
           <a:prstGeom prst="rect">
             <a:avLst/>
@@ -1110,7 +1778,7 @@
         <p:spPr>
           <a:xfrm>
             <a:off x="594359" y="2551176"/>
-            <a:ext cx="3749042" cy="4306824"/>
+            <a:ext cx="3749043" cy="4306824"/>
           </a:xfrm>
           <a:prstGeom prst="rect">
             <a:avLst/>
@@ -1128,7 +1796,7 @@
               <a:buNone/>
               <a:defRPr sz="1800"/>
             </a:lvl1pPr>
-            <a:lvl2pPr marL="0" indent="457200" algn="ctr">
+            <a:lvl2pPr marL="0" indent="0" algn="ctr">
               <a:spcBef>
                 <a:spcPts val="1800"/>
               </a:spcBef>
@@ -1137,7 +1805,7 @@
               <a:buNone/>
               <a:defRPr sz="1800"/>
             </a:lvl2pPr>
-            <a:lvl3pPr marL="0" indent="914400" algn="ctr">
+            <a:lvl3pPr marL="0" indent="0" algn="ctr">
               <a:spcBef>
                 <a:spcPts val="1800"/>
               </a:spcBef>
@@ -1146,7 +1814,7 @@
               <a:buNone/>
               <a:defRPr sz="1800"/>
             </a:lvl3pPr>
-            <a:lvl4pPr marL="0" indent="1371600" algn="ctr">
+            <a:lvl4pPr marL="0" indent="0" algn="ctr">
               <a:spcBef>
                 <a:spcPts val="1800"/>
               </a:spcBef>
@@ -1155,7 +1823,7 @@
               <a:buNone/>
               <a:defRPr sz="1800"/>
             </a:lvl4pPr>
-            <a:lvl5pPr marL="0" indent="1828800" algn="ctr">
+            <a:lvl5pPr marL="0" indent="0" algn="ctr">
               <a:spcBef>
                 <a:spcPts val="1800"/>
               </a:spcBef>
@@ -1221,7 +1889,7 @@
       </p:sp>
       <p:pic>
         <p:nvPicPr>
-          <p:cNvPr id="58" name="image7.png" descr="shortRule.png"/>
+          <p:cNvPr id="58" name="image5.png" descr="shortRule.png"/>
           <p:cNvPicPr/>
           <p:nvPr/>
         </p:nvPicPr>
@@ -1236,7 +1904,7 @@
         <p:spPr>
           <a:xfrm>
             <a:off x="1222898" y="2305609"/>
-            <a:ext cx="2495551" cy="95251"/>
+            <a:ext cx="2495551" cy="95252"/>
           </a:xfrm>
           <a:prstGeom prst="rect">
             <a:avLst/>
@@ -1255,7 +1923,7 @@
       </p:pic>
       <p:pic>
         <p:nvPicPr>
-          <p:cNvPr id="59" name="image8.png" descr="parAvion.png"/>
+          <p:cNvPr id="59" name="image6.png" descr="parAvion.png"/>
           <p:cNvPicPr/>
           <p:nvPr/>
         </p:nvPicPr>
@@ -1270,7 +1938,7 @@
         <p:spPr>
           <a:xfrm rot="308221">
             <a:off x="6798019" y="538594"/>
-            <a:ext cx="1808486" cy="516710"/>
+            <a:ext cx="1808487" cy="516710"/>
           </a:xfrm>
           <a:prstGeom prst="rect">
             <a:avLst/>
@@ -1308,7 +1976,7 @@
       </p:grpSpPr>
       <p:pic>
         <p:nvPicPr>
-          <p:cNvPr id="61" name="image4.png" descr="TitlePageOverlay.png"/>
+          <p:cNvPr id="61" name="image3.png" descr="TitlePageOverlay.png"/>
           <p:cNvPicPr/>
           <p:nvPr/>
         </p:nvPicPr>
@@ -1343,8 +2011,8 @@
         </p:nvSpPr>
         <p:spPr>
           <a:xfrm>
-            <a:off x="571500" y="1210324"/>
-            <a:ext cx="8001000" cy="3424430"/>
+            <a:off x="571500" y="0"/>
+            <a:ext cx="8001000" cy="4634755"/>
           </a:xfrm>
           <a:prstGeom prst="rect">
             <a:avLst/>
@@ -1397,7 +2065,7 @@
               <a:buNone/>
               <a:defRPr sz="1800"/>
             </a:lvl1pPr>
-            <a:lvl2pPr marL="0" indent="457200" algn="ctr">
+            <a:lvl2pPr marL="0" indent="0" algn="ctr">
               <a:spcBef>
                 <a:spcPts val="1800"/>
               </a:spcBef>
@@ -1406,7 +2074,7 @@
               <a:buNone/>
               <a:defRPr sz="1800"/>
             </a:lvl2pPr>
-            <a:lvl3pPr marL="0" indent="914400" algn="ctr">
+            <a:lvl3pPr marL="0" indent="0" algn="ctr">
               <a:spcBef>
                 <a:spcPts val="1800"/>
               </a:spcBef>
@@ -1415,7 +2083,7 @@
               <a:buNone/>
               <a:defRPr sz="1800"/>
             </a:lvl3pPr>
-            <a:lvl4pPr marL="0" indent="1371600" algn="ctr">
+            <a:lvl4pPr marL="0" indent="0" algn="ctr">
               <a:spcBef>
                 <a:spcPts val="1800"/>
               </a:spcBef>
@@ -1424,7 +2092,7 @@
               <a:buNone/>
               <a:defRPr sz="1800"/>
             </a:lvl4pPr>
-            <a:lvl5pPr marL="0" indent="1828800" algn="ctr">
+            <a:lvl5pPr marL="0" indent="0" algn="ctr">
               <a:spcBef>
                 <a:spcPts val="1800"/>
               </a:spcBef>
@@ -1490,7 +2158,7 @@
       </p:sp>
       <p:pic>
         <p:nvPicPr>
-          <p:cNvPr id="65" name="image7.png" descr="shortRule.png"/>
+          <p:cNvPr id="65" name="image5.png" descr="shortRule.png"/>
           <p:cNvPicPr/>
           <p:nvPr/>
         </p:nvPicPr>
@@ -1505,7 +2173,7 @@
         <p:spPr>
           <a:xfrm>
             <a:off x="3324225" y="4666129"/>
-            <a:ext cx="2495550" cy="95251"/>
+            <a:ext cx="2495550" cy="95252"/>
           </a:xfrm>
           <a:prstGeom prst="rect">
             <a:avLst/>
@@ -1550,7 +2218,7 @@
       </p:grpSpPr>
       <p:pic>
         <p:nvPicPr>
-          <p:cNvPr id="67" name="image4.png" descr="TitlePageOverlay.png"/>
+          <p:cNvPr id="67" name="image3.png" descr="TitlePageOverlay.png"/>
           <p:cNvPicPr/>
           <p:nvPr/>
         </p:nvPicPr>
@@ -1577,7 +2245,7 @@
       </p:pic>
       <p:pic>
         <p:nvPicPr>
-          <p:cNvPr id="68" name="image8.png" descr="parAvion.png"/>
+          <p:cNvPr id="68" name="image6.png" descr="parAvion.png"/>
           <p:cNvPicPr/>
           <p:nvPr/>
         </p:nvPicPr>
@@ -1592,7 +2260,7 @@
         <p:spPr>
           <a:xfrm rot="308221">
             <a:off x="6835967" y="278688"/>
-            <a:ext cx="1695955" cy="484559"/>
+            <a:ext cx="1695956" cy="484559"/>
           </a:xfrm>
           <a:prstGeom prst="rect">
             <a:avLst/>
@@ -1612,8 +2280,8 @@
         </p:nvSpPr>
         <p:spPr>
           <a:xfrm>
-            <a:off x="571500" y="1210324"/>
-            <a:ext cx="8001000" cy="3424430"/>
+            <a:off x="571500" y="0"/>
+            <a:ext cx="8001000" cy="4634755"/>
           </a:xfrm>
           <a:prstGeom prst="rect">
             <a:avLst/>
@@ -1666,7 +2334,7 @@
               <a:buNone/>
               <a:defRPr sz="1800"/>
             </a:lvl1pPr>
-            <a:lvl2pPr marL="0" indent="457200" algn="ctr">
+            <a:lvl2pPr marL="0" indent="0" algn="ctr">
               <a:spcBef>
                 <a:spcPts val="1800"/>
               </a:spcBef>
@@ -1675,7 +2343,7 @@
               <a:buNone/>
               <a:defRPr sz="1800"/>
             </a:lvl2pPr>
-            <a:lvl3pPr marL="0" indent="914400" algn="ctr">
+            <a:lvl3pPr marL="0" indent="0" algn="ctr">
               <a:spcBef>
                 <a:spcPts val="1800"/>
               </a:spcBef>
@@ -1684,7 +2352,7 @@
               <a:buNone/>
               <a:defRPr sz="1800"/>
             </a:lvl3pPr>
-            <a:lvl4pPr marL="0" indent="1371600" algn="ctr">
+            <a:lvl4pPr marL="0" indent="0" algn="ctr">
               <a:spcBef>
                 <a:spcPts val="1800"/>
               </a:spcBef>
@@ -1693,7 +2361,7 @@
               <a:buNone/>
               <a:defRPr sz="1800"/>
             </a:lvl4pPr>
-            <a:lvl5pPr marL="0" indent="1828800" algn="ctr">
+            <a:lvl5pPr marL="0" indent="0" algn="ctr">
               <a:spcBef>
                 <a:spcPts val="1800"/>
               </a:spcBef>
@@ -1759,7 +2427,7 @@
       </p:sp>
       <p:pic>
         <p:nvPicPr>
-          <p:cNvPr id="72" name="image7.png" descr="shortRule.png"/>
+          <p:cNvPr id="72" name="image5.png" descr="shortRule.png"/>
           <p:cNvPicPr/>
           <p:nvPr/>
         </p:nvPicPr>
@@ -1774,7 +2442,7 @@
         <p:spPr>
           <a:xfrm>
             <a:off x="3324225" y="4666129"/>
-            <a:ext cx="2495550" cy="95251"/>
+            <a:ext cx="2495550" cy="95252"/>
           </a:xfrm>
           <a:prstGeom prst="rect">
             <a:avLst/>
@@ -1793,7 +2461,7 @@
       </p:pic>
       <p:pic>
         <p:nvPicPr>
-          <p:cNvPr id="73" name="image8.png" descr="parAvion.png"/>
+          <p:cNvPr id="73" name="image6.png" descr="parAvion.png"/>
           <p:cNvPicPr/>
           <p:nvPr/>
         </p:nvPicPr>
@@ -1807,8 +2475,8 @@
         </p:blipFill>
         <p:spPr>
           <a:xfrm rot="20785256">
-            <a:off x="2866027" y="3182425"/>
-            <a:ext cx="1695956" cy="484559"/>
+            <a:off x="2866026" y="3182424"/>
+            <a:ext cx="1695957" cy="484560"/>
           </a:xfrm>
           <a:prstGeom prst="rect">
             <a:avLst/>
@@ -1846,7 +2514,7 @@
       </p:grpSpPr>
       <p:pic>
         <p:nvPicPr>
-          <p:cNvPr id="75" name="image4.png" descr="TitlePageOverlay.png"/>
+          <p:cNvPr id="75" name="image3.png" descr="TitlePageOverlay.png"/>
           <p:cNvPicPr/>
           <p:nvPr/>
         </p:nvPicPr>
@@ -1882,7 +2550,7 @@
         <p:spPr>
           <a:xfrm>
             <a:off x="4983479" y="4800600"/>
-            <a:ext cx="3246121" cy="1188720"/>
+            <a:ext cx="3246122" cy="1188720"/>
           </a:xfrm>
           <a:prstGeom prst="rect">
             <a:avLst/>
@@ -1905,7 +2573,7 @@
                 <a:sym typeface="Mistral"/>
               </a:defRPr>
             </a:lvl1pPr>
-            <a:lvl2pPr marL="0" indent="457200" algn="ctr">
+            <a:lvl2pPr marL="0" indent="0" algn="ctr">
               <a:spcBef>
                 <a:spcPts val="1800"/>
               </a:spcBef>
@@ -1919,7 +2587,7 @@
                 <a:sym typeface="Mistral"/>
               </a:defRPr>
             </a:lvl2pPr>
-            <a:lvl3pPr marL="0" indent="914400" algn="ctr">
+            <a:lvl3pPr marL="0" indent="0" algn="ctr">
               <a:spcBef>
                 <a:spcPts val="1800"/>
               </a:spcBef>
@@ -1933,7 +2601,7 @@
                 <a:sym typeface="Mistral"/>
               </a:defRPr>
             </a:lvl3pPr>
-            <a:lvl4pPr marL="0" indent="1371600" algn="ctr">
+            <a:lvl4pPr marL="0" indent="0" algn="ctr">
               <a:spcBef>
                 <a:spcPts val="1800"/>
               </a:spcBef>
@@ -1947,7 +2615,7 @@
                 <a:sym typeface="Mistral"/>
               </a:defRPr>
             </a:lvl4pPr>
-            <a:lvl5pPr marL="0" indent="1828800" algn="ctr">
+            <a:lvl5pPr marL="0" indent="0" algn="ctr">
               <a:spcBef>
                 <a:spcPts val="1800"/>
               </a:spcBef>
@@ -2046,7 +2714,7 @@
         <p:spPr>
           <a:xfrm rot="21240000">
             <a:off x="4717562" y="3396153"/>
-            <a:ext cx="3474721" cy="1097281"/>
+            <a:ext cx="3474721" cy="1097282"/>
           </a:xfrm>
           <a:prstGeom prst="rect">
             <a:avLst/>
@@ -2108,7 +2776,7 @@
       </p:grpSpPr>
       <p:pic>
         <p:nvPicPr>
-          <p:cNvPr id="80" name="image4.png" descr="TitlePageOverlay.png"/>
+          <p:cNvPr id="80" name="image3.png" descr="TitlePageOverlay.png"/>
           <p:cNvPicPr/>
           <p:nvPr/>
         </p:nvPicPr>
@@ -2167,7 +2835,7 @@
                 <a:sym typeface="Mistral"/>
               </a:defRPr>
             </a:lvl1pPr>
-            <a:lvl2pPr marL="0" indent="457200" algn="ctr">
+            <a:lvl2pPr marL="0" indent="0" algn="ctr">
               <a:spcBef>
                 <a:spcPts val="1800"/>
               </a:spcBef>
@@ -2181,7 +2849,7 @@
                 <a:sym typeface="Mistral"/>
               </a:defRPr>
             </a:lvl2pPr>
-            <a:lvl3pPr marL="0" indent="914400" algn="ctr">
+            <a:lvl3pPr marL="0" indent="0" algn="ctr">
               <a:spcBef>
                 <a:spcPts val="1800"/>
               </a:spcBef>
@@ -2195,7 +2863,7 @@
                 <a:sym typeface="Mistral"/>
               </a:defRPr>
             </a:lvl3pPr>
-            <a:lvl4pPr marL="0" indent="1371600" algn="ctr">
+            <a:lvl4pPr marL="0" indent="0" algn="ctr">
               <a:spcBef>
                 <a:spcPts val="1800"/>
               </a:spcBef>
@@ -2209,7 +2877,7 @@
                 <a:sym typeface="Mistral"/>
               </a:defRPr>
             </a:lvl4pPr>
-            <a:lvl5pPr marL="0" indent="1828800" algn="ctr">
+            <a:lvl5pPr marL="0" indent="0" algn="ctr">
               <a:spcBef>
                 <a:spcPts val="1800"/>
               </a:spcBef>
@@ -2299,7 +2967,7 @@
       </p:sp>
       <p:pic>
         <p:nvPicPr>
-          <p:cNvPr id="83" name="image8.png" descr="parAvion.png"/>
+          <p:cNvPr id="83" name="image6.png" descr="parAvion.png"/>
           <p:cNvPicPr/>
           <p:nvPr/>
         </p:nvPicPr>
@@ -2314,7 +2982,7 @@
         <p:spPr>
           <a:xfrm rot="308221">
             <a:off x="7428514" y="2619243"/>
-            <a:ext cx="1580738" cy="451640"/>
+            <a:ext cx="1580739" cy="451641"/>
           </a:xfrm>
           <a:prstGeom prst="rect">
             <a:avLst/>
@@ -2326,7 +2994,7 @@
       </p:pic>
       <p:pic>
         <p:nvPicPr>
-          <p:cNvPr id="84" name="image6.png" descr="pictureStamp-Frame.png"/>
+          <p:cNvPr id="84" name="image4.png" descr="pictureStamp-Frame.png"/>
           <p:cNvPicPr/>
           <p:nvPr/>
         </p:nvPicPr>
@@ -2340,8 +3008,8 @@
         </p:blipFill>
         <p:spPr>
           <a:xfrm rot="322260">
-            <a:off x="6339645" y="604321"/>
-            <a:ext cx="1610334" cy="2025115"/>
+            <a:off x="6339644" y="604321"/>
+            <a:ext cx="1610335" cy="2025115"/>
           </a:xfrm>
           <a:prstGeom prst="rect">
             <a:avLst/>
@@ -2353,7 +3021,7 @@
       </p:pic>
       <p:pic>
         <p:nvPicPr>
-          <p:cNvPr id="85" name="image6.png" descr="pictureStamp-Frame.png"/>
+          <p:cNvPr id="85" name="image4.png" descr="pictureStamp-Frame.png"/>
           <p:cNvPicPr/>
           <p:nvPr/>
         </p:nvPicPr>
@@ -2367,8 +3035,8 @@
         </p:blipFill>
         <p:spPr>
           <a:xfrm rot="322260">
-            <a:off x="4891845" y="985320"/>
-            <a:ext cx="1610334" cy="2025116"/>
+            <a:off x="4891844" y="985319"/>
+            <a:ext cx="1610335" cy="2025117"/>
           </a:xfrm>
           <a:prstGeom prst="rect">
             <a:avLst/>
@@ -2388,8 +3056,8 @@
         </p:nvSpPr>
         <p:spPr>
           <a:xfrm rot="21240000">
-            <a:off x="455724" y="3551614"/>
-            <a:ext cx="3474721" cy="1097282"/>
+            <a:off x="455724" y="3551613"/>
+            <a:ext cx="3474721" cy="1097283"/>
           </a:xfrm>
           <a:prstGeom prst="rect">
             <a:avLst/>
@@ -2593,7 +3261,7 @@
       </p:grpSpPr>
       <p:pic>
         <p:nvPicPr>
-          <p:cNvPr id="92" name="image3.png" descr="TextPageOverlay.png"/>
+          <p:cNvPr id="92" name="image1.png" descr="TextPageOverlay.png"/>
           <p:cNvPicPr/>
           <p:nvPr/>
         </p:nvPicPr>
@@ -2629,7 +3297,7 @@
         <p:spPr>
           <a:xfrm>
             <a:off x="6696633" y="0"/>
-            <a:ext cx="1882590" cy="6616700"/>
+            <a:ext cx="1882591" cy="6616700"/>
           </a:xfrm>
           <a:prstGeom prst="rect">
             <a:avLst/>
@@ -2664,7 +3332,7 @@
         <p:spPr>
           <a:xfrm>
             <a:off x="578224" y="577848"/>
-            <a:ext cx="5768789" cy="6280153"/>
+            <a:ext cx="5768789" cy="6280154"/>
           </a:xfrm>
           <a:prstGeom prst="rect">
             <a:avLst/>
@@ -2748,7 +3416,7 @@
       </p:sp>
       <p:pic>
         <p:nvPicPr>
-          <p:cNvPr id="96" name="image9.png" descr="verticalRule.png"/>
+          <p:cNvPr id="96" name="image7.png" descr="verticalRule.png"/>
           <p:cNvPicPr/>
           <p:nvPr/>
         </p:nvPicPr>
@@ -2763,7 +3431,7 @@
         <p:spPr>
           <a:xfrm>
             <a:off x="6512859" y="1562100"/>
-            <a:ext cx="152401" cy="3733800"/>
+            <a:ext cx="152402" cy="3733800"/>
           </a:xfrm>
           <a:prstGeom prst="rect">
             <a:avLst/>
@@ -2950,7 +3618,7 @@
       </p:grpSpPr>
       <p:pic>
         <p:nvPicPr>
-          <p:cNvPr id="18" name="image4.png" descr="TitlePageOverlay.png"/>
+          <p:cNvPr id="18" name="image3.png" descr="TitlePageOverlay.png"/>
           <p:cNvPicPr/>
           <p:nvPr/>
         </p:nvPicPr>
@@ -2985,8 +3653,8 @@
         </p:nvSpPr>
         <p:spPr>
           <a:xfrm>
-            <a:off x="571500" y="342900"/>
-            <a:ext cx="8001000" cy="4139267"/>
+            <a:off x="571500" y="0"/>
+            <a:ext cx="8001000" cy="4482168"/>
           </a:xfrm>
           <a:prstGeom prst="rect">
             <a:avLst/>
@@ -3038,7 +3706,7 @@
               <a:buFontTx/>
               <a:buNone/>
             </a:lvl1pPr>
-            <a:lvl2pPr marL="0" indent="457200" algn="ctr">
+            <a:lvl2pPr marL="0" indent="0" algn="ctr">
               <a:spcBef>
                 <a:spcPts val="0"/>
               </a:spcBef>
@@ -3046,7 +3714,7 @@
               <a:buFontTx/>
               <a:buNone/>
             </a:lvl2pPr>
-            <a:lvl3pPr marL="0" indent="914400" algn="ctr">
+            <a:lvl3pPr marL="0" indent="0" algn="ctr">
               <a:spcBef>
                 <a:spcPts val="0"/>
               </a:spcBef>
@@ -3054,7 +3722,7 @@
               <a:buFontTx/>
               <a:buNone/>
             </a:lvl3pPr>
-            <a:lvl4pPr marL="0" indent="1371600" algn="ctr">
+            <a:lvl4pPr marL="0" indent="0" algn="ctr">
               <a:spcBef>
                 <a:spcPts val="0"/>
               </a:spcBef>
@@ -3062,7 +3730,7 @@
               <a:buFontTx/>
               <a:buNone/>
             </a:lvl4pPr>
-            <a:lvl5pPr marL="0" indent="1828800" algn="ctr">
+            <a:lvl5pPr marL="0" indent="0" algn="ctr">
               <a:spcBef>
                 <a:spcPts val="0"/>
               </a:spcBef>
@@ -3146,7 +3814,7 @@
       </p:sp>
       <p:pic>
         <p:nvPicPr>
-          <p:cNvPr id="22" name="image5.png" descr="standardRule.png"/>
+          <p:cNvPr id="22" name="image2.png" descr="standardRule.png"/>
           <p:cNvPicPr/>
           <p:nvPr/>
         </p:nvPicPr>
@@ -3180,7 +3848,7 @@
       </p:pic>
       <p:pic>
         <p:nvPicPr>
-          <p:cNvPr id="23" name="image6.png" descr="pictureStamp-Frame.png"/>
+          <p:cNvPr id="23" name="image4.png" descr="pictureStamp-Frame.png"/>
           <p:cNvPicPr/>
           <p:nvPr/>
         </p:nvPicPr>
@@ -3195,7 +3863,7 @@
         <p:spPr>
           <a:xfrm rot="21366660">
             <a:off x="5138373" y="599839"/>
-            <a:ext cx="1610333" cy="2025115"/>
+            <a:ext cx="1610334" cy="2025115"/>
           </a:xfrm>
           <a:prstGeom prst="rect">
             <a:avLst/>
@@ -3207,7 +3875,7 @@
       </p:pic>
       <p:pic>
         <p:nvPicPr>
-          <p:cNvPr id="24" name="image6.png" descr="pictureStamp-Frame.png"/>
+          <p:cNvPr id="24" name="image4.png" descr="pictureStamp-Frame.png"/>
           <p:cNvPicPr/>
           <p:nvPr/>
         </p:nvPicPr>
@@ -3221,8 +3889,8 @@
         </p:blipFill>
         <p:spPr>
           <a:xfrm rot="21329777">
-            <a:off x="2072771" y="555386"/>
-            <a:ext cx="1610333" cy="2025115"/>
+            <a:off x="2072770" y="555386"/>
+            <a:ext cx="1610334" cy="2025115"/>
           </a:xfrm>
           <a:prstGeom prst="rect">
             <a:avLst/>
@@ -3234,7 +3902,7 @@
       </p:pic>
       <p:pic>
         <p:nvPicPr>
-          <p:cNvPr id="25" name="image6.png" descr="pictureStamp-Frame.png"/>
+          <p:cNvPr id="25" name="image4.png" descr="pictureStamp-Frame.png"/>
           <p:cNvPicPr/>
           <p:nvPr/>
         </p:nvPicPr>
@@ -3248,8 +3916,8 @@
         </p:blipFill>
         <p:spPr>
           <a:xfrm rot="151791">
-            <a:off x="3591962" y="936014"/>
-            <a:ext cx="1610333" cy="2025116"/>
+            <a:off x="3591962" y="936013"/>
+            <a:ext cx="1610334" cy="2025117"/>
           </a:xfrm>
           <a:prstGeom prst="rect">
             <a:avLst/>
@@ -3287,7 +3955,7 @@
       </p:grpSpPr>
       <p:pic>
         <p:nvPicPr>
-          <p:cNvPr id="27" name="image3.png" descr="TextPageOverlay.png"/>
+          <p:cNvPr id="27" name="image1.png" descr="TextPageOverlay.png"/>
           <p:cNvPicPr/>
           <p:nvPr/>
         </p:nvPicPr>
@@ -3358,7 +4026,7 @@
         <p:spPr>
           <a:xfrm>
             <a:off x="571500" y="3644153"/>
-            <a:ext cx="8001000" cy="2548219"/>
+            <a:ext cx="8001000" cy="3213847"/>
           </a:xfrm>
           <a:prstGeom prst="rect">
             <a:avLst/>
@@ -3376,7 +4044,7 @@
               <a:buNone/>
               <a:defRPr sz="2000"/>
             </a:lvl1pPr>
-            <a:lvl2pPr marL="0" indent="457200" algn="ctr">
+            <a:lvl2pPr marL="0" indent="0" algn="ctr">
               <a:spcBef>
                 <a:spcPts val="0"/>
               </a:spcBef>
@@ -3385,7 +4053,7 @@
               <a:buNone/>
               <a:defRPr sz="2000"/>
             </a:lvl2pPr>
-            <a:lvl3pPr marL="0" indent="914400" algn="ctr">
+            <a:lvl3pPr marL="0" indent="0" algn="ctr">
               <a:spcBef>
                 <a:spcPts val="0"/>
               </a:spcBef>
@@ -3394,7 +4062,7 @@
               <a:buNone/>
               <a:defRPr sz="2000"/>
             </a:lvl3pPr>
-            <a:lvl4pPr marL="0" indent="1371600" algn="ctr">
+            <a:lvl4pPr marL="0" indent="0" algn="ctr">
               <a:spcBef>
                 <a:spcPts val="0"/>
               </a:spcBef>
@@ -3403,7 +4071,7 @@
               <a:buNone/>
               <a:defRPr sz="2000"/>
             </a:lvl4pPr>
-            <a:lvl5pPr marL="0" indent="1828800" algn="ctr">
+            <a:lvl5pPr marL="0" indent="0" algn="ctr">
               <a:spcBef>
                 <a:spcPts val="0"/>
               </a:spcBef>
@@ -3488,7 +4156,7 @@
       </p:sp>
       <p:pic>
         <p:nvPicPr>
-          <p:cNvPr id="31" name="image5.png" descr="standardRule.png"/>
+          <p:cNvPr id="31" name="image2.png" descr="standardRule.png"/>
           <p:cNvPicPr/>
           <p:nvPr/>
         </p:nvPicPr>
@@ -3584,7 +4252,7 @@
         <p:spPr>
           <a:xfrm>
             <a:off x="571500" y="1936750"/>
-            <a:ext cx="3749041" cy="4921251"/>
+            <a:ext cx="3749041" cy="4921252"/>
           </a:xfrm>
           <a:prstGeom prst="rect">
             <a:avLst/>
@@ -3733,8 +4401,8 @@
         </p:nvSpPr>
         <p:spPr>
           <a:xfrm>
-            <a:off x="571500" y="163704"/>
-            <a:ext cx="8001000" cy="1364868"/>
+            <a:off x="571500" y="163703"/>
+            <a:ext cx="8001000" cy="1364870"/>
           </a:xfrm>
           <a:prstGeom prst="rect">
             <a:avLst/>
@@ -3765,7 +4433,7 @@
         <p:spPr>
           <a:xfrm>
             <a:off x="571500" y="1528571"/>
-            <a:ext cx="3749041" cy="1332296"/>
+            <a:ext cx="3749041" cy="1332297"/>
           </a:xfrm>
           <a:prstGeom prst="rect">
             <a:avLst/>
@@ -3784,7 +4452,7 @@
               <a:buFontTx/>
               <a:buNone/>
             </a:lvl1pPr>
-            <a:lvl2pPr marL="0" indent="457200" algn="ctr">
+            <a:lvl2pPr marL="0" indent="0" algn="ctr">
               <a:spcBef>
                 <a:spcPts val="0"/>
               </a:spcBef>
@@ -3792,7 +4460,7 @@
               <a:buFontTx/>
               <a:buNone/>
             </a:lvl2pPr>
-            <a:lvl3pPr marL="0" indent="914400" algn="ctr">
+            <a:lvl3pPr marL="0" indent="0" algn="ctr">
               <a:spcBef>
                 <a:spcPts val="0"/>
               </a:spcBef>
@@ -3800,7 +4468,7 @@
               <a:buFontTx/>
               <a:buNone/>
             </a:lvl3pPr>
-            <a:lvl4pPr marL="0" indent="1371600" algn="ctr">
+            <a:lvl4pPr marL="0" indent="0" algn="ctr">
               <a:spcBef>
                 <a:spcPts val="0"/>
               </a:spcBef>
@@ -3808,7 +4476,7 @@
               <a:buFontTx/>
               <a:buNone/>
             </a:lvl4pPr>
-            <a:lvl5pPr marL="0" indent="1828800" algn="ctr">
+            <a:lvl5pPr marL="0" indent="0" algn="ctr">
               <a:spcBef>
                 <a:spcPts val="0"/>
               </a:spcBef>
@@ -3918,7 +4586,7 @@
       </p:grpSpPr>
       <p:pic>
         <p:nvPicPr>
-          <p:cNvPr id="41" name="image3.png" descr="TextPageOverlay.png"/>
+          <p:cNvPr id="41" name="image1.png" descr="TextPageOverlay.png"/>
           <p:cNvPicPr/>
           <p:nvPr/>
         </p:nvPicPr>
@@ -3953,8 +4621,8 @@
         </p:nvSpPr>
         <p:spPr>
           <a:xfrm>
-            <a:off x="571500" y="92076"/>
-            <a:ext cx="8001000" cy="1508125"/>
+            <a:off x="571500" y="0"/>
+            <a:ext cx="8001000" cy="1692277"/>
           </a:xfrm>
           <a:prstGeom prst="rect">
             <a:avLst/>
@@ -4024,7 +4692,7 @@
       </p:grpSpPr>
       <p:pic>
         <p:nvPicPr>
-          <p:cNvPr id="45" name="image3.png" descr="TextPageOverlay.png"/>
+          <p:cNvPr id="45" name="image1.png" descr="TextPageOverlay.png"/>
           <p:cNvPicPr/>
           <p:nvPr/>
         </p:nvPicPr>
@@ -4099,7 +4767,7 @@
       </p:grpSpPr>
       <p:pic>
         <p:nvPicPr>
-          <p:cNvPr id="48" name="image3.png" descr="TextPageOverlay.png"/>
+          <p:cNvPr id="48" name="image1.png" descr="TextPageOverlay.png"/>
           <p:cNvPicPr/>
           <p:nvPr/>
         </p:nvPicPr>
@@ -4170,7 +4838,7 @@
         <p:spPr>
           <a:xfrm>
             <a:off x="4827494" y="430306"/>
-            <a:ext cx="3749041" cy="6427695"/>
+            <a:ext cx="3749042" cy="6427695"/>
           </a:xfrm>
           <a:prstGeom prst="rect">
             <a:avLst/>
@@ -4254,7 +4922,7 @@
       </p:sp>
       <p:pic>
         <p:nvPicPr>
-          <p:cNvPr id="52" name="image7.png" descr="shortRule.png"/>
+          <p:cNvPr id="52" name="image5.png" descr="shortRule.png"/>
           <p:cNvPicPr/>
           <p:nvPr/>
         </p:nvPicPr>
@@ -4269,7 +4937,7 @@
         <p:spPr>
           <a:xfrm>
             <a:off x="1222898" y="2305609"/>
-            <a:ext cx="2495551" cy="95251"/>
+            <a:ext cx="2495551" cy="95252"/>
           </a:xfrm>
           <a:prstGeom prst="rect">
             <a:avLst/>
@@ -4334,7 +5002,7 @@
       </p:grpSpPr>
       <p:pic>
         <p:nvPicPr>
-          <p:cNvPr id="2" name="image3.png" descr="TextPageOverlay.png"/>
+          <p:cNvPr id="2" name="image1.png" descr="TextPageOverlay.png"/>
           <p:cNvPicPr/>
           <p:nvPr/>
         </p:nvPicPr>
@@ -4359,168 +5027,9 @@
           </a:ln>
         </p:spPr>
       </p:pic>
-      <p:sp>
-        <p:nvSpPr>
-          <p:cNvPr id="3" name="Shape 3"/>
-          <p:cNvSpPr/>
-          <p:nvPr>
-            <p:ph type="title"/>
-          </p:nvPr>
-        </p:nvSpPr>
-        <p:spPr>
-          <a:xfrm>
-            <a:off x="571500" y="0"/>
-            <a:ext cx="8001000" cy="1692276"/>
-          </a:xfrm>
-          <a:prstGeom prst="rect">
-            <a:avLst/>
-          </a:prstGeom>
-          <a:ln w="12700">
-            <a:miter lim="400000"/>
-          </a:ln>
-          <a:extLst>
-            <a:ext uri="{C572A759-6A51-4108-AA02-DFA0A04FC94B}">
-              <ma14:wrappingTextBoxFlag xmlns:ma14="http://schemas.microsoft.com/office/mac/drawingml/2011/main" val="1"/>
-            </a:ext>
-          </a:extLst>
-        </p:spPr>
-        <p:txBody>
-          <a:bodyPr lIns="45719" rIns="45719" anchor="ctr"/>
-          <a:lstStyle/>
-          <a:p>
-            <a:pPr lvl="0">
-              <a:defRPr sz="1800"/>
-            </a:pPr>
-            <a:r>
-              <a:rPr sz="5400"/>
-              <a:t>Title Text</a:t>
-            </a:r>
-          </a:p>
-        </p:txBody>
-      </p:sp>
-      <p:sp>
-        <p:nvSpPr>
-          <p:cNvPr id="4" name="Shape 4"/>
-          <p:cNvSpPr/>
-          <p:nvPr>
-            <p:ph type="body" idx="1"/>
-          </p:nvPr>
-        </p:nvSpPr>
-        <p:spPr>
-          <a:xfrm>
-            <a:off x="571500" y="1905000"/>
-            <a:ext cx="8001000" cy="4953000"/>
-          </a:xfrm>
-          <a:prstGeom prst="rect">
-            <a:avLst/>
-          </a:prstGeom>
-          <a:ln w="12700">
-            <a:miter lim="400000"/>
-          </a:ln>
-          <a:extLst>
-            <a:ext uri="{C572A759-6A51-4108-AA02-DFA0A04FC94B}">
-              <ma14:wrappingTextBoxFlag xmlns:ma14="http://schemas.microsoft.com/office/mac/drawingml/2011/main" val="1"/>
-            </a:ext>
-          </a:extLst>
-        </p:spPr>
-        <p:txBody>
-          <a:bodyPr lIns="45719" rIns="45719">
-            <a:normAutofit fontScale="100000" lnSpcReduction="0"/>
-          </a:bodyPr>
-          <a:lstStyle/>
-          <a:p>
-            <a:pPr lvl="0">
-              <a:defRPr sz="1800"/>
-            </a:pPr>
-            <a:r>
-              <a:rPr sz="2400"/>
-              <a:t>Body Level One</a:t>
-            </a:r>
-            <a:endParaRPr sz="2400"/>
-          </a:p>
-          <a:p>
-            <a:pPr lvl="1">
-              <a:defRPr sz="1800"/>
-            </a:pPr>
-            <a:r>
-              <a:rPr sz="2400"/>
-              <a:t>Body Level Two</a:t>
-            </a:r>
-            <a:endParaRPr sz="2400"/>
-          </a:p>
-          <a:p>
-            <a:pPr lvl="2">
-              <a:defRPr sz="1800"/>
-            </a:pPr>
-            <a:r>
-              <a:rPr sz="2400"/>
-              <a:t>Body Level Three</a:t>
-            </a:r>
-            <a:endParaRPr sz="2400"/>
-          </a:p>
-          <a:p>
-            <a:pPr lvl="3">
-              <a:defRPr sz="1800"/>
-            </a:pPr>
-            <a:r>
-              <a:rPr sz="2400"/>
-              <a:t>Body Level Four</a:t>
-            </a:r>
-            <a:endParaRPr sz="2400"/>
-          </a:p>
-          <a:p>
-            <a:pPr lvl="4">
-              <a:defRPr sz="1800"/>
-            </a:pPr>
-            <a:r>
-              <a:rPr sz="2400"/>
-              <a:t>Body Level Five</a:t>
-            </a:r>
-          </a:p>
-        </p:txBody>
-      </p:sp>
-      <p:sp>
-        <p:nvSpPr>
-          <p:cNvPr id="5" name="Shape 5"/>
-          <p:cNvSpPr/>
-          <p:nvPr>
-            <p:ph type="sldNum" sz="quarter" idx="2"/>
-          </p:nvPr>
-        </p:nvSpPr>
-        <p:spPr>
-          <a:xfrm>
-            <a:off x="4046220" y="6206695"/>
-            <a:ext cx="1051561" cy="269241"/>
-          </a:xfrm>
-          <a:prstGeom prst="rect">
-            <a:avLst/>
-          </a:prstGeom>
-          <a:ln w="12700">
-            <a:miter lim="400000"/>
-          </a:ln>
-        </p:spPr>
-        <p:txBody>
-          <a:bodyPr lIns="45719" rIns="45719" anchor="ctr">
-            <a:spAutoFit/>
-          </a:bodyPr>
-          <a:lstStyle>
-            <a:lvl1pPr algn="ctr">
-              <a:defRPr sz="1200">
-                <a:solidFill>
-                  <a:srgbClr val="82682C"/>
-                </a:solidFill>
-              </a:defRPr>
-            </a:lvl1pPr>
-          </a:lstStyle>
-          <a:p>
-            <a:pPr lvl="0"/>
-            <a:fld id="{86CB4B4D-7CA3-9044-876B-883B54F8677D}" type="slidenum"/>
-          </a:p>
-        </p:txBody>
-      </p:sp>
       <p:pic>
         <p:nvPicPr>
-          <p:cNvPr id="6" name="image5.png" descr="standardRule.png"/>
+          <p:cNvPr id="3" name="image2.png" descr="standardRule.png"/>
           <p:cNvPicPr/>
           <p:nvPr/>
         </p:nvPicPr>
@@ -4552,6 +5061,169 @@
           </a:effectLst>
         </p:spPr>
       </p:pic>
+      <p:sp>
+        <p:nvSpPr>
+          <p:cNvPr id="4" name="Shape 4"/>
+          <p:cNvSpPr/>
+          <p:nvPr>
+            <p:ph type="title"/>
+          </p:nvPr>
+        </p:nvSpPr>
+        <p:spPr>
+          <a:xfrm>
+            <a:off x="571500" y="0"/>
+            <a:ext cx="8001000" cy="1692276"/>
+          </a:xfrm>
+          <a:prstGeom prst="rect">
+            <a:avLst/>
+          </a:prstGeom>
+          <a:ln w="12700">
+            <a:miter lim="400000"/>
+          </a:ln>
+          <a:extLst>
+            <a:ext uri="{C572A759-6A51-4108-AA02-DFA0A04FC94B}">
+              <ma14:wrappingTextBoxFlag xmlns:ma14="http://schemas.microsoft.com/office/mac/drawingml/2011/main" val="1"/>
+            </a:ext>
+          </a:extLst>
+        </p:spPr>
+        <p:txBody>
+          <a:bodyPr lIns="45718" tIns="45718" rIns="45718" bIns="45718" anchor="ctr"/>
+          <a:lstStyle/>
+          <a:p>
+            <a:pPr lvl="0">
+              <a:defRPr sz="1800"/>
+            </a:pPr>
+            <a:r>
+              <a:rPr sz="5400"/>
+              <a:t>Title Text</a:t>
+            </a:r>
+          </a:p>
+        </p:txBody>
+      </p:sp>
+      <p:sp>
+        <p:nvSpPr>
+          <p:cNvPr id="5" name="Shape 5"/>
+          <p:cNvSpPr/>
+          <p:nvPr>
+            <p:ph type="body" idx="1"/>
+          </p:nvPr>
+        </p:nvSpPr>
+        <p:spPr>
+          <a:xfrm>
+            <a:off x="571500" y="1905000"/>
+            <a:ext cx="8001000" cy="4953000"/>
+          </a:xfrm>
+          <a:prstGeom prst="rect">
+            <a:avLst/>
+          </a:prstGeom>
+          <a:ln w="12700">
+            <a:miter lim="400000"/>
+          </a:ln>
+          <a:extLst>
+            <a:ext uri="{C572A759-6A51-4108-AA02-DFA0A04FC94B}">
+              <ma14:wrappingTextBoxFlag xmlns:ma14="http://schemas.microsoft.com/office/mac/drawingml/2011/main" val="1"/>
+            </a:ext>
+          </a:extLst>
+        </p:spPr>
+        <p:txBody>
+          <a:bodyPr lIns="45718" tIns="45718" rIns="45718" bIns="45718">
+            <a:normAutofit fontScale="100000" lnSpcReduction="0"/>
+          </a:bodyPr>
+          <a:lstStyle/>
+          <a:p>
+            <a:pPr lvl="0">
+              <a:defRPr sz="1800"/>
+            </a:pPr>
+            <a:r>
+              <a:rPr sz="2400"/>
+              <a:t>Body Level One</a:t>
+            </a:r>
+            <a:endParaRPr sz="2400"/>
+          </a:p>
+          <a:p>
+            <a:pPr lvl="1">
+              <a:defRPr sz="1800"/>
+            </a:pPr>
+            <a:r>
+              <a:rPr sz="2400"/>
+              <a:t>Body Level Two</a:t>
+            </a:r>
+            <a:endParaRPr sz="2400"/>
+          </a:p>
+          <a:p>
+            <a:pPr lvl="2">
+              <a:defRPr sz="1800"/>
+            </a:pPr>
+            <a:r>
+              <a:rPr sz="2400"/>
+              <a:t>Body Level Three</a:t>
+            </a:r>
+            <a:endParaRPr sz="2400"/>
+          </a:p>
+          <a:p>
+            <a:pPr lvl="3">
+              <a:defRPr sz="1800"/>
+            </a:pPr>
+            <a:r>
+              <a:rPr sz="2400"/>
+              <a:t>Body Level Four</a:t>
+            </a:r>
+            <a:endParaRPr sz="2400"/>
+          </a:p>
+          <a:p>
+            <a:pPr lvl="4">
+              <a:defRPr sz="1800"/>
+            </a:pPr>
+            <a:r>
+              <a:rPr sz="2400"/>
+              <a:t>Body Level Five</a:t>
+            </a:r>
+          </a:p>
+        </p:txBody>
+      </p:sp>
+      <p:sp>
+        <p:nvSpPr>
+          <p:cNvPr id="6" name="Shape 6"/>
+          <p:cNvSpPr/>
+          <p:nvPr>
+            <p:ph type="sldNum" sz="quarter" idx="2"/>
+          </p:nvPr>
+        </p:nvSpPr>
+        <p:spPr>
+          <a:xfrm>
+            <a:off x="4046220" y="6206695"/>
+            <a:ext cx="1051562" cy="269239"/>
+          </a:xfrm>
+          <a:prstGeom prst="rect">
+            <a:avLst/>
+          </a:prstGeom>
+          <a:ln w="12700">
+            <a:miter lim="400000"/>
+          </a:ln>
+        </p:spPr>
+        <p:txBody>
+          <a:bodyPr lIns="45718" tIns="45718" rIns="45718" bIns="45718" anchor="ctr">
+            <a:spAutoFit/>
+          </a:bodyPr>
+          <a:lstStyle>
+            <a:lvl1pPr algn="ctr">
+              <a:defRPr sz="1200">
+                <a:solidFill>
+                  <a:srgbClr val="82682C"/>
+                </a:solidFill>
+                <a:latin typeface="Calisto MT"/>
+                <a:ea typeface="Calisto MT"/>
+                <a:cs typeface="Calisto MT"/>
+                <a:sym typeface="Calisto MT"/>
+              </a:defRPr>
+            </a:lvl1pPr>
+          </a:lstStyle>
+          <a:p>
+            <a:pPr lvl="0"/>
+            <a:fld id="{86CB4B4D-7CA3-9044-876B-883B54F8677D}" type="slidenum"/>
+          </a:p>
+        </p:txBody>
+      </p:sp>
     </p:spTree>
   </p:cSld>
   <p:clrMap bg1="lt1" tx1="dk1" bg2="lt2" tx2="dk2" accent1="accent1" accent2="accent2" accent3="accent3" accent4="accent4" accent5="accent5" accent6="accent6" hlink="hlink" folHlink="folHlink"/>
@@ -4664,7 +5336,7 @@
           <a:sym typeface="Calisto MT"/>
         </a:defRPr>
       </a:lvl1pPr>
-      <a:lvl2pPr marL="955963" indent="-498763">
+      <a:lvl2pPr marL="955962" indent="-498763">
         <a:spcBef>
           <a:spcPts val="2000"/>
         </a:spcBef>
@@ -4678,7 +5350,7 @@
           <a:sym typeface="Calisto MT"/>
         </a:defRPr>
       </a:lvl2pPr>
-      <a:lvl3pPr marL="1463039" indent="-548639">
+      <a:lvl3pPr marL="1463038" indent="-548638">
         <a:spcBef>
           <a:spcPts val="2000"/>
         </a:spcBef>
@@ -4720,7 +5392,7 @@
           <a:sym typeface="Calisto MT"/>
         </a:defRPr>
       </a:lvl5pPr>
-      <a:lvl6pPr marL="2897187" indent="-615950">
+      <a:lvl6pPr marL="2897186" indent="-615950">
         <a:spcBef>
           <a:spcPts val="2000"/>
         </a:spcBef>
@@ -4789,7 +5461,7 @@
           <a:sym typeface="Calisto MT"/>
         </a:defRPr>
       </a:lvl1pPr>
-      <a:lvl2pPr indent="457200" algn="ctr">
+      <a:lvl2pPr algn="ctr">
         <a:defRPr sz="1200">
           <a:solidFill>
             <a:schemeClr val="tx1"/>
@@ -4800,7 +5472,7 @@
           <a:sym typeface="Calisto MT"/>
         </a:defRPr>
       </a:lvl2pPr>
-      <a:lvl3pPr indent="914400" algn="ctr">
+      <a:lvl3pPr algn="ctr">
         <a:defRPr sz="1200">
           <a:solidFill>
             <a:schemeClr val="tx1"/>
@@ -4811,7 +5483,7 @@
           <a:sym typeface="Calisto MT"/>
         </a:defRPr>
       </a:lvl3pPr>
-      <a:lvl4pPr indent="1371600" algn="ctr">
+      <a:lvl4pPr algn="ctr">
         <a:defRPr sz="1200">
           <a:solidFill>
             <a:schemeClr val="tx1"/>
@@ -4822,7 +5494,7 @@
           <a:sym typeface="Calisto MT"/>
         </a:defRPr>
       </a:lvl4pPr>
-      <a:lvl5pPr indent="1828800" algn="ctr">
+      <a:lvl5pPr algn="ctr">
         <a:defRPr sz="1200">
           <a:solidFill>
             <a:schemeClr val="tx1"/>
@@ -4833,7 +5505,7 @@
           <a:sym typeface="Calisto MT"/>
         </a:defRPr>
       </a:lvl5pPr>
-      <a:lvl6pPr indent="2286000" algn="ctr">
+      <a:lvl6pPr algn="ctr">
         <a:defRPr sz="1200">
           <a:solidFill>
             <a:schemeClr val="tx1"/>
@@ -4844,7 +5516,7 @@
           <a:sym typeface="Calisto MT"/>
         </a:defRPr>
       </a:lvl6pPr>
-      <a:lvl7pPr indent="2743200" algn="ctr">
+      <a:lvl7pPr algn="ctr">
         <a:defRPr sz="1200">
           <a:solidFill>
             <a:schemeClr val="tx1"/>
@@ -4855,7 +5527,7 @@
           <a:sym typeface="Calisto MT"/>
         </a:defRPr>
       </a:lvl7pPr>
-      <a:lvl8pPr indent="3200400" algn="ctr">
+      <a:lvl8pPr algn="ctr">
         <a:defRPr sz="1200">
           <a:solidFill>
             <a:schemeClr val="tx1"/>
@@ -4866,7 +5538,7 @@
           <a:sym typeface="Calisto MT"/>
         </a:defRPr>
       </a:lvl8pPr>
-      <a:lvl9pPr indent="3657600" algn="ctr">
+      <a:lvl9pPr algn="ctr">
         <a:defRPr sz="1200">
           <a:solidFill>
             <a:schemeClr val="tx1"/>
@@ -4991,7 +5663,7 @@
       </p:grpSpPr>
       <p:sp>
         <p:nvSpPr>
-          <p:cNvPr id="139" name="Shape 139"/>
+          <p:cNvPr id="141" name="Shape 141"/>
           <p:cNvSpPr/>
           <p:nvPr>
             <p:ph type="title"/>
@@ -5010,25 +5682,21 @@
           <a:bodyPr lIns="0" tIns="0" rIns="0" bIns="0">
             <a:normAutofit fontScale="100000" lnSpcReduction="0"/>
           </a:bodyPr>
-          <a:lstStyle>
-            <a:lvl1pPr defTabSz="758951">
-              <a:defRPr sz="4482"/>
-            </a:lvl1pPr>
-          </a:lstStyle>
+          <a:lstStyle/>
           <a:p>
             <a:pPr lvl="0">
               <a:defRPr sz="1800"/>
             </a:pPr>
             <a:r>
-              <a:rPr sz="4482"/>
-              <a:t>Num Of Iterations + Buffer = Plan</a:t>
+              <a:rPr sz="5400"/>
+              <a:t>Num of Iterations?</a:t>
             </a:r>
           </a:p>
         </p:txBody>
       </p:sp>
       <p:sp>
         <p:nvSpPr>
-          <p:cNvPr id="140" name="Shape 140"/>
+          <p:cNvPr id="142" name="Shape 142"/>
           <p:cNvSpPr/>
           <p:nvPr>
             <p:ph type="body" idx="1"/>
@@ -5036,8 +5704,8 @@
         </p:nvSpPr>
         <p:spPr>
           <a:xfrm>
-            <a:off x="571500" y="3125723"/>
-            <a:ext cx="8001000" cy="4114801"/>
+            <a:off x="571500" y="1905000"/>
+            <a:ext cx="8001000" cy="4114800"/>
           </a:xfrm>
           <a:prstGeom prst="rect">
             <a:avLst/>
@@ -5050,19 +5718,24 @@
             <a:pPr lvl="0">
               <a:defRPr sz="1800"/>
             </a:pPr>
+          </a:p>
+          <a:p>
+            <a:pPr lvl="0" marL="609600" indent="-609600">
+              <a:defRPr sz="1800"/>
+            </a:pPr>
             <a:r>
               <a:rPr sz="2400"/>
-              <a:t>Accept buffer from user.</a:t>
+              <a:t>Define Intent and Start Activity</a:t>
             </a:r>
             <a:endParaRPr sz="2400"/>
           </a:p>
           <a:p>
-            <a:pPr lvl="0">
+            <a:pPr lvl="0" marL="609600" indent="-609600">
               <a:defRPr sz="1800"/>
             </a:pPr>
             <a:r>
               <a:rPr sz="2400"/>
-              <a:t>Show the total on Activity A.</a:t>
+              <a:t>Display the number of iterations in second activity.</a:t>
             </a:r>
           </a:p>
         </p:txBody>
@@ -5095,7 +5768,7 @@
       </p:grpSpPr>
       <p:sp>
         <p:nvSpPr>
-          <p:cNvPr id="142" name="Shape 142"/>
+          <p:cNvPr id="144" name="Shape 144"/>
           <p:cNvSpPr/>
           <p:nvPr>
             <p:ph type="title"/>
@@ -5103,63 +5776,71 @@
         </p:nvSpPr>
         <p:spPr>
           <a:xfrm>
-            <a:off x="571500" y="2168382"/>
-            <a:ext cx="8001000" cy="1508125"/>
+            <a:off x="571500" y="274638"/>
+            <a:ext cx="8001000" cy="1143001"/>
           </a:xfrm>
           <a:prstGeom prst="rect">
             <a:avLst/>
           </a:prstGeom>
         </p:spPr>
         <p:txBody>
-          <a:bodyPr lIns="0" tIns="0" rIns="0" bIns="0"/>
-          <a:lstStyle/>
+          <a:bodyPr lIns="0" tIns="0" rIns="0" bIns="0">
+            <a:normAutofit fontScale="100000" lnSpcReduction="0"/>
+          </a:bodyPr>
+          <a:lstStyle>
+            <a:lvl1pPr defTabSz="728592">
+              <a:defRPr sz="4224"/>
+            </a:lvl1pPr>
+          </a:lstStyle>
           <a:p>
             <a:pPr lvl="0">
               <a:defRPr sz="1800"/>
             </a:pPr>
             <a:r>
-              <a:rPr sz="5400"/>
-              <a:t>Android Plugin for Gradle</a:t>
+              <a:rPr sz="4224"/>
+              <a:t>Num Of Iterations + Buffer = Plan</a:t>
             </a:r>
           </a:p>
         </p:txBody>
       </p:sp>
       <p:sp>
         <p:nvSpPr>
-          <p:cNvPr id="143" name="Shape 143"/>
+          <p:cNvPr id="145" name="Shape 145"/>
           <p:cNvSpPr/>
           <p:nvPr>
-            <p:ph type="sldNum" sz="quarter" idx="2"/>
+            <p:ph type="body" idx="1"/>
           </p:nvPr>
         </p:nvSpPr>
         <p:spPr>
-          <a:prstGeom prst="rect">
-            <a:avLst/>
-          </a:prstGeom>
-          <a:extLst>
-            <a:ext uri="{C572A759-6A51-4108-AA02-DFA0A04FC94B}">
-              <ma14:wrappingTextBoxFlag xmlns:ma14="http://schemas.microsoft.com/office/mac/drawingml/2011/main" val="1"/>
-            </a:ext>
-          </a:extLst>
+          <a:xfrm>
+            <a:off x="571500" y="3125722"/>
+            <a:ext cx="8001000" cy="4114803"/>
+          </a:xfrm>
+          <a:prstGeom prst="rect">
+            <a:avLst/>
+          </a:prstGeom>
         </p:spPr>
         <p:txBody>
-          <a:bodyPr lIns="0" tIns="0" rIns="0" bIns="0"/>
+          <a:bodyPr/>
           <a:lstStyle/>
           <a:p>
-            <a:pPr lvl="0">
-              <a:defRPr sz="1800">
-                <a:solidFill>
-                  <a:srgbClr val="000000"/>
-                </a:solidFill>
-              </a:defRPr>
-            </a:pPr>
-            <a:fld id="{86CB4B4D-7CA3-9044-876B-883B54F8677D}" type="slidenum">
-              <a:rPr sz="1200">
-                <a:solidFill>
-                  <a:srgbClr val="82682C"/>
-                </a:solidFill>
-              </a:rPr>
-            </a:fld>
+            <a:pPr lvl="0" marL="609600" indent="-609600">
+              <a:defRPr sz="1800"/>
+            </a:pPr>
+            <a:r>
+              <a:rPr sz="2400"/>
+              <a:t>Accept buffer from user.</a:t>
+            </a:r>
+            <a:endParaRPr sz="2400"/>
+          </a:p>
+          <a:p>
+            <a:pPr lvl="0" marL="609600" indent="-609600">
+              <a:defRPr sz="1800"/>
+            </a:pPr>
+            <a:r>
+              <a:rPr sz="2400"/>
+              <a:t>Show the total on Activity A.</a:t>
+            </a:r>
           </a:p>
         </p:txBody>
       </p:sp>
@@ -5198,12 +5879,18 @@
           </p:nvPr>
         </p:nvSpPr>
         <p:spPr>
+          <a:xfrm>
+            <a:off x="571500" y="2168381"/>
+            <a:ext cx="8001000" cy="1508126"/>
+          </a:xfrm>
           <a:prstGeom prst="rect">
             <a:avLst/>
           </a:prstGeom>
         </p:spPr>
         <p:txBody>
-          <a:bodyPr/>
+          <a:bodyPr lIns="0" tIns="0" rIns="0" bIns="0">
+            <a:normAutofit fontScale="100000" lnSpcReduction="0"/>
+          </a:bodyPr>
           <a:lstStyle/>
           <a:p>
             <a:pPr lvl="0">
@@ -5211,7 +5898,7 @@
             </a:pPr>
             <a:r>
               <a:rPr sz="5400"/>
-              <a:t>Activity Life Cycle</a:t>
+              <a:t>Android Plugin for Gradle</a:t>
             </a:r>
           </a:p>
         </p:txBody>
@@ -5225,6 +5912,10 @@
           </p:nvPr>
         </p:nvSpPr>
         <p:spPr>
+          <a:xfrm>
+            <a:off x="4046220" y="6206695"/>
+            <a:ext cx="1051562" cy="269242"/>
+          </a:xfrm>
           <a:prstGeom prst="rect">
             <a:avLst/>
           </a:prstGeom>
@@ -5235,7 +5926,9 @@
           </a:extLst>
         </p:spPr>
         <p:txBody>
-          <a:bodyPr/>
+          <a:bodyPr lIns="0" tIns="0" rIns="0" bIns="0">
+            <a:normAutofit fontScale="100000" lnSpcReduction="0"/>
+          </a:bodyPr>
           <a:lstStyle/>
           <a:p>
             <a:pPr lvl="0">
@@ -5252,51 +5945,6 @@
                 </a:solidFill>
               </a:rPr>
             </a:fld>
-          </a:p>
-        </p:txBody>
-      </p:sp>
-      <p:sp>
-        <p:nvSpPr>
-          <p:cNvPr id="149" name="Shape 149"/>
-          <p:cNvSpPr/>
-          <p:nvPr/>
-        </p:nvSpPr>
-        <p:spPr>
-          <a:xfrm>
-            <a:off x="711785" y="2011318"/>
-            <a:ext cx="6683629" cy="574041"/>
-          </a:xfrm>
-          <a:prstGeom prst="rect">
-            <a:avLst/>
-          </a:prstGeom>
-          <a:ln w="12700">
-            <a:miter lim="400000"/>
-          </a:ln>
-          <a:extLst>
-            <a:ext uri="{C572A759-6A51-4108-AA02-DFA0A04FC94B}">
-              <ma14:wrappingTextBoxFlag xmlns:ma14="http://schemas.microsoft.com/office/mac/drawingml/2011/main" val="1"/>
-            </a:ext>
-          </a:extLst>
-        </p:spPr>
-        <p:txBody>
-          <a:bodyPr wrap="none" lIns="45719" rIns="45719">
-            <a:spAutoFit/>
-          </a:bodyPr>
-          <a:lstStyle>
-            <a:lvl1pPr marL="180473" indent="-180473">
-              <a:buSzPct val="100000"/>
-              <a:buChar char="•"/>
-              <a:defRPr sz="3200"/>
-            </a:lvl1pPr>
-          </a:lstStyle>
-          <a:p>
-            <a:pPr lvl="0">
-              <a:defRPr sz="1800"/>
-            </a:pPr>
-            <a:r>
-              <a:rPr sz="3200"/>
-              <a:t> Log the lifecycle events on an Activity</a:t>
-            </a:r>
           </a:p>
         </p:txBody>
       </p:sp>
@@ -5328,7 +5976,7 @@
       </p:grpSpPr>
       <p:sp>
         <p:nvSpPr>
-          <p:cNvPr id="151" name="Shape 151"/>
+          <p:cNvPr id="152" name="Shape 152"/>
           <p:cNvSpPr/>
           <p:nvPr>
             <p:ph type="title"/>
@@ -5336,8 +5984,8 @@
         </p:nvSpPr>
         <p:spPr>
           <a:xfrm>
-            <a:off x="571500" y="274638"/>
-            <a:ext cx="8001000" cy="1143001"/>
+            <a:off x="571500" y="163703"/>
+            <a:ext cx="8001000" cy="1364870"/>
           </a:xfrm>
           <a:prstGeom prst="rect">
             <a:avLst/>
@@ -5354,14 +6002,172 @@
             </a:pPr>
             <a:r>
               <a:rPr sz="5400"/>
-              <a:t>References</a:t>
+              <a:t>Activity Life Cycle</a:t>
             </a:r>
           </a:p>
         </p:txBody>
       </p:sp>
       <p:sp>
         <p:nvSpPr>
-          <p:cNvPr id="152" name="Shape 152"/>
+          <p:cNvPr id="153" name="Shape 153"/>
+          <p:cNvSpPr/>
+          <p:nvPr>
+            <p:ph type="sldNum" sz="quarter" idx="2"/>
+          </p:nvPr>
+        </p:nvSpPr>
+        <p:spPr>
+          <a:xfrm>
+            <a:off x="4046220" y="6206695"/>
+            <a:ext cx="1051562" cy="269242"/>
+          </a:xfrm>
+          <a:prstGeom prst="rect">
+            <a:avLst/>
+          </a:prstGeom>
+          <a:extLst>
+            <a:ext uri="{C572A759-6A51-4108-AA02-DFA0A04FC94B}">
+              <ma14:wrappingTextBoxFlag xmlns:ma14="http://schemas.microsoft.com/office/mac/drawingml/2011/main" val="1"/>
+            </a:ext>
+          </a:extLst>
+        </p:spPr>
+        <p:txBody>
+          <a:bodyPr lIns="0" tIns="0" rIns="0" bIns="0">
+            <a:normAutofit fontScale="100000" lnSpcReduction="0"/>
+          </a:bodyPr>
+          <a:lstStyle>
+            <a:lvl1pPr defTabSz="859536">
+              <a:defRPr sz="1128"/>
+            </a:lvl1pPr>
+          </a:lstStyle>
+          <a:p>
+            <a:pPr lvl="0">
+              <a:defRPr sz="1800">
+                <a:solidFill>
+                  <a:srgbClr val="000000"/>
+                </a:solidFill>
+              </a:defRPr>
+            </a:pPr>
+            <a:fld id="{86CB4B4D-7CA3-9044-876B-883B54F8677D}" type="slidenum">
+              <a:rPr sz="1128">
+                <a:solidFill>
+                  <a:srgbClr val="82682C"/>
+                </a:solidFill>
+              </a:rPr>
+            </a:fld>
+          </a:p>
+        </p:txBody>
+      </p:sp>
+      <p:sp>
+        <p:nvSpPr>
+          <p:cNvPr id="154" name="Shape 154"/>
+          <p:cNvSpPr/>
+          <p:nvPr/>
+        </p:nvSpPr>
+        <p:spPr>
+          <a:xfrm>
+            <a:off x="711784" y="2011317"/>
+            <a:ext cx="6920164" cy="561339"/>
+          </a:xfrm>
+          <a:prstGeom prst="rect">
+            <a:avLst/>
+          </a:prstGeom>
+          <a:ln w="12700">
+            <a:miter lim="400000"/>
+          </a:ln>
+          <a:extLst>
+            <a:ext uri="{C572A759-6A51-4108-AA02-DFA0A04FC94B}">
+              <ma14:wrappingTextBoxFlag xmlns:ma14="http://schemas.microsoft.com/office/mac/drawingml/2011/main" val="1"/>
+            </a:ext>
+          </a:extLst>
+        </p:spPr>
+        <p:txBody>
+          <a:bodyPr wrap="none" lIns="45718" tIns="45718" rIns="45718" bIns="45718">
+            <a:spAutoFit/>
+          </a:bodyPr>
+          <a:lstStyle>
+            <a:lvl1pPr marL="320840" indent="-320840">
+              <a:buSzPct val="100000"/>
+              <a:buChar char="•"/>
+              <a:defRPr sz="3200">
+                <a:latin typeface="Calisto MT"/>
+                <a:ea typeface="Calisto MT"/>
+                <a:cs typeface="Calisto MT"/>
+                <a:sym typeface="Calisto MT"/>
+              </a:defRPr>
+            </a:lvl1pPr>
+          </a:lstStyle>
+          <a:p>
+            <a:pPr lvl="0">
+              <a:defRPr sz="1800"/>
+            </a:pPr>
+            <a:r>
+              <a:rPr sz="3200"/>
+              <a:t> Log the lifecycle events on an Activity</a:t>
+            </a:r>
+          </a:p>
+        </p:txBody>
+      </p:sp>
+    </p:spTree>
+  </p:cSld>
+  <p:clrMapOvr>
+    <a:masterClrMapping/>
+  </p:clrMapOvr>
+  <p:transition spd="med" advClick="1"/>
+</p:sld>
+</file>
+
+<file path=ppt/slides/slide14.xml><?xml version="1.0" encoding="utf-8"?>
+<p:sld xmlns:a="http://schemas.openxmlformats.org/drawingml/2006/main" xmlns:r="http://schemas.openxmlformats.org/officeDocument/2006/relationships" xmlns:p="http://schemas.openxmlformats.org/presentationml/2006/main" showMasterSp="1" showMasterPhAnim="1">
+  <p:cSld>
+    <p:spTree>
+      <p:nvGrpSpPr>
+        <p:cNvPr id="1" name=""/>
+        <p:cNvGrpSpPr/>
+        <p:nvPr/>
+      </p:nvGrpSpPr>
+      <p:grpSpPr>
+        <a:xfrm>
+          <a:off x="0" y="0"/>
+          <a:ext cx="0" cy="0"/>
+          <a:chOff x="0" y="0"/>
+          <a:chExt cx="0" cy="0"/>
+        </a:xfrm>
+      </p:grpSpPr>
+      <p:sp>
+        <p:nvSpPr>
+          <p:cNvPr id="156" name="Shape 156"/>
+          <p:cNvSpPr/>
+          <p:nvPr>
+            <p:ph type="title"/>
+          </p:nvPr>
+        </p:nvSpPr>
+        <p:spPr>
+          <a:xfrm>
+            <a:off x="571500" y="274638"/>
+            <a:ext cx="8001000" cy="1143001"/>
+          </a:xfrm>
+          <a:prstGeom prst="rect">
+            <a:avLst/>
+          </a:prstGeom>
+        </p:spPr>
+        <p:txBody>
+          <a:bodyPr lIns="0" tIns="0" rIns="0" bIns="0">
+            <a:normAutofit fontScale="100000" lnSpcReduction="0"/>
+          </a:bodyPr>
+          <a:lstStyle/>
+          <a:p>
+            <a:pPr lvl="0">
+              <a:defRPr sz="1800"/>
+            </a:pPr>
+            <a:r>
+              <a:rPr sz="5400"/>
+              <a:t>References</a:t>
+            </a:r>
+          </a:p>
+        </p:txBody>
+      </p:sp>
+      <p:sp>
+        <p:nvSpPr>
+          <p:cNvPr id="157" name="Shape 157"/>
           <p:cNvSpPr/>
           <p:nvPr>
             <p:ph type="body" idx="1"/>
@@ -5380,7 +6186,7 @@
           <a:bodyPr/>
           <a:lstStyle/>
           <a:p>
-            <a:pPr lvl="0">
+            <a:pPr lvl="0" marL="609600" indent="-609600">
               <a:defRPr sz="1800"/>
             </a:pPr>
             <a:r>
@@ -5395,104 +6201,62 @@
               </a:rPr>
               <a:t>article.html</a:t>
             </a:r>
-            <a:endParaRPr sz="2400"/>
-          </a:p>
-          <a:p>
-            <a:pPr lvl="0">
-              <a:defRPr sz="1800"/>
-            </a:pPr>
-            <a:r>
-              <a:rPr sz="2400" u="sng">
-                <a:solidFill>
-                  <a:srgbClr val="99350B"/>
-                </a:solidFill>
-                <a:uFill>
-                  <a:solidFill>
-                    <a:srgbClr val="99350B"/>
-                  </a:solidFill>
-                </a:uFill>
+          </a:p>
+          <a:p>
+            <a:pPr lvl="0" marL="609600" indent="-609600">
+              <a:buClr>
+                <a:srgbClr val="99350B"/>
+              </a:buClr>
+              <a:defRPr sz="1800"/>
+            </a:pPr>
+            <a:r>
+              <a:rPr sz="2400">
                 <a:hlinkClick r:id="rId3" invalidUrl="" action="" tgtFrame="" tooltip="" history="1" highlightClick="0" endSnd="0"/>
               </a:rPr>
               <a:t>http://developer.android.com/guide/components/intents-</a:t>
             </a:r>
             <a:r>
-              <a:rPr sz="2400" u="sng">
-                <a:solidFill>
-                  <a:srgbClr val="99350B"/>
-                </a:solidFill>
-                <a:uFill>
-                  <a:solidFill>
-                    <a:srgbClr val="99350B"/>
-                  </a:solidFill>
-                </a:uFill>
+              <a:rPr sz="2400">
                 <a:hlinkClick r:id="rId3" invalidUrl="" action="" tgtFrame="" tooltip="" history="1" highlightClick="0" endSnd="0"/>
               </a:rPr>
               <a:t>filters.html</a:t>
             </a:r>
-            <a:endParaRPr sz="2400"/>
-          </a:p>
-          <a:p>
-            <a:pPr lvl="0">
-              <a:defRPr sz="1800"/>
-            </a:pPr>
-            <a:r>
-              <a:rPr sz="2400" u="sng">
-                <a:solidFill>
-                  <a:srgbClr val="99350B"/>
-                </a:solidFill>
-                <a:uFill>
-                  <a:solidFill>
-                    <a:srgbClr val="99350B"/>
-                  </a:solidFill>
-                </a:uFill>
+          </a:p>
+          <a:p>
+            <a:pPr lvl="0" marL="609600" indent="-609600">
+              <a:buClr>
+                <a:srgbClr val="99350B"/>
+              </a:buClr>
+              <a:defRPr sz="1800"/>
+            </a:pPr>
+            <a:r>
+              <a:rPr sz="2400">
                 <a:hlinkClick r:id="rId4" invalidUrl="" action="" tgtFrame="" tooltip="" history="1" highlightClick="0" endSnd="0"/>
               </a:rPr>
               <a:t>http://developer.android.com/guide/components/</a:t>
             </a:r>
             <a:r>
-              <a:rPr sz="2400" u="sng">
-                <a:solidFill>
-                  <a:srgbClr val="99350B"/>
-                </a:solidFill>
-                <a:uFill>
-                  <a:solidFill>
-                    <a:srgbClr val="99350B"/>
-                  </a:solidFill>
-                </a:uFill>
+              <a:rPr sz="2400">
                 <a:hlinkClick r:id="rId4" invalidUrl="" action="" tgtFrame="" tooltip="" history="1" highlightClick="0" endSnd="0"/>
               </a:rPr>
               <a:t>fundamentals.html</a:t>
             </a:r>
-            <a:endParaRPr sz="2400"/>
-          </a:p>
-          <a:p>
-            <a:pPr lvl="0">
-              <a:defRPr sz="1800"/>
-            </a:pPr>
-            <a:r>
-              <a:rPr sz="2400" u="sng">
-                <a:solidFill>
-                  <a:srgbClr val="99350B"/>
-                </a:solidFill>
-                <a:uFill>
-                  <a:solidFill>
-                    <a:srgbClr val="99350B"/>
-                  </a:solidFill>
-                </a:uFill>
+          </a:p>
+          <a:p>
+            <a:pPr lvl="0" marL="609600" indent="-609600">
+              <a:buClr>
+                <a:srgbClr val="99350B"/>
+              </a:buClr>
+              <a:defRPr sz="1800"/>
+            </a:pPr>
+            <a:r>
+              <a:rPr sz="2400">
                 <a:hlinkClick r:id="rId5" invalidUrl="" action="" tgtFrame="" tooltip="" history="1" highlightClick="0" endSnd="0"/>
               </a:rPr>
               <a:t>http://developer.android.com/training/</a:t>
             </a:r>
             <a:r>
-              <a:rPr sz="2400" u="sng">
-                <a:solidFill>
-                  <a:srgbClr val="99350B"/>
-                </a:solidFill>
-                <a:uFill>
-                  <a:solidFill>
-                    <a:srgbClr val="99350B"/>
-                  </a:solidFill>
-                </a:uFill>
+              <a:rPr sz="2400">
                 <a:hlinkClick r:id="rId5" invalidUrl="" action="" tgtFrame="" tooltip="" history="1" highlightClick="0" endSnd="0"/>
               </a:rPr>
               <a:t>index.html</a:t>
@@ -5548,8 +6312,8 @@
             <a:normAutofit fontScale="100000" lnSpcReduction="0"/>
           </a:bodyPr>
           <a:lstStyle>
-            <a:lvl1pPr defTabSz="859536">
-              <a:defRPr sz="5076"/>
+            <a:lvl1pPr defTabSz="842345">
+              <a:defRPr sz="4900"/>
             </a:lvl1pPr>
           </a:lstStyle>
           <a:p>
@@ -5557,7 +6321,7 @@
               <a:defRPr sz="1800"/>
             </a:pPr>
             <a:r>
-              <a:rPr sz="5076"/>
+              <a:rPr sz="4900"/>
               <a:t>Before We Start, make sure….</a:t>
             </a:r>
           </a:p>
@@ -5584,7 +6348,7 @@
           <a:bodyPr/>
           <a:lstStyle/>
           <a:p>
-            <a:pPr lvl="0">
+            <a:pPr lvl="0" marL="609600" indent="-609600">
               <a:defRPr sz="1800"/>
             </a:pPr>
             <a:r>
@@ -5594,7 +6358,7 @@
             <a:endParaRPr sz="2400"/>
           </a:p>
           <a:p>
-            <a:pPr lvl="0">
+            <a:pPr lvl="0" marL="609600" indent="-609600">
               <a:defRPr sz="1800"/>
             </a:pPr>
             <a:r>
@@ -5604,7 +6368,7 @@
             <a:endParaRPr sz="2400"/>
           </a:p>
           <a:p>
-            <a:pPr lvl="0">
+            <a:pPr lvl="0" marL="609600" indent="-609600">
               <a:defRPr sz="1800"/>
             </a:pPr>
             <a:r>
@@ -5614,16 +6378,12 @@
             <a:endParaRPr sz="2400"/>
           </a:p>
           <a:p>
-            <a:pPr lvl="0">
+            <a:pPr lvl="0" marL="609600" indent="-609600">
               <a:defRPr sz="1800"/>
             </a:pPr>
             <a:r>
               <a:rPr sz="2400"/>
-              <a:t>The demo app is checked out and running from - </a:t>
-            </a:r>
-            <a:r>
-              <a:rPr sz="2400"/>
-              <a:t>git@github.com:abhinavmanchanda/ProjectPlanner.git</a:t>
+              <a:t>The demo app is checked out and running from - git@github.com:abhinavmanchanda/ProjectPlanner.git</a:t>
             </a:r>
           </a:p>
         </p:txBody>
@@ -5697,8 +6457,8 @@
         </p:nvSpPr>
         <p:spPr>
           <a:xfrm>
-            <a:off x="571500" y="2576091"/>
-            <a:ext cx="8001000" cy="4114801"/>
+            <a:off x="571500" y="2576090"/>
+            <a:ext cx="8001000" cy="4114803"/>
           </a:xfrm>
           <a:prstGeom prst="rect">
             <a:avLst/>
@@ -5708,7 +6468,7 @@
           <a:bodyPr/>
           <a:lstStyle/>
           <a:p>
-            <a:pPr lvl="0">
+            <a:pPr lvl="0" marL="609600" indent="-609600">
               <a:defRPr sz="1800"/>
             </a:pPr>
             <a:r>
@@ -5718,7 +6478,7 @@
             <a:endParaRPr sz="2400"/>
           </a:p>
           <a:p>
-            <a:pPr lvl="0">
+            <a:pPr lvl="0" marL="609600" indent="-609600">
               <a:defRPr sz="1800"/>
             </a:pPr>
             <a:r>
@@ -5728,7 +6488,7 @@
             <a:endParaRPr sz="2400"/>
           </a:p>
           <a:p>
-            <a:pPr lvl="0">
+            <a:pPr lvl="0" marL="609600" indent="-609600">
               <a:defRPr sz="1800"/>
             </a:pPr>
             <a:r>
@@ -5738,12 +6498,22 @@
             <a:endParaRPr sz="2400"/>
           </a:p>
           <a:p>
-            <a:pPr lvl="0">
+            <a:pPr lvl="0" marL="609600" indent="-609600">
               <a:defRPr sz="1800"/>
             </a:pPr>
             <a:r>
               <a:rPr sz="2400"/>
               <a:t>Navigation between Activities using Intents.</a:t>
+            </a:r>
+            <a:endParaRPr sz="2400"/>
+          </a:p>
+          <a:p>
+            <a:pPr lvl="0" marL="609600" indent="-609600">
+              <a:defRPr sz="1800"/>
+            </a:pPr>
+            <a:r>
+              <a:rPr sz="2400"/>
+              <a:t>Android Gradle Plugin.</a:t>
             </a:r>
           </a:p>
         </p:txBody>
@@ -5815,10 +6585,10 @@
         </p:nvGrpSpPr>
         <p:grpSpPr>
           <a:xfrm>
-            <a:off x="578411" y="1968246"/>
-            <a:ext cx="1376325" cy="4343908"/>
-            <a:chOff x="0" y="68885"/>
-            <a:chExt cx="1376323" cy="4343907"/>
+            <a:off x="578410" y="1968245"/>
+            <a:ext cx="1376328" cy="4343911"/>
+            <a:chOff x="0" y="0"/>
+            <a:chExt cx="1376326" cy="4343909"/>
           </a:xfrm>
         </p:grpSpPr>
         <p:sp>
@@ -5829,8 +6599,8 @@
           </p:nvSpPr>
           <p:spPr>
             <a:xfrm>
-              <a:off x="0" y="68885"/>
-              <a:ext cx="1376324" cy="1239931"/>
+              <a:off x="-1" y="-1"/>
+              <a:ext cx="1376328" cy="1239933"/>
             </a:xfrm>
             <a:prstGeom prst="roundRect">
               <a:avLst>
@@ -5860,7 +6630,14 @@
             </a:bodyPr>
             <a:lstStyle/>
             <a:p>
-              <a:pPr lvl="0"/>
+              <a:pPr lvl="0">
+                <a:defRPr>
+                  <a:latin typeface="Calisto MT"/>
+                  <a:ea typeface="Calisto MT"/>
+                  <a:cs typeface="Calisto MT"/>
+                  <a:sym typeface="Calisto MT"/>
+                </a:defRPr>
+              </a:pPr>
             </a:p>
           </p:txBody>
         </p:sp>
@@ -5872,8 +6649,8 @@
           </p:nvSpPr>
           <p:spPr>
             <a:xfrm>
-              <a:off x="0" y="1620873"/>
-              <a:ext cx="1376324" cy="1239932"/>
+              <a:off x="-1" y="1551988"/>
+              <a:ext cx="1376328" cy="1239933"/>
             </a:xfrm>
             <a:prstGeom prst="roundRect">
               <a:avLst>
@@ -5903,7 +6680,14 @@
             </a:bodyPr>
             <a:lstStyle/>
             <a:p>
-              <a:pPr lvl="0"/>
+              <a:pPr lvl="0">
+                <a:defRPr>
+                  <a:latin typeface="Calisto MT"/>
+                  <a:ea typeface="Calisto MT"/>
+                  <a:cs typeface="Calisto MT"/>
+                  <a:sym typeface="Calisto MT"/>
+                </a:defRPr>
+              </a:pPr>
             </a:p>
           </p:txBody>
         </p:sp>
@@ -5915,8 +6699,8 @@
           </p:nvSpPr>
           <p:spPr>
             <a:xfrm>
-              <a:off x="0" y="3172861"/>
-              <a:ext cx="1376324" cy="1239932"/>
+              <a:off x="-1" y="3103976"/>
+              <a:ext cx="1376328" cy="1239934"/>
             </a:xfrm>
             <a:prstGeom prst="roundRect">
               <a:avLst>
@@ -5946,7 +6730,14 @@
             </a:bodyPr>
             <a:lstStyle/>
             <a:p>
-              <a:pPr lvl="0"/>
+              <a:pPr lvl="0">
+                <a:defRPr>
+                  <a:latin typeface="Calisto MT"/>
+                  <a:ea typeface="Calisto MT"/>
+                  <a:cs typeface="Calisto MT"/>
+                  <a:sym typeface="Calisto MT"/>
+                </a:defRPr>
+              </a:pPr>
             </a:p>
           </p:txBody>
         </p:sp>
@@ -5959,8 +6750,8 @@
         </p:nvSpPr>
         <p:spPr>
           <a:xfrm>
-            <a:off x="2050822" y="3477491"/>
-            <a:ext cx="3828497" cy="1031241"/>
+            <a:off x="2050821" y="3477490"/>
+            <a:ext cx="3828498" cy="850901"/>
           </a:xfrm>
           <a:prstGeom prst="rect">
             <a:avLst/>
@@ -5982,38 +6773,81 @@
           <a:p>
             <a:pPr lvl="0"/>
             <a:r>
-              <a:rPr sz="2200"/>
+              <a:rPr sz="2200">
+                <a:latin typeface="Calisto MT"/>
+                <a:ea typeface="Calisto MT"/>
+                <a:cs typeface="Calisto MT"/>
+                <a:sym typeface="Calisto MT"/>
+              </a:rPr>
               <a:t>Intents</a:t>
             </a:r>
             <a:r>
-              <a:rPr sz="2000"/>
+              <a:rPr sz="2000">
+                <a:latin typeface="Calisto MT"/>
+                <a:ea typeface="Calisto MT"/>
+                <a:cs typeface="Calisto MT"/>
+                <a:sym typeface="Calisto MT"/>
+              </a:rPr>
               <a:t> - </a:t>
             </a:r>
             <a:r>
-              <a:rPr sz="2200"/>
+              <a:rPr sz="2200">
+                <a:latin typeface="Calisto MT"/>
+                <a:ea typeface="Calisto MT"/>
+                <a:cs typeface="Calisto MT"/>
+                <a:sym typeface="Calisto MT"/>
+              </a:rPr>
               <a:t>Intent</a:t>
             </a:r>
             <a:r>
-              <a:rPr sz="2000"/>
+              <a:rPr sz="2000">
+                <a:latin typeface="Calisto MT"/>
+                <a:ea typeface="Calisto MT"/>
+                <a:cs typeface="Calisto MT"/>
+                <a:sym typeface="Calisto MT"/>
+              </a:rPr>
               <a:t> Filters</a:t>
             </a:r>
-            <a:endParaRPr sz="2000"/>
-          </a:p>
-          <a:p>
-            <a:pPr lvl="0" marL="180473" indent="-180473">
+            <a:endParaRPr sz="2000">
+              <a:latin typeface="Calisto MT"/>
+              <a:ea typeface="Calisto MT"/>
+              <a:cs typeface="Calisto MT"/>
+              <a:sym typeface="Calisto MT"/>
+            </a:endParaRPr>
+          </a:p>
+          <a:p>
+            <a:pPr lvl="0" marL="180472" indent="-180472">
               <a:buSzPct val="100000"/>
               <a:buChar char="•"/>
             </a:pPr>
             <a:r>
+              <a:rPr>
+                <a:latin typeface="Calisto MT"/>
+                <a:ea typeface="Calisto MT"/>
+                <a:cs typeface="Calisto MT"/>
+                <a:sym typeface="Calisto MT"/>
+              </a:rPr>
               <a:t>Action</a:t>
             </a:r>
-          </a:p>
-          <a:p>
-            <a:pPr lvl="0" marL="180473" indent="-180473">
+            <a:endParaRPr>
+              <a:latin typeface="Calisto MT"/>
+              <a:ea typeface="Calisto MT"/>
+              <a:cs typeface="Calisto MT"/>
+              <a:sym typeface="Calisto MT"/>
+            </a:endParaRPr>
+          </a:p>
+          <a:p>
+            <a:pPr lvl="0" marL="180472" indent="-180472">
               <a:buSzPct val="100000"/>
               <a:buChar char="•"/>
             </a:pPr>
             <a:r>
+              <a:rPr>
+                <a:latin typeface="Calisto MT"/>
+                <a:ea typeface="Calisto MT"/>
+                <a:cs typeface="Calisto MT"/>
+                <a:sym typeface="Calisto MT"/>
+              </a:rPr>
               <a:t>Data</a:t>
             </a:r>
           </a:p>
@@ -6027,8 +6861,8 @@
         </p:nvSpPr>
         <p:spPr>
           <a:xfrm>
-            <a:off x="2082007" y="1689190"/>
-            <a:ext cx="3612970" cy="1615441"/>
+            <a:off x="2046905" y="1884795"/>
+            <a:ext cx="3612971" cy="1384301"/>
           </a:xfrm>
           <a:prstGeom prst="rect">
             <a:avLst/>
@@ -6050,44 +6884,96 @@
           <a:p>
             <a:pPr lvl="0"/>
             <a:r>
-              <a:rPr sz="2200"/>
+              <a:rPr sz="2200">
+                <a:latin typeface="Calisto MT"/>
+                <a:ea typeface="Calisto MT"/>
+                <a:cs typeface="Calisto MT"/>
+                <a:sym typeface="Calisto MT"/>
+              </a:rPr>
               <a:t>Application Components</a:t>
             </a:r>
-            <a:endParaRPr sz="2200"/>
-          </a:p>
-          <a:p>
-            <a:pPr lvl="0" marL="180473" indent="-180473">
+            <a:endParaRPr sz="2200">
+              <a:latin typeface="Calisto MT"/>
+              <a:ea typeface="Calisto MT"/>
+              <a:cs typeface="Calisto MT"/>
+              <a:sym typeface="Calisto MT"/>
+            </a:endParaRPr>
+          </a:p>
+          <a:p>
+            <a:pPr lvl="0" marL="180472" indent="-180472">
               <a:buSzPct val="100000"/>
               <a:buChar char="•"/>
             </a:pPr>
             <a:r>
+              <a:rPr>
+                <a:latin typeface="Calisto MT"/>
+                <a:ea typeface="Calisto MT"/>
+                <a:cs typeface="Calisto MT"/>
+                <a:sym typeface="Calisto MT"/>
+              </a:rPr>
               <a:t>Activities</a:t>
             </a:r>
-          </a:p>
-          <a:p>
-            <a:pPr lvl="0" marL="180473" indent="-180473">
+            <a:endParaRPr>
+              <a:latin typeface="Calisto MT"/>
+              <a:ea typeface="Calisto MT"/>
+              <a:cs typeface="Calisto MT"/>
+              <a:sym typeface="Calisto MT"/>
+            </a:endParaRPr>
+          </a:p>
+          <a:p>
+            <a:pPr lvl="0" marL="180472" indent="-180472">
               <a:buSzPct val="100000"/>
               <a:buChar char="•"/>
             </a:pPr>
             <a:r>
+              <a:rPr>
+                <a:latin typeface="Calisto MT"/>
+                <a:ea typeface="Calisto MT"/>
+                <a:cs typeface="Calisto MT"/>
+                <a:sym typeface="Calisto MT"/>
+              </a:rPr>
               <a:t>Services</a:t>
             </a:r>
-          </a:p>
-          <a:p>
-            <a:pPr lvl="0" marL="180473" indent="-180473">
+            <a:endParaRPr>
+              <a:latin typeface="Calisto MT"/>
+              <a:ea typeface="Calisto MT"/>
+              <a:cs typeface="Calisto MT"/>
+              <a:sym typeface="Calisto MT"/>
+            </a:endParaRPr>
+          </a:p>
+          <a:p>
+            <a:pPr lvl="0" marL="180472" indent="-180472">
               <a:buSzPct val="100000"/>
               <a:buChar char="•"/>
             </a:pPr>
             <a:r>
+              <a:rPr>
+                <a:latin typeface="Calisto MT"/>
+                <a:ea typeface="Calisto MT"/>
+                <a:cs typeface="Calisto MT"/>
+                <a:sym typeface="Calisto MT"/>
+              </a:rPr>
               <a:t>Broadcast Receivers</a:t>
             </a:r>
-          </a:p>
-          <a:p>
-            <a:pPr lvl="0" marL="180473" indent="-180473">
+            <a:endParaRPr>
+              <a:latin typeface="Calisto MT"/>
+              <a:ea typeface="Calisto MT"/>
+              <a:cs typeface="Calisto MT"/>
+              <a:sym typeface="Calisto MT"/>
+            </a:endParaRPr>
+          </a:p>
+          <a:p>
+            <a:pPr lvl="0" marL="180472" indent="-180472">
               <a:buSzPct val="100000"/>
               <a:buChar char="•"/>
             </a:pPr>
             <a:r>
+              <a:rPr>
+                <a:latin typeface="Calisto MT"/>
+                <a:ea typeface="Calisto MT"/>
+                <a:cs typeface="Calisto MT"/>
+                <a:sym typeface="Calisto MT"/>
+              </a:rPr>
               <a:t>Content Providers</a:t>
             </a:r>
           </a:p>
@@ -6101,8 +6987,8 @@
         </p:nvSpPr>
         <p:spPr>
           <a:xfrm>
-            <a:off x="2149939" y="4975769"/>
-            <a:ext cx="4844122" cy="1615441"/>
+            <a:off x="2149938" y="4975769"/>
+            <a:ext cx="4844123" cy="1117601"/>
           </a:xfrm>
           <a:prstGeom prst="rect">
             <a:avLst/>
@@ -6124,35 +7010,75 @@
           <a:p>
             <a:pPr lvl="0"/>
             <a:r>
-              <a:rPr sz="2200"/>
+              <a:rPr sz="2200">
+                <a:latin typeface="Calisto MT"/>
+                <a:ea typeface="Calisto MT"/>
+                <a:cs typeface="Calisto MT"/>
+                <a:sym typeface="Calisto MT"/>
+              </a:rPr>
               <a:t>Project Structure</a:t>
             </a:r>
-            <a:endParaRPr sz="2200"/>
-          </a:p>
-          <a:p>
-            <a:pPr lvl="0" marL="180473" indent="-180473">
+            <a:endParaRPr sz="2200">
+              <a:latin typeface="Calisto MT"/>
+              <a:ea typeface="Calisto MT"/>
+              <a:cs typeface="Calisto MT"/>
+              <a:sym typeface="Calisto MT"/>
+            </a:endParaRPr>
+          </a:p>
+          <a:p>
+            <a:pPr lvl="0" marL="180472" indent="-180472">
               <a:buSzPct val="100000"/>
               <a:buChar char="•"/>
             </a:pPr>
             <a:r>
+              <a:rPr>
+                <a:latin typeface="Calisto MT"/>
+                <a:ea typeface="Calisto MT"/>
+                <a:cs typeface="Calisto MT"/>
+                <a:sym typeface="Calisto MT"/>
+              </a:rPr>
               <a:t>Android Manifest</a:t>
             </a:r>
-          </a:p>
-          <a:p>
-            <a:pPr lvl="0" marL="180473" indent="-180473">
+            <a:endParaRPr>
+              <a:latin typeface="Calisto MT"/>
+              <a:ea typeface="Calisto MT"/>
+              <a:cs typeface="Calisto MT"/>
+              <a:sym typeface="Calisto MT"/>
+            </a:endParaRPr>
+          </a:p>
+          <a:p>
+            <a:pPr lvl="0" marL="180472" indent="-180472">
               <a:buSzPct val="100000"/>
               <a:buChar char="•"/>
             </a:pPr>
             <a:r>
+              <a:rPr>
+                <a:latin typeface="Calisto MT"/>
+                <a:ea typeface="Calisto MT"/>
+                <a:cs typeface="Calisto MT"/>
+                <a:sym typeface="Calisto MT"/>
+              </a:rPr>
               <a:t>Resource Files</a:t>
             </a:r>
-          </a:p>
-          <a:p>
-            <a:pPr lvl="0" marL="180473" indent="-180473">
+            <a:endParaRPr>
+              <a:latin typeface="Calisto MT"/>
+              <a:ea typeface="Calisto MT"/>
+              <a:cs typeface="Calisto MT"/>
+              <a:sym typeface="Calisto MT"/>
+            </a:endParaRPr>
+          </a:p>
+          <a:p>
+            <a:pPr lvl="0" marL="180472" indent="-180472">
               <a:buSzPct val="100000"/>
               <a:buChar char="•"/>
             </a:pPr>
             <a:r>
+              <a:rPr>
+                <a:latin typeface="Calisto MT"/>
+                <a:ea typeface="Calisto MT"/>
+                <a:cs typeface="Calisto MT"/>
+                <a:sym typeface="Calisto MT"/>
+              </a:rPr>
               <a:t>Source Code</a:t>
             </a:r>
           </a:p>
@@ -6194,8 +7120,8 @@
         </p:nvSpPr>
         <p:spPr>
           <a:xfrm>
-            <a:off x="571500" y="274638"/>
-            <a:ext cx="8001000" cy="1143001"/>
+            <a:off x="571500" y="2168381"/>
+            <a:ext cx="8001000" cy="1508126"/>
           </a:xfrm>
           <a:prstGeom prst="rect">
             <a:avLst/>
@@ -6212,7 +7138,7 @@
             </a:pPr>
             <a:r>
               <a:rPr sz="5400"/>
-              <a:t>Get Started</a:t>
+              <a:t>Activity Lifecycle</a:t>
             </a:r>
           </a:p>
         </p:txBody>
@@ -6222,39 +7148,43 @@
           <p:cNvPr id="119" name="Shape 119"/>
           <p:cNvSpPr/>
           <p:nvPr>
-            <p:ph type="body" idx="1"/>
+            <p:ph type="sldNum" sz="quarter" idx="2"/>
           </p:nvPr>
         </p:nvSpPr>
         <p:spPr>
           <a:xfrm>
-            <a:off x="571500" y="2473410"/>
-            <a:ext cx="8001000" cy="4114801"/>
+            <a:off x="4046220" y="6117795"/>
+            <a:ext cx="1051562" cy="177801"/>
           </a:xfrm>
           <a:prstGeom prst="rect">
             <a:avLst/>
           </a:prstGeom>
+          <a:extLst>
+            <a:ext uri="{C572A759-6A51-4108-AA02-DFA0A04FC94B}">
+              <ma14:wrappingTextBoxFlag xmlns:ma14="http://schemas.microsoft.com/office/mac/drawingml/2011/main" val="1"/>
+            </a:ext>
+          </a:extLst>
         </p:spPr>
         <p:txBody>
-          <a:bodyPr/>
+          <a:bodyPr lIns="0" tIns="0" rIns="0" bIns="0">
+            <a:normAutofit fontScale="100000" lnSpcReduction="0"/>
+          </a:bodyPr>
           <a:lstStyle/>
           <a:p>
             <a:pPr lvl="0">
-              <a:defRPr sz="1800"/>
-            </a:pPr>
-            <a:r>
-              <a:rPr sz="2400"/>
-              <a:t>Content Layout</a:t>
-            </a:r>
-            <a:endParaRPr sz="2400"/>
-          </a:p>
-          <a:p>
-            <a:pPr lvl="0">
-              <a:defRPr sz="1800"/>
-            </a:pPr>
-            <a:r>
-              <a:rPr sz="2400"/>
-              <a:t>UI Events - On Click Listeners</a:t>
-            </a:r>
+              <a:defRPr sz="1800">
+                <a:solidFill>
+                  <a:srgbClr val="000000"/>
+                </a:solidFill>
+              </a:defRPr>
+            </a:pPr>
+            <a:fld id="{86CB4B4D-7CA3-9044-876B-883B54F8677D}" type="slidenum">
+              <a:rPr sz="1200">
+                <a:solidFill>
+                  <a:srgbClr val="82682C"/>
+                </a:solidFill>
+              </a:rPr>
+            </a:fld>
           </a:p>
         </p:txBody>
       </p:sp>
@@ -6295,7 +7225,7 @@
         <p:spPr>
           <a:xfrm>
             <a:off x="571500" y="274638"/>
-            <a:ext cx="8001000" cy="1143001"/>
+            <a:ext cx="8001000" cy="1143002"/>
           </a:xfrm>
           <a:prstGeom prst="rect">
             <a:avLst/>
@@ -6312,7 +7242,7 @@
             </a:pPr>
             <a:r>
               <a:rPr sz="5400"/>
-              <a:t>Num of Iterations?</a:t>
+              <a:t>Get Started</a:t>
             </a:r>
           </a:p>
         </p:txBody>
@@ -6327,8 +7257,8 @@
         </p:nvSpPr>
         <p:spPr>
           <a:xfrm>
-            <a:off x="667512" y="2659379"/>
-            <a:ext cx="8001001" cy="4114801"/>
+            <a:off x="571500" y="2473410"/>
+            <a:ext cx="8001000" cy="4114802"/>
           </a:xfrm>
           <a:prstGeom prst="rect">
             <a:avLst/>
@@ -6338,22 +7268,22 @@
           <a:bodyPr/>
           <a:lstStyle/>
           <a:p>
-            <a:pPr lvl="0">
+            <a:pPr lvl="0" marL="609600" indent="-609600">
               <a:defRPr sz="1800"/>
             </a:pPr>
             <a:r>
               <a:rPr sz="2400"/>
-              <a:t>Accept velocity from user.</a:t>
+              <a:t>Content Layout</a:t>
             </a:r>
             <a:endParaRPr sz="2400"/>
           </a:p>
           <a:p>
-            <a:pPr lvl="0">
+            <a:pPr lvl="0" marL="609600" indent="-609600">
               <a:defRPr sz="1800"/>
             </a:pPr>
             <a:r>
               <a:rPr sz="2400"/>
-              <a:t>Calculate the number of iterations.</a:t>
+              <a:t>UI Events - On Click Listeners</a:t>
             </a:r>
           </a:p>
         </p:txBody>
@@ -6386,7 +7316,7 @@
       </p:grpSpPr>
       <p:sp>
         <p:nvSpPr>
-          <p:cNvPr id="126" name="Shape 126"/>
+          <p:cNvPr id="128" name="Shape 128"/>
           <p:cNvSpPr/>
           <p:nvPr>
             <p:ph type="title"/>
@@ -6412,38 +7342,52 @@
             </a:pPr>
             <a:r>
               <a:rPr sz="5400"/>
-              <a:t>Navigation using Intents</a:t>
+              <a:t>Num of Iterations?</a:t>
             </a:r>
           </a:p>
         </p:txBody>
       </p:sp>
-      <p:pic>
-        <p:nvPicPr>
-          <p:cNvPr id="127" name="image10.png" descr="mm.png"/>
-          <p:cNvPicPr/>
-          <p:nvPr/>
-        </p:nvPicPr>
-        <p:blipFill>
-          <a:blip r:embed="rId3">
-            <a:extLst/>
-          </a:blip>
-          <a:stretch>
-            <a:fillRect/>
-          </a:stretch>
-        </p:blipFill>
+      <p:sp>
+        <p:nvSpPr>
+          <p:cNvPr id="129" name="Shape 129"/>
+          <p:cNvSpPr/>
+          <p:nvPr>
+            <p:ph type="body" idx="1"/>
+          </p:nvPr>
+        </p:nvSpPr>
         <p:spPr>
           <a:xfrm>
-            <a:off x="2051333" y="1905000"/>
-            <a:ext cx="5114160" cy="4114800"/>
+            <a:off x="667512" y="2659378"/>
+            <a:ext cx="8001001" cy="4114803"/>
           </a:xfrm>
           <a:prstGeom prst="rect">
             <a:avLst/>
           </a:prstGeom>
-          <a:ln w="12700">
-            <a:miter lim="400000"/>
-          </a:ln>
-        </p:spPr>
-      </p:pic>
+        </p:spPr>
+        <p:txBody>
+          <a:bodyPr/>
+          <a:lstStyle/>
+          <a:p>
+            <a:pPr lvl="0" marL="609600" indent="-609600">
+              <a:defRPr sz="1800"/>
+            </a:pPr>
+            <a:r>
+              <a:rPr sz="2400"/>
+              <a:t>Accept velocity from user.</a:t>
+            </a:r>
+            <a:endParaRPr sz="2400"/>
+          </a:p>
+          <a:p>
+            <a:pPr lvl="0" marL="609600" indent="-609600">
+              <a:defRPr sz="1800"/>
+            </a:pPr>
+            <a:r>
+              <a:rPr sz="2400"/>
+              <a:t>Calculate the number of iterations.</a:t>
+            </a:r>
+          </a:p>
+        </p:txBody>
+      </p:sp>
     </p:spTree>
   </p:cSld>
   <p:clrMapOvr>
@@ -6503,47 +7447,33 @@
           </a:p>
         </p:txBody>
       </p:sp>
-      <p:sp>
-        <p:nvSpPr>
-          <p:cNvPr id="132" name="Shape 132"/>
-          <p:cNvSpPr/>
-          <p:nvPr>
-            <p:ph type="body" idx="1"/>
-          </p:nvPr>
-        </p:nvSpPr>
+      <p:pic>
+        <p:nvPicPr>
+          <p:cNvPr id="132" name="image9.png" descr="mm.png"/>
+          <p:cNvPicPr/>
+          <p:nvPr/>
+        </p:nvPicPr>
+        <p:blipFill>
+          <a:blip r:embed="rId3">
+            <a:extLst/>
+          </a:blip>
+          <a:stretch>
+            <a:fillRect/>
+          </a:stretch>
+        </p:blipFill>
         <p:spPr>
           <a:xfrm>
-            <a:off x="681816" y="2824302"/>
-            <a:ext cx="8001001" cy="4114801"/>
+            <a:off x="2051332" y="1905000"/>
+            <a:ext cx="5114161" cy="4114800"/>
           </a:xfrm>
           <a:prstGeom prst="rect">
             <a:avLst/>
           </a:prstGeom>
-        </p:spPr>
-        <p:txBody>
-          <a:bodyPr/>
-          <a:lstStyle/>
-          <a:p>
-            <a:pPr lvl="0">
-              <a:defRPr sz="1800"/>
-            </a:pPr>
-            <a:r>
-              <a:rPr sz="2400"/>
-              <a:t>Types of Intents – Explicit and Implicit</a:t>
-            </a:r>
-            <a:endParaRPr sz="2400"/>
-          </a:p>
-          <a:p>
-            <a:pPr lvl="0">
-              <a:defRPr sz="1800"/>
-            </a:pPr>
-            <a:r>
-              <a:rPr sz="2400"/>
-              <a:t>Navigation using Explicit Intents</a:t>
-            </a:r>
-          </a:p>
-        </p:txBody>
-      </p:sp>
+          <a:ln w="12700">
+            <a:miter lim="400000"/>
+          </a:ln>
+        </p:spPr>
+      </p:pic>
     </p:spTree>
   </p:cSld>
   <p:clrMapOvr>
@@ -6598,7 +7528,7 @@
             </a:pPr>
             <a:r>
               <a:rPr sz="5400"/>
-              <a:t>Num of Iterations?</a:t>
+              <a:t>Navigation using Intents</a:t>
             </a:r>
           </a:p>
         </p:txBody>
@@ -6613,8 +7543,8 @@
         </p:nvSpPr>
         <p:spPr>
           <a:xfrm>
-            <a:off x="571500" y="1905000"/>
-            <a:ext cx="8001000" cy="4114800"/>
+            <a:off x="681816" y="2824301"/>
+            <a:ext cx="8001001" cy="4114803"/>
           </a:xfrm>
           <a:prstGeom prst="rect">
             <a:avLst/>
@@ -6624,28 +7554,22 @@
           <a:bodyPr/>
           <a:lstStyle/>
           <a:p>
-            <a:pPr lvl="0">
-              <a:defRPr sz="1800"/>
-            </a:pPr>
+            <a:pPr lvl="0" marL="609600" indent="-609600">
+              <a:defRPr sz="1800"/>
+            </a:pPr>
+            <a:r>
+              <a:rPr sz="2400"/>
+              <a:t>Types of Intents – Explicit and Implicit</a:t>
+            </a:r>
             <a:endParaRPr sz="2400"/>
           </a:p>
           <a:p>
-            <a:pPr lvl="0">
+            <a:pPr lvl="0" marL="609600" indent="-609600">
               <a:defRPr sz="1800"/>
             </a:pPr>
             <a:r>
               <a:rPr sz="2400"/>
-              <a:t>Define Intent and Start Activity</a:t>
-            </a:r>
-            <a:endParaRPr sz="2400"/>
-          </a:p>
-          <a:p>
-            <a:pPr lvl="0">
-              <a:defRPr sz="1800"/>
-            </a:pPr>
-            <a:r>
-              <a:rPr sz="2400"/>
-              <a:t>Display the number of iterations in second activity.</a:t>
+              <a:t>Navigation using Explicit Intents</a:t>
             </a:r>
           </a:p>
         </p:txBody>
@@ -6702,14 +7626,14 @@
     </a:clrScheme>
     <a:fontScheme name="Default">
       <a:majorFont>
+        <a:latin typeface="Helvetica Neue"/>
+        <a:ea typeface="Helvetica Neue"/>
+        <a:cs typeface="Helvetica Neue"/>
+      </a:majorFont>
+      <a:minorFont>
         <a:latin typeface="Helvetica"/>
         <a:ea typeface="Helvetica"/>
         <a:cs typeface="Helvetica"/>
-      </a:majorFont>
-      <a:minorFont>
-        <a:latin typeface="Avenir Roman"/>
-        <a:ea typeface="Avenir Roman"/>
-        <a:cs typeface="Avenir Roman"/>
       </a:minorFont>
     </a:fontScheme>
     <a:fmtScheme name="Default">
@@ -6803,7 +7727,13 @@
           </a:effectLst>
         </a:effectStyle>
         <a:effectStyle>
-          <a:effectLst/>
+          <a:effectLst>
+            <a:outerShdw sx="100000" sy="100000" kx="0" ky="0" algn="b" rotWithShape="0" blurRad="50800" dist="25400" dir="6600000">
+              <a:srgbClr val="000000">
+                <a:alpha val="35000"/>
+              </a:srgbClr>
+            </a:outerShdw>
+          </a:effectLst>
         </a:effectStyle>
       </a:effectStyleLst>
       <a:bgFillStyleLst>
@@ -6862,7 +7792,7 @@
     <a:spDef>
       <a:spPr>
         <a:solidFill>
-          <a:srgbClr val="EAC968"/>
+          <a:srgbClr val="FFFFFF"/>
         </a:solidFill>
         <a:ln w="25400" cap="flat">
           <a:solidFill>
@@ -6879,7 +7809,7 @@
           </a:outerShdw>
         </a:effectLst>
       </a:spPr>
-      <a:bodyPr rot="0" spcFirstLastPara="1" vertOverflow="overflow" horzOverflow="overflow" vert="horz" wrap="square" lIns="45719" tIns="45719" rIns="45719" bIns="45719" numCol="1" spcCol="38100" rtlCol="0" anchor="ctr" upright="0">
+      <a:bodyPr rot="0" spcFirstLastPara="1" vertOverflow="overflow" horzOverflow="overflow" vert="horz" wrap="square" lIns="45718" tIns="45718" rIns="45718" bIns="45718" numCol="1" spcCol="38100" rtlCol="0" anchor="ctr" upright="0">
         <a:spAutoFit/>
       </a:bodyPr>
       <a:lstStyle>
@@ -6907,10 +7837,10 @@
             </a:solidFill>
             <a:effectLst/>
             <a:uFillTx/>
-            <a:latin typeface="Calisto MT"/>
-            <a:ea typeface="Calisto MT"/>
-            <a:cs typeface="Calisto MT"/>
-            <a:sym typeface="Calisto MT"/>
+            <a:latin typeface="Avenir Book"/>
+            <a:ea typeface="Avenir Book"/>
+            <a:cs typeface="Avenir Book"/>
+            <a:sym typeface="Avenir Book"/>
           </a:defRPr>
         </a:defPPr>
         <a:lvl1pPr marL="0" marR="0" indent="0" algn="l" defTabSz="914400" rtl="0" fontAlgn="auto" latinLnBrk="1" hangingPunct="0">
@@ -7165,7 +8095,13 @@
           <a:prstDash val="solid"/>
           <a:bevel/>
         </a:ln>
-        <a:effectLst/>
+        <a:effectLst>
+          <a:outerShdw sx="100000" sy="100000" kx="0" ky="0" algn="b" rotWithShape="0" blurRad="50800" dist="25400" dir="6600000">
+            <a:srgbClr val="000000">
+              <a:alpha val="35000"/>
+            </a:srgbClr>
+          </a:outerShdw>
+        </a:effectLst>
       </a:spPr>
       <a:bodyPr rot="0" spcFirstLastPara="1" vertOverflow="overflow" horzOverflow="overflow" vert="horz" wrap="square" lIns="91439" tIns="45719" rIns="91439" bIns="45719" numCol="1" spcCol="38100" rtlCol="0" anchor="t" upright="0">
         <a:noAutofit/>
@@ -7448,7 +8384,7 @@
         </a:ln>
         <a:effectLst/>
       </a:spPr>
-      <a:bodyPr rot="0" spcFirstLastPara="1" vertOverflow="overflow" horzOverflow="overflow" vert="horz" wrap="square" lIns="45719" tIns="45719" rIns="45719" bIns="45719" numCol="1" spcCol="38100" rtlCol="0" anchor="t" upright="0">
+      <a:bodyPr rot="0" spcFirstLastPara="1" vertOverflow="overflow" horzOverflow="overflow" vert="horz" wrap="square" lIns="45718" tIns="45718" rIns="45718" bIns="45718" numCol="1" spcCol="38100" rtlCol="0" anchor="t" upright="0">
         <a:spAutoFit/>
       </a:bodyPr>
       <a:lstStyle>
@@ -7476,10 +8412,10 @@
             </a:solidFill>
             <a:effectLst/>
             <a:uFillTx/>
-            <a:latin typeface="Calisto MT"/>
-            <a:ea typeface="Calisto MT"/>
-            <a:cs typeface="Calisto MT"/>
-            <a:sym typeface="Calisto MT"/>
+            <a:latin typeface="Avenir Book"/>
+            <a:ea typeface="Avenir Book"/>
+            <a:cs typeface="Avenir Book"/>
+            <a:sym typeface="Avenir Book"/>
           </a:defRPr>
         </a:defPPr>
         <a:lvl1pPr marL="0" marR="0" indent="0" algn="l" defTabSz="914400" rtl="0" fontAlgn="auto" latinLnBrk="1" hangingPunct="0">
@@ -7771,14 +8707,14 @@
     </a:clrScheme>
     <a:fontScheme name="Default">
       <a:majorFont>
+        <a:latin typeface="Helvetica Neue"/>
+        <a:ea typeface="Helvetica Neue"/>
+        <a:cs typeface="Helvetica Neue"/>
+      </a:majorFont>
+      <a:minorFont>
         <a:latin typeface="Helvetica"/>
         <a:ea typeface="Helvetica"/>
         <a:cs typeface="Helvetica"/>
-      </a:majorFont>
-      <a:minorFont>
-        <a:latin typeface="Avenir Roman"/>
-        <a:ea typeface="Avenir Roman"/>
-        <a:cs typeface="Avenir Roman"/>
       </a:minorFont>
     </a:fontScheme>
     <a:fmtScheme name="Default">
@@ -7872,7 +8808,13 @@
           </a:effectLst>
         </a:effectStyle>
         <a:effectStyle>
-          <a:effectLst/>
+          <a:effectLst>
+            <a:outerShdw sx="100000" sy="100000" kx="0" ky="0" algn="b" rotWithShape="0" blurRad="50800" dist="25400" dir="6600000">
+              <a:srgbClr val="000000">
+                <a:alpha val="35000"/>
+              </a:srgbClr>
+            </a:outerShdw>
+          </a:effectLst>
         </a:effectStyle>
       </a:effectStyleLst>
       <a:bgFillStyleLst>
@@ -7931,7 +8873,7 @@
     <a:spDef>
       <a:spPr>
         <a:solidFill>
-          <a:srgbClr val="EAC968"/>
+          <a:srgbClr val="FFFFFF"/>
         </a:solidFill>
         <a:ln w="25400" cap="flat">
           <a:solidFill>
@@ -7948,7 +8890,7 @@
           </a:outerShdw>
         </a:effectLst>
       </a:spPr>
-      <a:bodyPr rot="0" spcFirstLastPara="1" vertOverflow="overflow" horzOverflow="overflow" vert="horz" wrap="square" lIns="45719" tIns="45719" rIns="45719" bIns="45719" numCol="1" spcCol="38100" rtlCol="0" anchor="ctr" upright="0">
+      <a:bodyPr rot="0" spcFirstLastPara="1" vertOverflow="overflow" horzOverflow="overflow" vert="horz" wrap="square" lIns="45718" tIns="45718" rIns="45718" bIns="45718" numCol="1" spcCol="38100" rtlCol="0" anchor="ctr" upright="0">
         <a:spAutoFit/>
       </a:bodyPr>
       <a:lstStyle>
@@ -7976,10 +8918,10 @@
             </a:solidFill>
             <a:effectLst/>
             <a:uFillTx/>
-            <a:latin typeface="Calisto MT"/>
-            <a:ea typeface="Calisto MT"/>
-            <a:cs typeface="Calisto MT"/>
-            <a:sym typeface="Calisto MT"/>
+            <a:latin typeface="Avenir Book"/>
+            <a:ea typeface="Avenir Book"/>
+            <a:cs typeface="Avenir Book"/>
+            <a:sym typeface="Avenir Book"/>
           </a:defRPr>
         </a:defPPr>
         <a:lvl1pPr marL="0" marR="0" indent="0" algn="l" defTabSz="914400" rtl="0" fontAlgn="auto" latinLnBrk="1" hangingPunct="0">
@@ -8234,7 +9176,13 @@
           <a:prstDash val="solid"/>
           <a:bevel/>
         </a:ln>
-        <a:effectLst/>
+        <a:effectLst>
+          <a:outerShdw sx="100000" sy="100000" kx="0" ky="0" algn="b" rotWithShape="0" blurRad="50800" dist="25400" dir="6600000">
+            <a:srgbClr val="000000">
+              <a:alpha val="35000"/>
+            </a:srgbClr>
+          </a:outerShdw>
+        </a:effectLst>
       </a:spPr>
       <a:bodyPr rot="0" spcFirstLastPara="1" vertOverflow="overflow" horzOverflow="overflow" vert="horz" wrap="square" lIns="91439" tIns="45719" rIns="91439" bIns="45719" numCol="1" spcCol="38100" rtlCol="0" anchor="t" upright="0">
         <a:noAutofit/>
@@ -8517,7 +9465,7 @@
         </a:ln>
         <a:effectLst/>
       </a:spPr>
-      <a:bodyPr rot="0" spcFirstLastPara="1" vertOverflow="overflow" horzOverflow="overflow" vert="horz" wrap="square" lIns="45719" tIns="45719" rIns="45719" bIns="45719" numCol="1" spcCol="38100" rtlCol="0" anchor="t" upright="0">
+      <a:bodyPr rot="0" spcFirstLastPara="1" vertOverflow="overflow" horzOverflow="overflow" vert="horz" wrap="square" lIns="45718" tIns="45718" rIns="45718" bIns="45718" numCol="1" spcCol="38100" rtlCol="0" anchor="t" upright="0">
         <a:spAutoFit/>
       </a:bodyPr>
       <a:lstStyle>
@@ -8545,10 +9493,10 @@
             </a:solidFill>
             <a:effectLst/>
             <a:uFillTx/>
-            <a:latin typeface="Calisto MT"/>
-            <a:ea typeface="Calisto MT"/>
-            <a:cs typeface="Calisto MT"/>
-            <a:sym typeface="Calisto MT"/>
+            <a:latin typeface="Avenir Book"/>
+            <a:ea typeface="Avenir Book"/>
+            <a:cs typeface="Avenir Book"/>
+            <a:sym typeface="Avenir Book"/>
           </a:defRPr>
         </a:defPPr>
         <a:lvl1pPr marL="0" marR="0" indent="0" algn="l" defTabSz="914400" rtl="0" fontAlgn="auto" latinLnBrk="1" hangingPunct="0">

</xml_diff>

<commit_message>
Abhinav: Updating presentations for day 1 and 2, adding (incomplete) instructions for day 4.
</commit_message>
<xml_diff>
--- a/Day1/day_1.pptx
+++ b/Day1/day_1.pptx
@@ -28,74 +28,74 @@
   <p:defaultTextStyle>
     <a:lvl1pPr>
       <a:defRPr>
-        <a:latin typeface="Avenir Book"/>
-        <a:ea typeface="Avenir Book"/>
-        <a:cs typeface="Avenir Book"/>
-        <a:sym typeface="Avenir Book"/>
+        <a:latin typeface="+mj-lt"/>
+        <a:ea typeface="+mj-ea"/>
+        <a:cs typeface="+mj-cs"/>
+        <a:sym typeface="Helvetica"/>
       </a:defRPr>
     </a:lvl1pPr>
     <a:lvl2pPr>
       <a:defRPr>
-        <a:latin typeface="Avenir Book"/>
-        <a:ea typeface="Avenir Book"/>
-        <a:cs typeface="Avenir Book"/>
-        <a:sym typeface="Avenir Book"/>
+        <a:latin typeface="+mj-lt"/>
+        <a:ea typeface="+mj-ea"/>
+        <a:cs typeface="+mj-cs"/>
+        <a:sym typeface="Helvetica"/>
       </a:defRPr>
     </a:lvl2pPr>
     <a:lvl3pPr>
       <a:defRPr>
-        <a:latin typeface="Avenir Book"/>
-        <a:ea typeface="Avenir Book"/>
-        <a:cs typeface="Avenir Book"/>
-        <a:sym typeface="Avenir Book"/>
+        <a:latin typeface="+mj-lt"/>
+        <a:ea typeface="+mj-ea"/>
+        <a:cs typeface="+mj-cs"/>
+        <a:sym typeface="Helvetica"/>
       </a:defRPr>
     </a:lvl3pPr>
     <a:lvl4pPr>
       <a:defRPr>
-        <a:latin typeface="Avenir Book"/>
-        <a:ea typeface="Avenir Book"/>
-        <a:cs typeface="Avenir Book"/>
-        <a:sym typeface="Avenir Book"/>
+        <a:latin typeface="+mj-lt"/>
+        <a:ea typeface="+mj-ea"/>
+        <a:cs typeface="+mj-cs"/>
+        <a:sym typeface="Helvetica"/>
       </a:defRPr>
     </a:lvl4pPr>
     <a:lvl5pPr>
       <a:defRPr>
-        <a:latin typeface="Avenir Book"/>
-        <a:ea typeface="Avenir Book"/>
-        <a:cs typeface="Avenir Book"/>
-        <a:sym typeface="Avenir Book"/>
+        <a:latin typeface="+mj-lt"/>
+        <a:ea typeface="+mj-ea"/>
+        <a:cs typeface="+mj-cs"/>
+        <a:sym typeface="Helvetica"/>
       </a:defRPr>
     </a:lvl5pPr>
     <a:lvl6pPr>
       <a:defRPr>
-        <a:latin typeface="Avenir Book"/>
-        <a:ea typeface="Avenir Book"/>
-        <a:cs typeface="Avenir Book"/>
-        <a:sym typeface="Avenir Book"/>
+        <a:latin typeface="+mj-lt"/>
+        <a:ea typeface="+mj-ea"/>
+        <a:cs typeface="+mj-cs"/>
+        <a:sym typeface="Helvetica"/>
       </a:defRPr>
     </a:lvl6pPr>
     <a:lvl7pPr>
       <a:defRPr>
-        <a:latin typeface="Avenir Book"/>
-        <a:ea typeface="Avenir Book"/>
-        <a:cs typeface="Avenir Book"/>
-        <a:sym typeface="Avenir Book"/>
+        <a:latin typeface="+mj-lt"/>
+        <a:ea typeface="+mj-ea"/>
+        <a:cs typeface="+mj-cs"/>
+        <a:sym typeface="Helvetica"/>
       </a:defRPr>
     </a:lvl7pPr>
     <a:lvl8pPr>
       <a:defRPr>
-        <a:latin typeface="Avenir Book"/>
-        <a:ea typeface="Avenir Book"/>
-        <a:cs typeface="Avenir Book"/>
-        <a:sym typeface="Avenir Book"/>
+        <a:latin typeface="+mj-lt"/>
+        <a:ea typeface="+mj-ea"/>
+        <a:cs typeface="+mj-cs"/>
+        <a:sym typeface="Helvetica"/>
       </a:defRPr>
     </a:lvl8pPr>
     <a:lvl9pPr>
       <a:defRPr>
-        <a:latin typeface="Avenir Book"/>
-        <a:ea typeface="Avenir Book"/>
-        <a:cs typeface="Avenir Book"/>
-        <a:sym typeface="Avenir Book"/>
+        <a:latin typeface="+mj-lt"/>
+        <a:ea typeface="+mj-ea"/>
+        <a:cs typeface="+mj-cs"/>
+        <a:sym typeface="Helvetica"/>
       </a:defRPr>
     </a:lvl9pPr>
   </p:defaultTextStyle>
@@ -182,9 +182,9 @@
         <a:spcPct val="117999"/>
       </a:lnSpc>
       <a:defRPr sz="2200">
-        <a:latin typeface="+mj-lt"/>
-        <a:ea typeface="+mj-ea"/>
-        <a:cs typeface="+mj-cs"/>
+        <a:latin typeface="+mn-lt"/>
+        <a:ea typeface="+mn-ea"/>
+        <a:cs typeface="+mn-cs"/>
         <a:sym typeface="Helvetica Neue"/>
       </a:defRPr>
     </a:lvl1pPr>
@@ -193,9 +193,9 @@
         <a:spcPct val="117999"/>
       </a:lnSpc>
       <a:defRPr sz="2200">
-        <a:latin typeface="+mj-lt"/>
-        <a:ea typeface="+mj-ea"/>
-        <a:cs typeface="+mj-cs"/>
+        <a:latin typeface="+mn-lt"/>
+        <a:ea typeface="+mn-ea"/>
+        <a:cs typeface="+mn-cs"/>
         <a:sym typeface="Helvetica Neue"/>
       </a:defRPr>
     </a:lvl2pPr>
@@ -204,9 +204,9 @@
         <a:spcPct val="117999"/>
       </a:lnSpc>
       <a:defRPr sz="2200">
-        <a:latin typeface="+mj-lt"/>
-        <a:ea typeface="+mj-ea"/>
-        <a:cs typeface="+mj-cs"/>
+        <a:latin typeface="+mn-lt"/>
+        <a:ea typeface="+mn-ea"/>
+        <a:cs typeface="+mn-cs"/>
         <a:sym typeface="Helvetica Neue"/>
       </a:defRPr>
     </a:lvl3pPr>
@@ -215,9 +215,9 @@
         <a:spcPct val="117999"/>
       </a:lnSpc>
       <a:defRPr sz="2200">
-        <a:latin typeface="+mj-lt"/>
-        <a:ea typeface="+mj-ea"/>
-        <a:cs typeface="+mj-cs"/>
+        <a:latin typeface="+mn-lt"/>
+        <a:ea typeface="+mn-ea"/>
+        <a:cs typeface="+mn-cs"/>
         <a:sym typeface="Helvetica Neue"/>
       </a:defRPr>
     </a:lvl4pPr>
@@ -226,9 +226,9 @@
         <a:spcPct val="117999"/>
       </a:lnSpc>
       <a:defRPr sz="2200">
-        <a:latin typeface="+mj-lt"/>
-        <a:ea typeface="+mj-ea"/>
-        <a:cs typeface="+mj-cs"/>
+        <a:latin typeface="+mn-lt"/>
+        <a:ea typeface="+mn-ea"/>
+        <a:cs typeface="+mn-cs"/>
         <a:sym typeface="Helvetica Neue"/>
       </a:defRPr>
     </a:lvl5pPr>
@@ -237,9 +237,9 @@
         <a:spcPct val="117999"/>
       </a:lnSpc>
       <a:defRPr sz="2200">
-        <a:latin typeface="+mj-lt"/>
-        <a:ea typeface="+mj-ea"/>
-        <a:cs typeface="+mj-cs"/>
+        <a:latin typeface="+mn-lt"/>
+        <a:ea typeface="+mn-ea"/>
+        <a:cs typeface="+mn-cs"/>
         <a:sym typeface="Helvetica Neue"/>
       </a:defRPr>
     </a:lvl6pPr>
@@ -248,9 +248,9 @@
         <a:spcPct val="117999"/>
       </a:lnSpc>
       <a:defRPr sz="2200">
-        <a:latin typeface="+mj-lt"/>
-        <a:ea typeface="+mj-ea"/>
-        <a:cs typeface="+mj-cs"/>
+        <a:latin typeface="+mn-lt"/>
+        <a:ea typeface="+mn-ea"/>
+        <a:cs typeface="+mn-cs"/>
         <a:sym typeface="Helvetica Neue"/>
       </a:defRPr>
     </a:lvl7pPr>
@@ -259,9 +259,9 @@
         <a:spcPct val="117999"/>
       </a:lnSpc>
       <a:defRPr sz="2200">
-        <a:latin typeface="+mj-lt"/>
-        <a:ea typeface="+mj-ea"/>
-        <a:cs typeface="+mj-cs"/>
+        <a:latin typeface="+mn-lt"/>
+        <a:ea typeface="+mn-ea"/>
+        <a:cs typeface="+mn-cs"/>
         <a:sym typeface="Helvetica Neue"/>
       </a:defRPr>
     </a:lvl8pPr>
@@ -270,9 +270,9 @@
         <a:spcPct val="117999"/>
       </a:lnSpc>
       <a:defRPr sz="2200">
-        <a:latin typeface="+mj-lt"/>
-        <a:ea typeface="+mj-ea"/>
-        <a:cs typeface="+mj-cs"/>
+        <a:latin typeface="+mn-lt"/>
+        <a:ea typeface="+mn-ea"/>
+        <a:cs typeface="+mn-cs"/>
         <a:sym typeface="Helvetica Neue"/>
       </a:defRPr>
     </a:lvl9pPr>
@@ -1904,7 +1904,7 @@
         <p:spPr>
           <a:xfrm>
             <a:off x="1222898" y="2305609"/>
-            <a:ext cx="2495551" cy="95252"/>
+            <a:ext cx="2495551" cy="95253"/>
           </a:xfrm>
           <a:prstGeom prst="rect">
             <a:avLst/>
@@ -1938,7 +1938,7 @@
         <p:spPr>
           <a:xfrm rot="308221">
             <a:off x="6798019" y="538594"/>
-            <a:ext cx="1808487" cy="516710"/>
+            <a:ext cx="1808488" cy="516710"/>
           </a:xfrm>
           <a:prstGeom prst="rect">
             <a:avLst/>
@@ -2012,7 +2012,7 @@
         <p:spPr>
           <a:xfrm>
             <a:off x="571500" y="0"/>
-            <a:ext cx="8001000" cy="4634755"/>
+            <a:ext cx="8001000" cy="4634756"/>
           </a:xfrm>
           <a:prstGeom prst="rect">
             <a:avLst/>
@@ -2173,7 +2173,7 @@
         <p:spPr>
           <a:xfrm>
             <a:off x="3324225" y="4666129"/>
-            <a:ext cx="2495550" cy="95252"/>
+            <a:ext cx="2495550" cy="95253"/>
           </a:xfrm>
           <a:prstGeom prst="rect">
             <a:avLst/>
@@ -2260,7 +2260,7 @@
         <p:spPr>
           <a:xfrm rot="308221">
             <a:off x="6835967" y="278688"/>
-            <a:ext cx="1695956" cy="484559"/>
+            <a:ext cx="1695957" cy="484559"/>
           </a:xfrm>
           <a:prstGeom prst="rect">
             <a:avLst/>
@@ -2281,7 +2281,7 @@
         <p:spPr>
           <a:xfrm>
             <a:off x="571500" y="0"/>
-            <a:ext cx="8001000" cy="4634755"/>
+            <a:ext cx="8001000" cy="4634756"/>
           </a:xfrm>
           <a:prstGeom prst="rect">
             <a:avLst/>
@@ -2442,7 +2442,7 @@
         <p:spPr>
           <a:xfrm>
             <a:off x="3324225" y="4666129"/>
-            <a:ext cx="2495550" cy="95252"/>
+            <a:ext cx="2495550" cy="95253"/>
           </a:xfrm>
           <a:prstGeom prst="rect">
             <a:avLst/>
@@ -2475,8 +2475,8 @@
         </p:blipFill>
         <p:spPr>
           <a:xfrm rot="20785256">
-            <a:off x="2866026" y="3182424"/>
-            <a:ext cx="1695957" cy="484560"/>
+            <a:off x="2866026" y="3182423"/>
+            <a:ext cx="1695957" cy="484561"/>
           </a:xfrm>
           <a:prstGeom prst="rect">
             <a:avLst/>
@@ -2550,7 +2550,7 @@
         <p:spPr>
           <a:xfrm>
             <a:off x="4983479" y="4800600"/>
-            <a:ext cx="3246122" cy="1188720"/>
+            <a:ext cx="3246123" cy="1188720"/>
           </a:xfrm>
           <a:prstGeom prst="rect">
             <a:avLst/>
@@ -2714,7 +2714,7 @@
         <p:spPr>
           <a:xfrm rot="21240000">
             <a:off x="4717562" y="3396153"/>
-            <a:ext cx="3474721" cy="1097282"/>
+            <a:ext cx="3474721" cy="1097283"/>
           </a:xfrm>
           <a:prstGeom prst="rect">
             <a:avLst/>
@@ -2982,7 +2982,7 @@
         <p:spPr>
           <a:xfrm rot="308221">
             <a:off x="7428514" y="2619243"/>
-            <a:ext cx="1580739" cy="451641"/>
+            <a:ext cx="1580739" cy="451642"/>
           </a:xfrm>
           <a:prstGeom prst="rect">
             <a:avLst/>
@@ -3009,7 +3009,7 @@
         <p:spPr>
           <a:xfrm rot="322260">
             <a:off x="6339644" y="604321"/>
-            <a:ext cx="1610335" cy="2025115"/>
+            <a:ext cx="1610336" cy="2025115"/>
           </a:xfrm>
           <a:prstGeom prst="rect">
             <a:avLst/>
@@ -3036,7 +3036,7 @@
         <p:spPr>
           <a:xfrm rot="322260">
             <a:off x="4891844" y="985319"/>
-            <a:ext cx="1610335" cy="2025117"/>
+            <a:ext cx="1610336" cy="2025118"/>
           </a:xfrm>
           <a:prstGeom prst="rect">
             <a:avLst/>
@@ -3057,7 +3057,7 @@
         <p:spPr>
           <a:xfrm rot="21240000">
             <a:off x="455724" y="3551613"/>
-            <a:ext cx="3474721" cy="1097283"/>
+            <a:ext cx="3474721" cy="1097284"/>
           </a:xfrm>
           <a:prstGeom prst="rect">
             <a:avLst/>
@@ -3297,7 +3297,7 @@
         <p:spPr>
           <a:xfrm>
             <a:off x="6696633" y="0"/>
-            <a:ext cx="1882591" cy="6616700"/>
+            <a:ext cx="1882592" cy="6616700"/>
           </a:xfrm>
           <a:prstGeom prst="rect">
             <a:avLst/>
@@ -3431,7 +3431,7 @@
         <p:spPr>
           <a:xfrm>
             <a:off x="6512859" y="1562100"/>
-            <a:ext cx="152402" cy="3733800"/>
+            <a:ext cx="152403" cy="3733800"/>
           </a:xfrm>
           <a:prstGeom prst="rect">
             <a:avLst/>
@@ -3863,7 +3863,7 @@
         <p:spPr>
           <a:xfrm rot="21366660">
             <a:off x="5138373" y="599839"/>
-            <a:ext cx="1610334" cy="2025115"/>
+            <a:ext cx="1610335" cy="2025115"/>
           </a:xfrm>
           <a:prstGeom prst="rect">
             <a:avLst/>
@@ -3889,8 +3889,8 @@
         </p:blipFill>
         <p:spPr>
           <a:xfrm rot="21329777">
-            <a:off x="2072770" y="555386"/>
-            <a:ext cx="1610334" cy="2025115"/>
+            <a:off x="2072769" y="555386"/>
+            <a:ext cx="1610335" cy="2025115"/>
           </a:xfrm>
           <a:prstGeom prst="rect">
             <a:avLst/>
@@ -3917,7 +3917,7 @@
         <p:spPr>
           <a:xfrm rot="151791">
             <a:off x="3591962" y="936013"/>
-            <a:ext cx="1610334" cy="2025117"/>
+            <a:ext cx="1610335" cy="2025118"/>
           </a:xfrm>
           <a:prstGeom prst="rect">
             <a:avLst/>
@@ -4026,7 +4026,7 @@
         <p:spPr>
           <a:xfrm>
             <a:off x="571500" y="3644153"/>
-            <a:ext cx="8001000" cy="3213847"/>
+            <a:ext cx="8001000" cy="3213848"/>
           </a:xfrm>
           <a:prstGeom prst="rect">
             <a:avLst/>
@@ -4433,7 +4433,7 @@
         <p:spPr>
           <a:xfrm>
             <a:off x="571500" y="1528571"/>
-            <a:ext cx="3749041" cy="1332297"/>
+            <a:ext cx="3749041" cy="1332298"/>
           </a:xfrm>
           <a:prstGeom prst="rect">
             <a:avLst/>
@@ -4838,7 +4838,7 @@
         <p:spPr>
           <a:xfrm>
             <a:off x="4827494" y="430306"/>
-            <a:ext cx="3749042" cy="6427695"/>
+            <a:ext cx="3749043" cy="6427695"/>
           </a:xfrm>
           <a:prstGeom prst="rect">
             <a:avLst/>
@@ -4937,7 +4937,7 @@
         <p:spPr>
           <a:xfrm>
             <a:off x="1222898" y="2305609"/>
-            <a:ext cx="2495551" cy="95252"/>
+            <a:ext cx="2495551" cy="95253"/>
           </a:xfrm>
           <a:prstGeom prst="rect">
             <a:avLst/>
@@ -5192,7 +5192,7 @@
         <p:spPr>
           <a:xfrm>
             <a:off x="4046220" y="6206695"/>
-            <a:ext cx="1051562" cy="269239"/>
+            <a:ext cx="1051563" cy="269237"/>
           </a:xfrm>
           <a:prstGeom prst="rect">
             <a:avLst/>
@@ -5336,7 +5336,7 @@
           <a:sym typeface="Calisto MT"/>
         </a:defRPr>
       </a:lvl1pPr>
-      <a:lvl2pPr marL="955962" indent="-498763">
+      <a:lvl2pPr marL="955961" indent="-498763">
         <a:spcBef>
           <a:spcPts val="2000"/>
         </a:spcBef>
@@ -5392,7 +5392,7 @@
           <a:sym typeface="Calisto MT"/>
         </a:defRPr>
       </a:lvl5pPr>
-      <a:lvl6pPr marL="2897186" indent="-615950">
+      <a:lvl6pPr marL="2897185" indent="-615950">
         <a:spcBef>
           <a:spcPts val="2000"/>
         </a:spcBef>
@@ -5720,7 +5720,7 @@
             </a:pPr>
           </a:p>
           <a:p>
-            <a:pPr lvl="0" marL="609600" indent="-609600">
+            <a:pPr lvl="0" marL="812800" indent="-812800">
               <a:defRPr sz="1800"/>
             </a:pPr>
             <a:r>
@@ -5730,7 +5730,7 @@
             <a:endParaRPr sz="2400"/>
           </a:p>
           <a:p>
-            <a:pPr lvl="0" marL="609600" indent="-609600">
+            <a:pPr lvl="0" marL="812800" indent="-812800">
               <a:defRPr sz="1800"/>
             </a:pPr>
             <a:r>
@@ -5789,7 +5789,7 @@
           </a:bodyPr>
           <a:lstStyle>
             <a:lvl1pPr defTabSz="728592">
-              <a:defRPr sz="4224"/>
+              <a:defRPr sz="4200"/>
             </a:lvl1pPr>
           </a:lstStyle>
           <a:p>
@@ -5797,7 +5797,7 @@
               <a:defRPr sz="1800"/>
             </a:pPr>
             <a:r>
-              <a:rPr sz="4224"/>
+              <a:rPr sz="4200"/>
               <a:t>Num Of Iterations + Buffer = Plan</a:t>
             </a:r>
           </a:p>
@@ -5813,8 +5813,8 @@
         </p:nvSpPr>
         <p:spPr>
           <a:xfrm>
-            <a:off x="571500" y="3125722"/>
-            <a:ext cx="8001000" cy="4114803"/>
+            <a:off x="571500" y="3125721"/>
+            <a:ext cx="8001000" cy="4114805"/>
           </a:xfrm>
           <a:prstGeom prst="rect">
             <a:avLst/>
@@ -5824,7 +5824,7 @@
           <a:bodyPr/>
           <a:lstStyle/>
           <a:p>
-            <a:pPr lvl="0" marL="609600" indent="-609600">
+            <a:pPr lvl="0" marL="812800" indent="-812800">
               <a:defRPr sz="1800"/>
             </a:pPr>
             <a:r>
@@ -5834,7 +5834,7 @@
             <a:endParaRPr sz="2400"/>
           </a:p>
           <a:p>
-            <a:pPr lvl="0" marL="609600" indent="-609600">
+            <a:pPr lvl="0" marL="812800" indent="-812800">
               <a:defRPr sz="1800"/>
             </a:pPr>
             <a:r>
@@ -5880,8 +5880,8 @@
         </p:nvSpPr>
         <p:spPr>
           <a:xfrm>
-            <a:off x="571500" y="2168381"/>
-            <a:ext cx="8001000" cy="1508126"/>
+            <a:off x="571500" y="2168380"/>
+            <a:ext cx="8001000" cy="1508128"/>
           </a:xfrm>
           <a:prstGeom prst="rect">
             <a:avLst/>
@@ -5914,7 +5914,7 @@
         <p:spPr>
           <a:xfrm>
             <a:off x="4046220" y="6206695"/>
-            <a:ext cx="1051562" cy="269242"/>
+            <a:ext cx="1051563" cy="269243"/>
           </a:xfrm>
           <a:prstGeom prst="rect">
             <a:avLst/>
@@ -6018,7 +6018,7 @@
         <p:spPr>
           <a:xfrm>
             <a:off x="4046220" y="6206695"/>
-            <a:ext cx="1051562" cy="269242"/>
+            <a:ext cx="1051563" cy="269243"/>
           </a:xfrm>
           <a:prstGeom prst="rect">
             <a:avLst/>
@@ -6035,7 +6035,7 @@
           </a:bodyPr>
           <a:lstStyle>
             <a:lvl1pPr defTabSz="859536">
-              <a:defRPr sz="1128"/>
+              <a:defRPr sz="1100"/>
             </a:lvl1pPr>
           </a:lstStyle>
           <a:p>
@@ -6047,7 +6047,7 @@
               </a:defRPr>
             </a:pPr>
             <a:fld id="{86CB4B4D-7CA3-9044-876B-883B54F8677D}" type="slidenum">
-              <a:rPr sz="1128">
+              <a:rPr sz="1100">
                 <a:solidFill>
                   <a:srgbClr val="82682C"/>
                 </a:solidFill>
@@ -6064,8 +6064,8 @@
         </p:nvSpPr>
         <p:spPr>
           <a:xfrm>
-            <a:off x="711784" y="2011317"/>
-            <a:ext cx="6920164" cy="561339"/>
+            <a:off x="711784" y="2011316"/>
+            <a:ext cx="7060528" cy="561337"/>
           </a:xfrm>
           <a:prstGeom prst="rect">
             <a:avLst/>
@@ -6084,7 +6084,7 @@
             <a:spAutoFit/>
           </a:bodyPr>
           <a:lstStyle>
-            <a:lvl1pPr marL="320840" indent="-320840">
+            <a:lvl1pPr marL="570382" indent="-570382">
               <a:buSzPct val="100000"/>
               <a:buChar char="•"/>
               <a:defRPr sz="3200">
@@ -6186,7 +6186,7 @@
           <a:bodyPr/>
           <a:lstStyle/>
           <a:p>
-            <a:pPr lvl="0" marL="609600" indent="-609600">
+            <a:pPr lvl="0" marL="812800" indent="-812800">
               <a:defRPr sz="1800"/>
             </a:pPr>
             <a:r>
@@ -6203,7 +6203,7 @@
             </a:r>
           </a:p>
           <a:p>
-            <a:pPr lvl="0" marL="609600" indent="-609600">
+            <a:pPr lvl="0" marL="812800" indent="-812800">
               <a:buClr>
                 <a:srgbClr val="99350B"/>
               </a:buClr>
@@ -6223,7 +6223,7 @@
             </a:r>
           </a:p>
           <a:p>
-            <a:pPr lvl="0" marL="609600" indent="-609600">
+            <a:pPr lvl="0" marL="812800" indent="-812800">
               <a:buClr>
                 <a:srgbClr val="99350B"/>
               </a:buClr>
@@ -6243,7 +6243,7 @@
             </a:r>
           </a:p>
           <a:p>
-            <a:pPr lvl="0" marL="609600" indent="-609600">
+            <a:pPr lvl="0" marL="812800" indent="-812800">
               <a:buClr>
                 <a:srgbClr val="99350B"/>
               </a:buClr>
@@ -6312,7 +6312,7 @@
             <a:normAutofit fontScale="100000" lnSpcReduction="0"/>
           </a:bodyPr>
           <a:lstStyle>
-            <a:lvl1pPr defTabSz="842345">
+            <a:lvl1pPr defTabSz="842344">
               <a:defRPr sz="4900"/>
             </a:lvl1pPr>
           </a:lstStyle>
@@ -6348,7 +6348,7 @@
           <a:bodyPr/>
           <a:lstStyle/>
           <a:p>
-            <a:pPr lvl="0" marL="609600" indent="-609600">
+            <a:pPr lvl="0" marL="812800" indent="-812800">
               <a:defRPr sz="1800"/>
             </a:pPr>
             <a:r>
@@ -6358,7 +6358,7 @@
             <a:endParaRPr sz="2400"/>
           </a:p>
           <a:p>
-            <a:pPr lvl="0" marL="609600" indent="-609600">
+            <a:pPr lvl="0" marL="812800" indent="-812800">
               <a:defRPr sz="1800"/>
             </a:pPr>
             <a:r>
@@ -6368,7 +6368,7 @@
             <a:endParaRPr sz="2400"/>
           </a:p>
           <a:p>
-            <a:pPr lvl="0" marL="609600" indent="-609600">
+            <a:pPr lvl="0" marL="812800" indent="-812800">
               <a:defRPr sz="1800"/>
             </a:pPr>
             <a:r>
@@ -6378,12 +6378,12 @@
             <a:endParaRPr sz="2400"/>
           </a:p>
           <a:p>
-            <a:pPr lvl="0" marL="609600" indent="-609600">
+            <a:pPr lvl="0" marL="812800" indent="-812800">
               <a:defRPr sz="1800"/>
             </a:pPr>
             <a:r>
               <a:rPr sz="2400"/>
-              <a:t>The demo app is checked out and running from - git@github.com:abhinavmanchanda/ProjectPlanner.git</a:t>
+              <a:t>The demo app is checked out and running from - git@github.com:androidbootcamp/ProjectPlanner.git</a:t>
             </a:r>
           </a:p>
         </p:txBody>
@@ -6457,8 +6457,8 @@
         </p:nvSpPr>
         <p:spPr>
           <a:xfrm>
-            <a:off x="571500" y="2576090"/>
-            <a:ext cx="8001000" cy="4114803"/>
+            <a:off x="571500" y="2576089"/>
+            <a:ext cx="8001000" cy="4114805"/>
           </a:xfrm>
           <a:prstGeom prst="rect">
             <a:avLst/>
@@ -6468,7 +6468,7 @@
           <a:bodyPr/>
           <a:lstStyle/>
           <a:p>
-            <a:pPr lvl="0" marL="609600" indent="-609600">
+            <a:pPr lvl="0" marL="812800" indent="-812800">
               <a:defRPr sz="1800"/>
             </a:pPr>
             <a:r>
@@ -6478,7 +6478,7 @@
             <a:endParaRPr sz="2400"/>
           </a:p>
           <a:p>
-            <a:pPr lvl="0" marL="609600" indent="-609600">
+            <a:pPr lvl="0" marL="812800" indent="-812800">
               <a:defRPr sz="1800"/>
             </a:pPr>
             <a:r>
@@ -6488,7 +6488,7 @@
             <a:endParaRPr sz="2400"/>
           </a:p>
           <a:p>
-            <a:pPr lvl="0" marL="609600" indent="-609600">
+            <a:pPr lvl="0" marL="812800" indent="-812800">
               <a:defRPr sz="1800"/>
             </a:pPr>
             <a:r>
@@ -6498,7 +6498,7 @@
             <a:endParaRPr sz="2400"/>
           </a:p>
           <a:p>
-            <a:pPr lvl="0" marL="609600" indent="-609600">
+            <a:pPr lvl="0" marL="812800" indent="-812800">
               <a:defRPr sz="1800"/>
             </a:pPr>
             <a:r>
@@ -6508,7 +6508,7 @@
             <a:endParaRPr sz="2400"/>
           </a:p>
           <a:p>
-            <a:pPr lvl="0" marL="609600" indent="-609600">
+            <a:pPr lvl="0" marL="812800" indent="-812800">
               <a:defRPr sz="1800"/>
             </a:pPr>
             <a:r>
@@ -6585,10 +6585,10 @@
         </p:nvGrpSpPr>
         <p:grpSpPr>
           <a:xfrm>
-            <a:off x="578410" y="1968245"/>
-            <a:ext cx="1376328" cy="4343911"/>
-            <a:chOff x="0" y="0"/>
-            <a:chExt cx="1376326" cy="4343909"/>
+            <a:off x="578408" y="1968244"/>
+            <a:ext cx="1376332" cy="4343913"/>
+            <a:chOff x="-1" y="0"/>
+            <a:chExt cx="1376330" cy="4343912"/>
           </a:xfrm>
         </p:grpSpPr>
         <p:sp>
@@ -6599,8 +6599,8 @@
           </p:nvSpPr>
           <p:spPr>
             <a:xfrm>
-              <a:off x="-1" y="-1"/>
-              <a:ext cx="1376328" cy="1239933"/>
+              <a:off x="-2" y="-1"/>
+              <a:ext cx="1376332" cy="1239934"/>
             </a:xfrm>
             <a:prstGeom prst="roundRect">
               <a:avLst>
@@ -6649,8 +6649,8 @@
           </p:nvSpPr>
           <p:spPr>
             <a:xfrm>
-              <a:off x="-1" y="1551988"/>
-              <a:ext cx="1376328" cy="1239933"/>
+              <a:off x="-2" y="1551988"/>
+              <a:ext cx="1376332" cy="1239935"/>
             </a:xfrm>
             <a:prstGeom prst="roundRect">
               <a:avLst>
@@ -6699,8 +6699,8 @@
           </p:nvSpPr>
           <p:spPr>
             <a:xfrm>
-              <a:off x="-1" y="3103976"/>
-              <a:ext cx="1376328" cy="1239934"/>
+              <a:off x="-2" y="3103977"/>
+              <a:ext cx="1376332" cy="1239935"/>
             </a:xfrm>
             <a:prstGeom prst="roundRect">
               <a:avLst>
@@ -6750,8 +6750,8 @@
         </p:nvSpPr>
         <p:spPr>
           <a:xfrm>
-            <a:off x="2050821" y="3477490"/>
-            <a:ext cx="3828498" cy="850901"/>
+            <a:off x="2050820" y="3477490"/>
+            <a:ext cx="3828499" cy="850901"/>
           </a:xfrm>
           <a:prstGeom prst="rect">
             <a:avLst/>
@@ -6818,6 +6818,7 @@
           <a:p>
             <a:pPr lvl="0" marL="180472" indent="-180472">
               <a:buSzPct val="100000"/>
+              <a:buFont typeface="Calisto MT"/>
               <a:buChar char="•"/>
             </a:pPr>
             <a:r>
@@ -6839,6 +6840,7 @@
           <a:p>
             <a:pPr lvl="0" marL="180472" indent="-180472">
               <a:buSzPct val="100000"/>
+              <a:buFont typeface="Calisto MT"/>
               <a:buChar char="•"/>
             </a:pPr>
             <a:r>
@@ -6861,8 +6863,8 @@
         </p:nvSpPr>
         <p:spPr>
           <a:xfrm>
-            <a:off x="2046905" y="1884795"/>
-            <a:ext cx="3612971" cy="1384301"/>
+            <a:off x="2046904" y="1884794"/>
+            <a:ext cx="3612972" cy="1384301"/>
           </a:xfrm>
           <a:prstGeom prst="rect">
             <a:avLst/>
@@ -6902,6 +6904,7 @@
           <a:p>
             <a:pPr lvl="0" marL="180472" indent="-180472">
               <a:buSzPct val="100000"/>
+              <a:buFont typeface="Calisto MT"/>
               <a:buChar char="•"/>
             </a:pPr>
             <a:r>
@@ -6923,6 +6926,7 @@
           <a:p>
             <a:pPr lvl="0" marL="180472" indent="-180472">
               <a:buSzPct val="100000"/>
+              <a:buFont typeface="Calisto MT"/>
               <a:buChar char="•"/>
             </a:pPr>
             <a:r>
@@ -6944,6 +6948,7 @@
           <a:p>
             <a:pPr lvl="0" marL="180472" indent="-180472">
               <a:buSzPct val="100000"/>
+              <a:buFont typeface="Calisto MT"/>
               <a:buChar char="•"/>
             </a:pPr>
             <a:r>
@@ -6965,6 +6970,7 @@
           <a:p>
             <a:pPr lvl="0" marL="180472" indent="-180472">
               <a:buSzPct val="100000"/>
+              <a:buFont typeface="Calisto MT"/>
               <a:buChar char="•"/>
             </a:pPr>
             <a:r>
@@ -6987,8 +6993,8 @@
         </p:nvSpPr>
         <p:spPr>
           <a:xfrm>
-            <a:off x="2149938" y="4975769"/>
-            <a:ext cx="4844123" cy="1117601"/>
+            <a:off x="2149937" y="4975769"/>
+            <a:ext cx="4844124" cy="1117601"/>
           </a:xfrm>
           <a:prstGeom prst="rect">
             <a:avLst/>
@@ -7028,6 +7034,7 @@
           <a:p>
             <a:pPr lvl="0" marL="180472" indent="-180472">
               <a:buSzPct val="100000"/>
+              <a:buFont typeface="Calisto MT"/>
               <a:buChar char="•"/>
             </a:pPr>
             <a:r>
@@ -7049,6 +7056,7 @@
           <a:p>
             <a:pPr lvl="0" marL="180472" indent="-180472">
               <a:buSzPct val="100000"/>
+              <a:buFont typeface="Calisto MT"/>
               <a:buChar char="•"/>
             </a:pPr>
             <a:r>
@@ -7070,6 +7078,7 @@
           <a:p>
             <a:pPr lvl="0" marL="180472" indent="-180472">
               <a:buSzPct val="100000"/>
+              <a:buFont typeface="Calisto MT"/>
               <a:buChar char="•"/>
             </a:pPr>
             <a:r>
@@ -7120,8 +7129,8 @@
         </p:nvSpPr>
         <p:spPr>
           <a:xfrm>
-            <a:off x="571500" y="2168381"/>
-            <a:ext cx="8001000" cy="1508126"/>
+            <a:off x="571500" y="2168380"/>
+            <a:ext cx="8001000" cy="1508128"/>
           </a:xfrm>
           <a:prstGeom prst="rect">
             <a:avLst/>
@@ -7154,7 +7163,7 @@
         <p:spPr>
           <a:xfrm>
             <a:off x="4046220" y="6117795"/>
-            <a:ext cx="1051562" cy="177801"/>
+            <a:ext cx="1051563" cy="177802"/>
           </a:xfrm>
           <a:prstGeom prst="rect">
             <a:avLst/>
@@ -7224,8 +7233,8 @@
         </p:nvSpPr>
         <p:spPr>
           <a:xfrm>
-            <a:off x="571500" y="274638"/>
-            <a:ext cx="8001000" cy="1143002"/>
+            <a:off x="571500" y="274637"/>
+            <a:ext cx="8001000" cy="1143004"/>
           </a:xfrm>
           <a:prstGeom prst="rect">
             <a:avLst/>
@@ -7258,7 +7267,7 @@
         <p:spPr>
           <a:xfrm>
             <a:off x="571500" y="2473410"/>
-            <a:ext cx="8001000" cy="4114802"/>
+            <a:ext cx="8001000" cy="4114803"/>
           </a:xfrm>
           <a:prstGeom prst="rect">
             <a:avLst/>
@@ -7268,7 +7277,7 @@
           <a:bodyPr/>
           <a:lstStyle/>
           <a:p>
-            <a:pPr lvl="0" marL="609600" indent="-609600">
+            <a:pPr lvl="0" marL="812800" indent="-812800">
               <a:defRPr sz="1800"/>
             </a:pPr>
             <a:r>
@@ -7278,7 +7287,7 @@
             <a:endParaRPr sz="2400"/>
           </a:p>
           <a:p>
-            <a:pPr lvl="0" marL="609600" indent="-609600">
+            <a:pPr lvl="0" marL="812800" indent="-812800">
               <a:defRPr sz="1800"/>
             </a:pPr>
             <a:r>
@@ -7357,8 +7366,8 @@
         </p:nvSpPr>
         <p:spPr>
           <a:xfrm>
-            <a:off x="667512" y="2659378"/>
-            <a:ext cx="8001001" cy="4114803"/>
+            <a:off x="667512" y="2659377"/>
+            <a:ext cx="8001001" cy="4114805"/>
           </a:xfrm>
           <a:prstGeom prst="rect">
             <a:avLst/>
@@ -7368,7 +7377,7 @@
           <a:bodyPr/>
           <a:lstStyle/>
           <a:p>
-            <a:pPr lvl="0" marL="609600" indent="-609600">
+            <a:pPr lvl="0" marL="812800" indent="-812800">
               <a:defRPr sz="1800"/>
             </a:pPr>
             <a:r>
@@ -7378,7 +7387,7 @@
             <a:endParaRPr sz="2400"/>
           </a:p>
           <a:p>
-            <a:pPr lvl="0" marL="609600" indent="-609600">
+            <a:pPr lvl="0" marL="812800" indent="-812800">
               <a:defRPr sz="1800"/>
             </a:pPr>
             <a:r>
@@ -7463,8 +7472,8 @@
         </p:blipFill>
         <p:spPr>
           <a:xfrm>
-            <a:off x="2051332" y="1905000"/>
-            <a:ext cx="5114161" cy="4114800"/>
+            <a:off x="2051331" y="1905000"/>
+            <a:ext cx="5114163" cy="4114800"/>
           </a:xfrm>
           <a:prstGeom prst="rect">
             <a:avLst/>
@@ -7544,7 +7553,7 @@
         <p:spPr>
           <a:xfrm>
             <a:off x="681816" y="2824301"/>
-            <a:ext cx="8001001" cy="4114803"/>
+            <a:ext cx="8001001" cy="4114804"/>
           </a:xfrm>
           <a:prstGeom prst="rect">
             <a:avLst/>
@@ -7554,7 +7563,7 @@
           <a:bodyPr/>
           <a:lstStyle/>
           <a:p>
-            <a:pPr lvl="0" marL="609600" indent="-609600">
+            <a:pPr lvl="0" marL="812800" indent="-812800">
               <a:defRPr sz="1800"/>
             </a:pPr>
             <a:r>
@@ -7564,7 +7573,7 @@
             <a:endParaRPr sz="2400"/>
           </a:p>
           <a:p>
-            <a:pPr lvl="0" marL="609600" indent="-609600">
+            <a:pPr lvl="0" marL="812800" indent="-812800">
               <a:defRPr sz="1800"/>
             </a:pPr>
             <a:r>
@@ -7626,14 +7635,14 @@
     </a:clrScheme>
     <a:fontScheme name="Default">
       <a:majorFont>
+        <a:latin typeface="Helvetica"/>
+        <a:ea typeface="Helvetica"/>
+        <a:cs typeface="Helvetica"/>
+      </a:majorFont>
+      <a:minorFont>
         <a:latin typeface="Helvetica Neue"/>
         <a:ea typeface="Helvetica Neue"/>
         <a:cs typeface="Helvetica Neue"/>
-      </a:majorFont>
-      <a:minorFont>
-        <a:latin typeface="Helvetica"/>
-        <a:ea typeface="Helvetica"/>
-        <a:cs typeface="Helvetica"/>
       </a:minorFont>
     </a:fontScheme>
     <a:fmtScheme name="Default">
@@ -7837,10 +7846,10 @@
             </a:solidFill>
             <a:effectLst/>
             <a:uFillTx/>
-            <a:latin typeface="Avenir Book"/>
-            <a:ea typeface="Avenir Book"/>
-            <a:cs typeface="Avenir Book"/>
-            <a:sym typeface="Avenir Book"/>
+            <a:latin typeface="+mj-lt"/>
+            <a:ea typeface="+mj-ea"/>
+            <a:cs typeface="+mj-cs"/>
+            <a:sym typeface="Helvetica"/>
           </a:defRPr>
         </a:defPPr>
         <a:lvl1pPr marL="0" marR="0" indent="0" algn="l" defTabSz="914400" rtl="0" fontAlgn="auto" latinLnBrk="1" hangingPunct="0">
@@ -8412,10 +8421,10 @@
             </a:solidFill>
             <a:effectLst/>
             <a:uFillTx/>
-            <a:latin typeface="Avenir Book"/>
-            <a:ea typeface="Avenir Book"/>
-            <a:cs typeface="Avenir Book"/>
-            <a:sym typeface="Avenir Book"/>
+            <a:latin typeface="+mj-lt"/>
+            <a:ea typeface="+mj-ea"/>
+            <a:cs typeface="+mj-cs"/>
+            <a:sym typeface="Helvetica"/>
           </a:defRPr>
         </a:defPPr>
         <a:lvl1pPr marL="0" marR="0" indent="0" algn="l" defTabSz="914400" rtl="0" fontAlgn="auto" latinLnBrk="1" hangingPunct="0">
@@ -8707,14 +8716,14 @@
     </a:clrScheme>
     <a:fontScheme name="Default">
       <a:majorFont>
+        <a:latin typeface="Helvetica"/>
+        <a:ea typeface="Helvetica"/>
+        <a:cs typeface="Helvetica"/>
+      </a:majorFont>
+      <a:minorFont>
         <a:latin typeface="Helvetica Neue"/>
         <a:ea typeface="Helvetica Neue"/>
         <a:cs typeface="Helvetica Neue"/>
-      </a:majorFont>
-      <a:minorFont>
-        <a:latin typeface="Helvetica"/>
-        <a:ea typeface="Helvetica"/>
-        <a:cs typeface="Helvetica"/>
       </a:minorFont>
     </a:fontScheme>
     <a:fmtScheme name="Default">
@@ -8918,10 +8927,10 @@
             </a:solidFill>
             <a:effectLst/>
             <a:uFillTx/>
-            <a:latin typeface="Avenir Book"/>
-            <a:ea typeface="Avenir Book"/>
-            <a:cs typeface="Avenir Book"/>
-            <a:sym typeface="Avenir Book"/>
+            <a:latin typeface="+mj-lt"/>
+            <a:ea typeface="+mj-ea"/>
+            <a:cs typeface="+mj-cs"/>
+            <a:sym typeface="Helvetica"/>
           </a:defRPr>
         </a:defPPr>
         <a:lvl1pPr marL="0" marR="0" indent="0" algn="l" defTabSz="914400" rtl="0" fontAlgn="auto" latinLnBrk="1" hangingPunct="0">
@@ -9493,10 +9502,10 @@
             </a:solidFill>
             <a:effectLst/>
             <a:uFillTx/>
-            <a:latin typeface="Avenir Book"/>
-            <a:ea typeface="Avenir Book"/>
-            <a:cs typeface="Avenir Book"/>
-            <a:sym typeface="Avenir Book"/>
+            <a:latin typeface="+mj-lt"/>
+            <a:ea typeface="+mj-ea"/>
+            <a:cs typeface="+mj-cs"/>
+            <a:sym typeface="Helvetica"/>
           </a:defRPr>
         </a:defPPr>
         <a:lvl1pPr marL="0" marR="0" indent="0" algn="l" defTabSz="914400" rtl="0" fontAlgn="auto" latinLnBrk="1" hangingPunct="0">

</xml_diff>